<commit_message>
* Added who will produce each graph/diagram
</commit_message>
<xml_diff>
--- a/doc/D2/Slides.pptx
+++ b/doc/D2/Slides.pptx
@@ -4057,7 +4057,19 @@
           <a:bodyPr/>
           <a:lstStyle/>
           <a:p>
-            <a:endParaRPr lang="en-US"/>
+            <a:r>
+              <a:rPr lang="en-US" dirty="0" smtClean="0"/>
+              <a:t>&lt;</a:t>
+            </a:r>
+            <a:r>
+              <a:rPr lang="en-US" dirty="0" err="1" smtClean="0"/>
+              <a:t>ed</a:t>
+            </a:r>
+            <a:r>
+              <a:rPr lang="en-US" dirty="0" smtClean="0"/>
+              <a:t> add class diagram&gt;</a:t>
+            </a:r>
+            <a:endParaRPr lang="en-US" dirty="0"/>
           </a:p>
         </p:txBody>
       </p:sp>
@@ -4151,7 +4163,19 @@
             <a:pPr lvl="1"/>
             <a:r>
               <a:rPr lang="en-US" dirty="0" smtClean="0"/>
-              <a:t>&lt;Diagram here&gt;</a:t>
+              <a:t>&lt;Diagram </a:t>
+            </a:r>
+            <a:r>
+              <a:rPr lang="en-US" dirty="0" smtClean="0"/>
+              <a:t>here, </a:t>
+            </a:r>
+            <a:r>
+              <a:rPr lang="en-US" dirty="0" err="1" smtClean="0"/>
+              <a:t>ed</a:t>
+            </a:r>
+            <a:r>
+              <a:rPr lang="en-US" dirty="0" smtClean="0"/>
+              <a:t>&gt;</a:t>
             </a:r>
             <a:endParaRPr lang="en-US" dirty="0"/>
           </a:p>
@@ -4337,7 +4361,11 @@
           <a:p>
             <a:r>
               <a:rPr lang="en-US" dirty="0" smtClean="0"/>
-              <a:t>Graph (of actual time spent by each member and compare to the planned time)</a:t>
+              <a:t>Graph (of actual time spent by each member and compare to the planned time</a:t>
+            </a:r>
+            <a:r>
+              <a:rPr lang="en-US" dirty="0" smtClean="0"/>
+              <a:t>) &lt;kelvin&gt;</a:t>
             </a:r>
             <a:endParaRPr lang="en-US" dirty="0"/>
           </a:p>
@@ -4420,7 +4448,11 @@
           <a:p>
             <a:r>
               <a:rPr lang="en-US" dirty="0" smtClean="0"/>
-              <a:t>Another graph</a:t>
+              <a:t>Another </a:t>
+            </a:r>
+            <a:r>
+              <a:rPr lang="en-US" dirty="0" smtClean="0"/>
+              <a:t>graph &lt;kelvin&gt;</a:t>
             </a:r>
             <a:endParaRPr lang="en-US" dirty="0"/>
           </a:p>

</xml_diff>

<commit_message>
*Modified the Slides.pptx for D2 : Added two charts on time spending
</commit_message>
<xml_diff>
--- a/doc/D2/Slides.pptx
+++ b/doc/D2/Slides.pptx
@@ -118,6 +118,378 @@
 </p:presentation>
 </file>
 
+<file path=ppt/charts/chart1.xml><?xml version="1.0" encoding="utf-8"?>
+<c:chartSpace xmlns:c="http://schemas.openxmlformats.org/drawingml/2006/chart" xmlns:a="http://schemas.openxmlformats.org/drawingml/2006/main" xmlns:r="http://schemas.openxmlformats.org/officeDocument/2006/relationships">
+  <c:lang val="zh-TW"/>
+  <c:chart>
+    <c:title>
+      <c:tx>
+        <c:rich>
+          <a:bodyPr/>
+          <a:lstStyle/>
+          <a:p>
+            <a:pPr>
+              <a:defRPr/>
+            </a:pPr>
+            <a:r>
+              <a:rPr lang="en-GB" altLang="zh-TW" sz="2500" baseline="0" dirty="0"/>
+              <a:t>Actual time spent distribution till 3rd March 2012</a:t>
+            </a:r>
+            <a:endParaRPr lang="zh-TW" altLang="en-US" sz="2500" baseline="0" dirty="0"/>
+          </a:p>
+        </c:rich>
+      </c:tx>
+      <c:layout>
+        <c:manualLayout>
+          <c:xMode val="edge"/>
+          <c:yMode val="edge"/>
+          <c:x val="7.5223218625449617E-2"/>
+          <c:y val="1.6016039017552729E-2"/>
+        </c:manualLayout>
+      </c:layout>
+    </c:title>
+    <c:view3D>
+      <c:rotX val="30"/>
+      <c:perspective val="30"/>
+    </c:view3D>
+    <c:plotArea>
+      <c:layout/>
+      <c:pie3DChart>
+        <c:varyColors val="1"/>
+        <c:ser>
+          <c:idx val="0"/>
+          <c:order val="0"/>
+          <c:explosion val="15"/>
+          <c:dLbls>
+            <c:txPr>
+              <a:bodyPr/>
+              <a:lstStyle/>
+              <a:p>
+                <a:pPr>
+                  <a:defRPr sz="2500" b="1" i="0" u="none" baseline="0"/>
+                </a:pPr>
+                <a:endParaRPr lang="zh-TW"/>
+              </a:p>
+            </c:txPr>
+            <c:showVal val="1"/>
+            <c:showLeaderLines val="1"/>
+          </c:dLbls>
+          <c:cat>
+            <c:strRef>
+              <c:f>Sheet1!$A$3:$E$3</c:f>
+              <c:strCache>
+                <c:ptCount val="5"/>
+                <c:pt idx="0">
+                  <c:v>Edward</c:v>
+                </c:pt>
+                <c:pt idx="1">
+                  <c:v>Kristian</c:v>
+                </c:pt>
+                <c:pt idx="2">
+                  <c:v>Brian</c:v>
+                </c:pt>
+                <c:pt idx="3">
+                  <c:v>Oscar</c:v>
+                </c:pt>
+                <c:pt idx="4">
+                  <c:v>Kelvin</c:v>
+                </c:pt>
+              </c:strCache>
+            </c:strRef>
+          </c:cat>
+          <c:val>
+            <c:numRef>
+              <c:f>Sheet1!$A$4:$E$4</c:f>
+              <c:numCache>
+                <c:formatCode>General</c:formatCode>
+                <c:ptCount val="5"/>
+                <c:pt idx="0">
+                  <c:v>22</c:v>
+                </c:pt>
+                <c:pt idx="1">
+                  <c:v>20.5</c:v>
+                </c:pt>
+                <c:pt idx="2">
+                  <c:v>15</c:v>
+                </c:pt>
+                <c:pt idx="3">
+                  <c:v>22.25</c:v>
+                </c:pt>
+                <c:pt idx="4">
+                  <c:v>19.75</c:v>
+                </c:pt>
+              </c:numCache>
+            </c:numRef>
+          </c:val>
+        </c:ser>
+      </c:pie3DChart>
+    </c:plotArea>
+    <c:legend>
+      <c:legendPos val="r"/>
+      <c:layout>
+        <c:manualLayout>
+          <c:xMode val="edge"/>
+          <c:yMode val="edge"/>
+          <c:x val="0.81338205988140366"/>
+          <c:y val="0.30463748819864411"/>
+          <c:w val="0.15970151986815601"/>
+          <c:h val="0.42208034806460037"/>
+        </c:manualLayout>
+      </c:layout>
+      <c:txPr>
+        <a:bodyPr/>
+        <a:lstStyle/>
+        <a:p>
+          <a:pPr>
+            <a:defRPr sz="2000" baseline="0"/>
+          </a:pPr>
+          <a:endParaRPr lang="zh-TW"/>
+        </a:p>
+      </c:txPr>
+    </c:legend>
+    <c:plotVisOnly val="1"/>
+  </c:chart>
+  <c:externalData r:id="rId1"/>
+</c:chartSpace>
+</file>
+
+<file path=ppt/charts/chart2.xml><?xml version="1.0" encoding="utf-8"?>
+<c:chartSpace xmlns:c="http://schemas.openxmlformats.org/drawingml/2006/chart" xmlns:a="http://schemas.openxmlformats.org/drawingml/2006/main" xmlns:r="http://schemas.openxmlformats.org/officeDocument/2006/relationships">
+  <c:lang val="zh-TW"/>
+  <c:chart>
+    <c:title>
+      <c:tx>
+        <c:rich>
+          <a:bodyPr/>
+          <a:lstStyle/>
+          <a:p>
+            <a:pPr>
+              <a:defRPr/>
+            </a:pPr>
+            <a:r>
+              <a:rPr lang="en-GB" altLang="zh-TW" sz="2500" baseline="0" dirty="0"/>
+              <a:t>Actual time spent and expected time spent till 8 March</a:t>
+            </a:r>
+            <a:endParaRPr lang="zh-TW" altLang="en-US" sz="2500" baseline="0" dirty="0"/>
+          </a:p>
+        </c:rich>
+      </c:tx>
+      <c:layout/>
+    </c:title>
+    <c:plotArea>
+      <c:layout>
+        <c:manualLayout>
+          <c:layoutTarget val="inner"/>
+          <c:xMode val="edge"/>
+          <c:yMode val="edge"/>
+          <c:x val="7.2072827060074396E-2"/>
+          <c:y val="0.27141664984184694"/>
+          <c:w val="0.57571131847512302"/>
+          <c:h val="0.55351072086643738"/>
+        </c:manualLayout>
+      </c:layout>
+      <c:lineChart>
+        <c:grouping val="standard"/>
+        <c:ser>
+          <c:idx val="0"/>
+          <c:order val="0"/>
+          <c:tx>
+            <c:strRef>
+              <c:f>Sheet1!$H$3</c:f>
+              <c:strCache>
+                <c:ptCount val="1"/>
+                <c:pt idx="0">
+                  <c:v>Actual time spent  (Weekly / Total)</c:v>
+                </c:pt>
+              </c:strCache>
+            </c:strRef>
+          </c:tx>
+          <c:marker>
+            <c:symbol val="none"/>
+          </c:marker>
+          <c:cat>
+            <c:numRef>
+              <c:f>Sheet1!$I$2:$L$2</c:f>
+              <c:numCache>
+                <c:formatCode>d\-mmm</c:formatCode>
+                <c:ptCount val="4"/>
+                <c:pt idx="0">
+                  <c:v>40949</c:v>
+                </c:pt>
+                <c:pt idx="1">
+                  <c:v>40955</c:v>
+                </c:pt>
+                <c:pt idx="2">
+                  <c:v>40962</c:v>
+                </c:pt>
+                <c:pt idx="3">
+                  <c:v>40970</c:v>
+                </c:pt>
+              </c:numCache>
+            </c:numRef>
+          </c:cat>
+          <c:val>
+            <c:numRef>
+              <c:f>Sheet1!$I$3:$L$3</c:f>
+              <c:numCache>
+                <c:formatCode>General</c:formatCode>
+                <c:ptCount val="4"/>
+                <c:pt idx="0">
+                  <c:v>20</c:v>
+                </c:pt>
+                <c:pt idx="1">
+                  <c:v>28.5</c:v>
+                </c:pt>
+                <c:pt idx="2">
+                  <c:v>55.25</c:v>
+                </c:pt>
+                <c:pt idx="3">
+                  <c:v>78</c:v>
+                </c:pt>
+              </c:numCache>
+            </c:numRef>
+          </c:val>
+        </c:ser>
+        <c:ser>
+          <c:idx val="1"/>
+          <c:order val="1"/>
+          <c:tx>
+            <c:strRef>
+              <c:f>Sheet1!$H$4</c:f>
+              <c:strCache>
+                <c:ptCount val="1"/>
+                <c:pt idx="0">
+                  <c:v>Expected time spent (Weekly / Total)</c:v>
+                </c:pt>
+              </c:strCache>
+            </c:strRef>
+          </c:tx>
+          <c:marker>
+            <c:symbol val="none"/>
+          </c:marker>
+          <c:cat>
+            <c:numRef>
+              <c:f>Sheet1!$I$2:$L$2</c:f>
+              <c:numCache>
+                <c:formatCode>d\-mmm</c:formatCode>
+                <c:ptCount val="4"/>
+                <c:pt idx="0">
+                  <c:v>40949</c:v>
+                </c:pt>
+                <c:pt idx="1">
+                  <c:v>40955</c:v>
+                </c:pt>
+                <c:pt idx="2">
+                  <c:v>40962</c:v>
+                </c:pt>
+                <c:pt idx="3">
+                  <c:v>40970</c:v>
+                </c:pt>
+              </c:numCache>
+            </c:numRef>
+          </c:cat>
+          <c:val>
+            <c:numRef>
+              <c:f>Sheet1!$I$4:$L$4</c:f>
+              <c:numCache>
+                <c:formatCode>General</c:formatCode>
+                <c:ptCount val="4"/>
+                <c:pt idx="0">
+                  <c:v>18</c:v>
+                </c:pt>
+                <c:pt idx="1">
+                  <c:v>28</c:v>
+                </c:pt>
+                <c:pt idx="2">
+                  <c:v>44.5</c:v>
+                </c:pt>
+                <c:pt idx="3">
+                  <c:v>80.25</c:v>
+                </c:pt>
+              </c:numCache>
+            </c:numRef>
+          </c:val>
+        </c:ser>
+        <c:marker val="1"/>
+        <c:axId val="132873216"/>
+        <c:axId val="136695808"/>
+      </c:lineChart>
+      <c:dateAx>
+        <c:axId val="132873216"/>
+        <c:scaling>
+          <c:orientation val="minMax"/>
+        </c:scaling>
+        <c:axPos val="b"/>
+        <c:numFmt formatCode="d\-mmm" sourceLinked="1"/>
+        <c:tickLblPos val="nextTo"/>
+        <c:txPr>
+          <a:bodyPr/>
+          <a:lstStyle/>
+          <a:p>
+            <a:pPr>
+              <a:defRPr sz="1500" baseline="0"/>
+            </a:pPr>
+            <a:endParaRPr lang="zh-TW"/>
+          </a:p>
+        </c:txPr>
+        <c:crossAx val="136695808"/>
+        <c:crosses val="autoZero"/>
+        <c:auto val="1"/>
+        <c:lblOffset val="100"/>
+      </c:dateAx>
+      <c:valAx>
+        <c:axId val="136695808"/>
+        <c:scaling>
+          <c:orientation val="minMax"/>
+        </c:scaling>
+        <c:axPos val="l"/>
+        <c:majorGridlines/>
+        <c:numFmt formatCode="General" sourceLinked="1"/>
+        <c:tickLblPos val="nextTo"/>
+        <c:txPr>
+          <a:bodyPr/>
+          <a:lstStyle/>
+          <a:p>
+            <a:pPr>
+              <a:defRPr sz="1500" baseline="0"/>
+            </a:pPr>
+            <a:endParaRPr lang="zh-TW"/>
+          </a:p>
+        </c:txPr>
+        <c:crossAx val="132873216"/>
+        <c:crosses val="autoZero"/>
+        <c:crossBetween val="between"/>
+      </c:valAx>
+    </c:plotArea>
+    <c:legend>
+      <c:legendPos val="r"/>
+      <c:layout>
+        <c:manualLayout>
+          <c:xMode val="edge"/>
+          <c:yMode val="edge"/>
+          <c:x val="0.6910589457567804"/>
+          <c:y val="0.35538536218700867"/>
+          <c:w val="0.27496931224875176"/>
+          <c:h val="0.45994852366225703"/>
+        </c:manualLayout>
+      </c:layout>
+      <c:txPr>
+        <a:bodyPr/>
+        <a:lstStyle/>
+        <a:p>
+          <a:pPr>
+            <a:defRPr sz="2000" baseline="0"/>
+          </a:pPr>
+          <a:endParaRPr lang="zh-TW"/>
+        </a:p>
+      </c:txPr>
+    </c:legend>
+    <c:plotVisOnly val="1"/>
+  </c:chart>
+  <c:externalData r:id="rId1"/>
+</c:chartSpace>
+</file>
+
 <file path=ppt/notesMasters/notesMaster1.xml><?xml version="1.0" encoding="utf-8"?>
 <p:notesMaster xmlns:a="http://schemas.openxmlformats.org/drawingml/2006/main" xmlns:r="http://schemas.openxmlformats.org/officeDocument/2006/relationships" xmlns:p="http://schemas.openxmlformats.org/presentationml/2006/main">
   <p:cSld>
@@ -200,7 +572,8 @@
           <a:p>
             <a:fld id="{CE8F3FB3-3A97-408F-8F2C-779D9619247B}" type="datetimeFigureOut">
               <a:rPr lang="en-US" smtClean="0"/>
-              <a:t>3/7/2012</a:t>
+              <a:pPr/>
+              <a:t>3/8/2012</a:t>
             </a:fld>
             <a:endParaRPr lang="en-US"/>
           </a:p>
@@ -359,6 +732,7 @@
           <a:p>
             <a:fld id="{EC6078B8-B29D-44C4-8B20-495FFF114CDA}" type="slidenum">
               <a:rPr lang="en-US" smtClean="0"/>
+              <a:pPr/>
               <a:t>‹#›</a:t>
             </a:fld>
             <a:endParaRPr lang="en-US"/>
@@ -368,7 +742,7 @@
     </p:spTree>
     <p:extLst>
       <p:ext uri="{BB962C8B-B14F-4D97-AF65-F5344CB8AC3E}">
-        <p14:creationId xmlns:p14="http://schemas.microsoft.com/office/powerpoint/2010/main" val="1229168759"/>
+        <p14:creationId xmlns:p14="http://schemas.microsoft.com/office/powerpoint/2010/main" xmlns="" val="1229168759"/>
       </p:ext>
     </p:extLst>
   </p:cSld>
@@ -545,6 +919,7 @@
           <a:p>
             <a:fld id="{EC6078B8-B29D-44C4-8B20-495FFF114CDA}" type="slidenum">
               <a:rPr lang="en-US" smtClean="0"/>
+              <a:pPr/>
               <a:t>7</a:t>
             </a:fld>
             <a:endParaRPr lang="en-US"/>
@@ -554,7 +929,7 @@
     </p:spTree>
     <p:extLst>
       <p:ext uri="{BB962C8B-B14F-4D97-AF65-F5344CB8AC3E}">
-        <p14:creationId xmlns:p14="http://schemas.microsoft.com/office/powerpoint/2010/main" val="558691801"/>
+        <p14:creationId xmlns:p14="http://schemas.microsoft.com/office/powerpoint/2010/main" xmlns="" val="558691801"/>
       </p:ext>
     </p:extLst>
   </p:cSld>
@@ -745,7 +1120,8 @@
           <a:p>
             <a:fld id="{172E3D70-980A-4389-BA3F-762755736F44}" type="datetimeFigureOut">
               <a:rPr lang="en-US" smtClean="0"/>
-              <a:t>3/7/2012</a:t>
+              <a:pPr/>
+              <a:t>3/8/2012</a:t>
             </a:fld>
             <a:endParaRPr lang="en-US"/>
           </a:p>
@@ -787,6 +1163,7 @@
           <a:p>
             <a:fld id="{AAA90905-6BAF-4082-B6EA-A73746DD0083}" type="slidenum">
               <a:rPr lang="en-US" smtClean="0"/>
+              <a:pPr/>
               <a:t>‹#›</a:t>
             </a:fld>
             <a:endParaRPr lang="en-US"/>
@@ -796,7 +1173,7 @@
     </p:spTree>
     <p:extLst>
       <p:ext uri="{BB962C8B-B14F-4D97-AF65-F5344CB8AC3E}">
-        <p14:creationId xmlns:p14="http://schemas.microsoft.com/office/powerpoint/2010/main" val="119035379"/>
+        <p14:creationId xmlns:p14="http://schemas.microsoft.com/office/powerpoint/2010/main" xmlns="" val="119035379"/>
       </p:ext>
     </p:extLst>
   </p:cSld>
@@ -915,7 +1292,8 @@
           <a:p>
             <a:fld id="{172E3D70-980A-4389-BA3F-762755736F44}" type="datetimeFigureOut">
               <a:rPr lang="en-US" smtClean="0"/>
-              <a:t>3/7/2012</a:t>
+              <a:pPr/>
+              <a:t>3/8/2012</a:t>
             </a:fld>
             <a:endParaRPr lang="en-US"/>
           </a:p>
@@ -957,6 +1335,7 @@
           <a:p>
             <a:fld id="{AAA90905-6BAF-4082-B6EA-A73746DD0083}" type="slidenum">
               <a:rPr lang="en-US" smtClean="0"/>
+              <a:pPr/>
               <a:t>‹#›</a:t>
             </a:fld>
             <a:endParaRPr lang="en-US"/>
@@ -966,7 +1345,7 @@
     </p:spTree>
     <p:extLst>
       <p:ext uri="{BB962C8B-B14F-4D97-AF65-F5344CB8AC3E}">
-        <p14:creationId xmlns:p14="http://schemas.microsoft.com/office/powerpoint/2010/main" val="2066552751"/>
+        <p14:creationId xmlns:p14="http://schemas.microsoft.com/office/powerpoint/2010/main" xmlns="" val="2066552751"/>
       </p:ext>
     </p:extLst>
   </p:cSld>
@@ -1095,7 +1474,8 @@
           <a:p>
             <a:fld id="{172E3D70-980A-4389-BA3F-762755736F44}" type="datetimeFigureOut">
               <a:rPr lang="en-US" smtClean="0"/>
-              <a:t>3/7/2012</a:t>
+              <a:pPr/>
+              <a:t>3/8/2012</a:t>
             </a:fld>
             <a:endParaRPr lang="en-US"/>
           </a:p>
@@ -1137,6 +1517,7 @@
           <a:p>
             <a:fld id="{AAA90905-6BAF-4082-B6EA-A73746DD0083}" type="slidenum">
               <a:rPr lang="en-US" smtClean="0"/>
+              <a:pPr/>
               <a:t>‹#›</a:t>
             </a:fld>
             <a:endParaRPr lang="en-US"/>
@@ -1146,7 +1527,7 @@
     </p:spTree>
     <p:extLst>
       <p:ext uri="{BB962C8B-B14F-4D97-AF65-F5344CB8AC3E}">
-        <p14:creationId xmlns:p14="http://schemas.microsoft.com/office/powerpoint/2010/main" val="564968224"/>
+        <p14:creationId xmlns:p14="http://schemas.microsoft.com/office/powerpoint/2010/main" xmlns="" val="564968224"/>
       </p:ext>
     </p:extLst>
   </p:cSld>
@@ -1265,7 +1646,8 @@
           <a:p>
             <a:fld id="{172E3D70-980A-4389-BA3F-762755736F44}" type="datetimeFigureOut">
               <a:rPr lang="en-US" smtClean="0"/>
-              <a:t>3/7/2012</a:t>
+              <a:pPr/>
+              <a:t>3/8/2012</a:t>
             </a:fld>
             <a:endParaRPr lang="en-US"/>
           </a:p>
@@ -1307,6 +1689,7 @@
           <a:p>
             <a:fld id="{AAA90905-6BAF-4082-B6EA-A73746DD0083}" type="slidenum">
               <a:rPr lang="en-US" smtClean="0"/>
+              <a:pPr/>
               <a:t>‹#›</a:t>
             </a:fld>
             <a:endParaRPr lang="en-US"/>
@@ -1316,7 +1699,7 @@
     </p:spTree>
     <p:extLst>
       <p:ext uri="{BB962C8B-B14F-4D97-AF65-F5344CB8AC3E}">
-        <p14:creationId xmlns:p14="http://schemas.microsoft.com/office/powerpoint/2010/main" val="1119916372"/>
+        <p14:creationId xmlns:p14="http://schemas.microsoft.com/office/powerpoint/2010/main" xmlns="" val="1119916372"/>
       </p:ext>
     </p:extLst>
   </p:cSld>
@@ -1511,7 +1894,8 @@
           <a:p>
             <a:fld id="{172E3D70-980A-4389-BA3F-762755736F44}" type="datetimeFigureOut">
               <a:rPr lang="en-US" smtClean="0"/>
-              <a:t>3/7/2012</a:t>
+              <a:pPr/>
+              <a:t>3/8/2012</a:t>
             </a:fld>
             <a:endParaRPr lang="en-US"/>
           </a:p>
@@ -1553,6 +1937,7 @@
           <a:p>
             <a:fld id="{AAA90905-6BAF-4082-B6EA-A73746DD0083}" type="slidenum">
               <a:rPr lang="en-US" smtClean="0"/>
+              <a:pPr/>
               <a:t>‹#›</a:t>
             </a:fld>
             <a:endParaRPr lang="en-US"/>
@@ -1562,7 +1947,7 @@
     </p:spTree>
     <p:extLst>
       <p:ext uri="{BB962C8B-B14F-4D97-AF65-F5344CB8AC3E}">
-        <p14:creationId xmlns:p14="http://schemas.microsoft.com/office/powerpoint/2010/main" val="3764001431"/>
+        <p14:creationId xmlns:p14="http://schemas.microsoft.com/office/powerpoint/2010/main" xmlns="" val="3764001431"/>
       </p:ext>
     </p:extLst>
   </p:cSld>
@@ -1799,7 +2184,8 @@
           <a:p>
             <a:fld id="{172E3D70-980A-4389-BA3F-762755736F44}" type="datetimeFigureOut">
               <a:rPr lang="en-US" smtClean="0"/>
-              <a:t>3/7/2012</a:t>
+              <a:pPr/>
+              <a:t>3/8/2012</a:t>
             </a:fld>
             <a:endParaRPr lang="en-US"/>
           </a:p>
@@ -1841,6 +2227,7 @@
           <a:p>
             <a:fld id="{AAA90905-6BAF-4082-B6EA-A73746DD0083}" type="slidenum">
               <a:rPr lang="en-US" smtClean="0"/>
+              <a:pPr/>
               <a:t>‹#›</a:t>
             </a:fld>
             <a:endParaRPr lang="en-US"/>
@@ -1850,7 +2237,7 @@
     </p:spTree>
     <p:extLst>
       <p:ext uri="{BB962C8B-B14F-4D97-AF65-F5344CB8AC3E}">
-        <p14:creationId xmlns:p14="http://schemas.microsoft.com/office/powerpoint/2010/main" val="2597511228"/>
+        <p14:creationId xmlns:p14="http://schemas.microsoft.com/office/powerpoint/2010/main" xmlns="" val="2597511228"/>
       </p:ext>
     </p:extLst>
   </p:cSld>
@@ -2221,7 +2608,8 @@
           <a:p>
             <a:fld id="{172E3D70-980A-4389-BA3F-762755736F44}" type="datetimeFigureOut">
               <a:rPr lang="en-US" smtClean="0"/>
-              <a:t>3/7/2012</a:t>
+              <a:pPr/>
+              <a:t>3/8/2012</a:t>
             </a:fld>
             <a:endParaRPr lang="en-US"/>
           </a:p>
@@ -2263,6 +2651,7 @@
           <a:p>
             <a:fld id="{AAA90905-6BAF-4082-B6EA-A73746DD0083}" type="slidenum">
               <a:rPr lang="en-US" smtClean="0"/>
+              <a:pPr/>
               <a:t>‹#›</a:t>
             </a:fld>
             <a:endParaRPr lang="en-US"/>
@@ -2272,7 +2661,7 @@
     </p:spTree>
     <p:extLst>
       <p:ext uri="{BB962C8B-B14F-4D97-AF65-F5344CB8AC3E}">
-        <p14:creationId xmlns:p14="http://schemas.microsoft.com/office/powerpoint/2010/main" val="2822279431"/>
+        <p14:creationId xmlns:p14="http://schemas.microsoft.com/office/powerpoint/2010/main" xmlns="" val="2822279431"/>
       </p:ext>
     </p:extLst>
   </p:cSld>
@@ -2339,7 +2728,8 @@
           <a:p>
             <a:fld id="{172E3D70-980A-4389-BA3F-762755736F44}" type="datetimeFigureOut">
               <a:rPr lang="en-US" smtClean="0"/>
-              <a:t>3/7/2012</a:t>
+              <a:pPr/>
+              <a:t>3/8/2012</a:t>
             </a:fld>
             <a:endParaRPr lang="en-US"/>
           </a:p>
@@ -2381,6 +2771,7 @@
           <a:p>
             <a:fld id="{AAA90905-6BAF-4082-B6EA-A73746DD0083}" type="slidenum">
               <a:rPr lang="en-US" smtClean="0"/>
+              <a:pPr/>
               <a:t>‹#›</a:t>
             </a:fld>
             <a:endParaRPr lang="en-US"/>
@@ -2390,7 +2781,7 @@
     </p:spTree>
     <p:extLst>
       <p:ext uri="{BB962C8B-B14F-4D97-AF65-F5344CB8AC3E}">
-        <p14:creationId xmlns:p14="http://schemas.microsoft.com/office/powerpoint/2010/main" val="3206901730"/>
+        <p14:creationId xmlns:p14="http://schemas.microsoft.com/office/powerpoint/2010/main" xmlns="" val="3206901730"/>
       </p:ext>
     </p:extLst>
   </p:cSld>
@@ -2434,7 +2825,8 @@
           <a:p>
             <a:fld id="{172E3D70-980A-4389-BA3F-762755736F44}" type="datetimeFigureOut">
               <a:rPr lang="en-US" smtClean="0"/>
-              <a:t>3/7/2012</a:t>
+              <a:pPr/>
+              <a:t>3/8/2012</a:t>
             </a:fld>
             <a:endParaRPr lang="en-US"/>
           </a:p>
@@ -2476,6 +2868,7 @@
           <a:p>
             <a:fld id="{AAA90905-6BAF-4082-B6EA-A73746DD0083}" type="slidenum">
               <a:rPr lang="en-US" smtClean="0"/>
+              <a:pPr/>
               <a:t>‹#›</a:t>
             </a:fld>
             <a:endParaRPr lang="en-US"/>
@@ -2485,7 +2878,7 @@
     </p:spTree>
     <p:extLst>
       <p:ext uri="{BB962C8B-B14F-4D97-AF65-F5344CB8AC3E}">
-        <p14:creationId xmlns:p14="http://schemas.microsoft.com/office/powerpoint/2010/main" val="2816216539"/>
+        <p14:creationId xmlns:p14="http://schemas.microsoft.com/office/powerpoint/2010/main" xmlns="" val="2816216539"/>
       </p:ext>
     </p:extLst>
   </p:cSld>
@@ -2711,7 +3104,8 @@
           <a:p>
             <a:fld id="{172E3D70-980A-4389-BA3F-762755736F44}" type="datetimeFigureOut">
               <a:rPr lang="en-US" smtClean="0"/>
-              <a:t>3/7/2012</a:t>
+              <a:pPr/>
+              <a:t>3/8/2012</a:t>
             </a:fld>
             <a:endParaRPr lang="en-US"/>
           </a:p>
@@ -2753,6 +3147,7 @@
           <a:p>
             <a:fld id="{AAA90905-6BAF-4082-B6EA-A73746DD0083}" type="slidenum">
               <a:rPr lang="en-US" smtClean="0"/>
+              <a:pPr/>
               <a:t>‹#›</a:t>
             </a:fld>
             <a:endParaRPr lang="en-US"/>
@@ -2762,7 +3157,7 @@
     </p:spTree>
     <p:extLst>
       <p:ext uri="{BB962C8B-B14F-4D97-AF65-F5344CB8AC3E}">
-        <p14:creationId xmlns:p14="http://schemas.microsoft.com/office/powerpoint/2010/main" val="1195005641"/>
+        <p14:creationId xmlns:p14="http://schemas.microsoft.com/office/powerpoint/2010/main" xmlns="" val="1195005641"/>
       </p:ext>
     </p:extLst>
   </p:cSld>
@@ -2964,7 +3359,8 @@
           <a:p>
             <a:fld id="{172E3D70-980A-4389-BA3F-762755736F44}" type="datetimeFigureOut">
               <a:rPr lang="en-US" smtClean="0"/>
-              <a:t>3/7/2012</a:t>
+              <a:pPr/>
+              <a:t>3/8/2012</a:t>
             </a:fld>
             <a:endParaRPr lang="en-US"/>
           </a:p>
@@ -3006,6 +3402,7 @@
           <a:p>
             <a:fld id="{AAA90905-6BAF-4082-B6EA-A73746DD0083}" type="slidenum">
               <a:rPr lang="en-US" smtClean="0"/>
+              <a:pPr/>
               <a:t>‹#›</a:t>
             </a:fld>
             <a:endParaRPr lang="en-US"/>
@@ -3015,7 +3412,7 @@
     </p:spTree>
     <p:extLst>
       <p:ext uri="{BB962C8B-B14F-4D97-AF65-F5344CB8AC3E}">
-        <p14:creationId xmlns:p14="http://schemas.microsoft.com/office/powerpoint/2010/main" val="82865573"/>
+        <p14:creationId xmlns:p14="http://schemas.microsoft.com/office/powerpoint/2010/main" xmlns="" val="82865573"/>
       </p:ext>
     </p:extLst>
   </p:cSld>
@@ -3177,7 +3574,8 @@
           <a:p>
             <a:fld id="{172E3D70-980A-4389-BA3F-762755736F44}" type="datetimeFigureOut">
               <a:rPr lang="en-US" smtClean="0"/>
-              <a:t>3/7/2012</a:t>
+              <a:pPr/>
+              <a:t>3/8/2012</a:t>
             </a:fld>
             <a:endParaRPr lang="en-US"/>
           </a:p>
@@ -3255,6 +3653,7 @@
           <a:p>
             <a:fld id="{AAA90905-6BAF-4082-B6EA-A73746DD0083}" type="slidenum">
               <a:rPr lang="en-US" smtClean="0"/>
+              <a:pPr/>
               <a:t>‹#›</a:t>
             </a:fld>
             <a:endParaRPr lang="en-US"/>
@@ -3264,7 +3663,7 @@
     </p:spTree>
     <p:extLst>
       <p:ext uri="{BB962C8B-B14F-4D97-AF65-F5344CB8AC3E}">
-        <p14:creationId xmlns:p14="http://schemas.microsoft.com/office/powerpoint/2010/main" val="2173925321"/>
+        <p14:creationId xmlns:p14="http://schemas.microsoft.com/office/powerpoint/2010/main" xmlns="" val="2173925321"/>
       </p:ext>
     </p:extLst>
   </p:cSld>
@@ -3601,7 +4000,7 @@
     </p:spTree>
     <p:extLst>
       <p:ext uri="{BB962C8B-B14F-4D97-AF65-F5344CB8AC3E}">
-        <p14:creationId xmlns:p14="http://schemas.microsoft.com/office/powerpoint/2010/main" val="1786804303"/>
+        <p14:creationId xmlns:p14="http://schemas.microsoft.com/office/powerpoint/2010/main" xmlns="" val="1786804303"/>
       </p:ext>
     </p:extLst>
   </p:cSld>
@@ -3719,7 +4118,7 @@
     </p:spTree>
     <p:extLst>
       <p:ext uri="{BB962C8B-B14F-4D97-AF65-F5344CB8AC3E}">
-        <p14:creationId xmlns:p14="http://schemas.microsoft.com/office/powerpoint/2010/main" val="3707052916"/>
+        <p14:creationId xmlns:p14="http://schemas.microsoft.com/office/powerpoint/2010/main" xmlns="" val="3707052916"/>
       </p:ext>
     </p:extLst>
   </p:cSld>
@@ -3872,7 +4271,7 @@
     </p:spTree>
     <p:extLst>
       <p:ext uri="{BB962C8B-B14F-4D97-AF65-F5344CB8AC3E}">
-        <p14:creationId xmlns:p14="http://schemas.microsoft.com/office/powerpoint/2010/main" val="2599285141"/>
+        <p14:creationId xmlns:p14="http://schemas.microsoft.com/office/powerpoint/2010/main" xmlns="" val="2599285141"/>
       </p:ext>
     </p:extLst>
   </p:cSld>
@@ -3985,7 +4384,7 @@
     </p:spTree>
     <p:extLst>
       <p:ext uri="{BB962C8B-B14F-4D97-AF65-F5344CB8AC3E}">
-        <p14:creationId xmlns:p14="http://schemas.microsoft.com/office/powerpoint/2010/main" val="1684329172"/>
+        <p14:creationId xmlns:p14="http://schemas.microsoft.com/office/powerpoint/2010/main" xmlns="" val="1684329172"/>
       </p:ext>
     </p:extLst>
   </p:cSld>
@@ -4076,7 +4475,7 @@
     </p:spTree>
     <p:extLst>
       <p:ext uri="{BB962C8B-B14F-4D97-AF65-F5344CB8AC3E}">
-        <p14:creationId xmlns:p14="http://schemas.microsoft.com/office/powerpoint/2010/main" val="3359560538"/>
+        <p14:creationId xmlns:p14="http://schemas.microsoft.com/office/powerpoint/2010/main" xmlns="" val="3359560538"/>
       </p:ext>
     </p:extLst>
   </p:cSld>
@@ -4163,11 +4562,7 @@
             <a:pPr lvl="1"/>
             <a:r>
               <a:rPr lang="en-US" dirty="0" smtClean="0"/>
-              <a:t>&lt;Diagram </a:t>
-            </a:r>
-            <a:r>
-              <a:rPr lang="en-US" dirty="0" smtClean="0"/>
-              <a:t>here, </a:t>
+              <a:t>&lt;Diagram here, </a:t>
             </a:r>
             <a:r>
               <a:rPr lang="en-US" dirty="0" err="1" smtClean="0"/>
@@ -4184,7 +4579,7 @@
     </p:spTree>
     <p:extLst>
       <p:ext uri="{BB962C8B-B14F-4D97-AF65-F5344CB8AC3E}">
-        <p14:creationId xmlns:p14="http://schemas.microsoft.com/office/powerpoint/2010/main" val="869076350"/>
+        <p14:creationId xmlns:p14="http://schemas.microsoft.com/office/powerpoint/2010/main" xmlns="" val="869076350"/>
       </p:ext>
     </p:extLst>
   </p:cSld>
@@ -4287,7 +4682,7 @@
     </p:spTree>
     <p:extLst>
       <p:ext uri="{BB962C8B-B14F-4D97-AF65-F5344CB8AC3E}">
-        <p14:creationId xmlns:p14="http://schemas.microsoft.com/office/powerpoint/2010/main" val="68516678"/>
+        <p14:creationId xmlns:p14="http://schemas.microsoft.com/office/powerpoint/2010/main" xmlns="" val="68516678"/>
       </p:ext>
     </p:extLst>
   </p:cSld>
@@ -4344,37 +4739,30 @@
           </a:p>
         </p:txBody>
       </p:sp>
-      <p:sp>
-        <p:nvSpPr>
-          <p:cNvPr id="3" name="Content Placeholder 2"/>
-          <p:cNvSpPr>
-            <a:spLocks noGrp="1"/>
-          </p:cNvSpPr>
+      <p:graphicFrame>
+        <p:nvGraphicFramePr>
+          <p:cNvPr id="7" name="內容版面配置區 6"/>
+          <p:cNvGraphicFramePr>
+            <a:graphicFrameLocks noGrp="1"/>
+          </p:cNvGraphicFramePr>
           <p:nvPr>
             <p:ph idx="1"/>
           </p:nvPr>
-        </p:nvSpPr>
-        <p:spPr/>
-        <p:txBody>
-          <a:bodyPr/>
-          <a:lstStyle/>
-          <a:p>
-            <a:r>
-              <a:rPr lang="en-US" dirty="0" smtClean="0"/>
-              <a:t>Graph (of actual time spent by each member and compare to the planned time</a:t>
-            </a:r>
-            <a:r>
-              <a:rPr lang="en-US" dirty="0" smtClean="0"/>
-              <a:t>) &lt;kelvin&gt;</a:t>
-            </a:r>
-            <a:endParaRPr lang="en-US" dirty="0"/>
-          </a:p>
-        </p:txBody>
-      </p:sp>
+        </p:nvGraphicFramePr>
+        <p:xfrm>
+          <a:off x="457200" y="1600200"/>
+          <a:ext cx="8229600" cy="4525963"/>
+        </p:xfrm>
+        <a:graphic>
+          <a:graphicData uri="http://schemas.openxmlformats.org/drawingml/2006/chart">
+            <c:chart xmlns:c="http://schemas.openxmlformats.org/drawingml/2006/chart" xmlns:r="http://schemas.openxmlformats.org/officeDocument/2006/relationships" r:id="rId2"/>
+          </a:graphicData>
+        </a:graphic>
+      </p:graphicFrame>
     </p:spTree>
     <p:extLst>
       <p:ext uri="{BB962C8B-B14F-4D97-AF65-F5344CB8AC3E}">
-        <p14:creationId xmlns:p14="http://schemas.microsoft.com/office/powerpoint/2010/main" val="3838499978"/>
+        <p14:creationId xmlns:p14="http://schemas.microsoft.com/office/powerpoint/2010/main" xmlns="" val="3838499978"/>
       </p:ext>
     </p:extLst>
   </p:cSld>
@@ -4431,37 +4819,30 @@
           </a:p>
         </p:txBody>
       </p:sp>
-      <p:sp>
-        <p:nvSpPr>
-          <p:cNvPr id="3" name="Content Placeholder 2"/>
-          <p:cNvSpPr>
-            <a:spLocks noGrp="1"/>
-          </p:cNvSpPr>
+      <p:graphicFrame>
+        <p:nvGraphicFramePr>
+          <p:cNvPr id="4" name="內容版面配置區 3"/>
+          <p:cNvGraphicFramePr>
+            <a:graphicFrameLocks noGrp="1"/>
+          </p:cNvGraphicFramePr>
           <p:nvPr>
             <p:ph idx="1"/>
           </p:nvPr>
-        </p:nvSpPr>
-        <p:spPr/>
-        <p:txBody>
-          <a:bodyPr/>
-          <a:lstStyle/>
-          <a:p>
-            <a:r>
-              <a:rPr lang="en-US" dirty="0" smtClean="0"/>
-              <a:t>Another </a:t>
-            </a:r>
-            <a:r>
-              <a:rPr lang="en-US" dirty="0" smtClean="0"/>
-              <a:t>graph &lt;kelvin&gt;</a:t>
-            </a:r>
-            <a:endParaRPr lang="en-US" dirty="0"/>
-          </a:p>
-        </p:txBody>
-      </p:sp>
+        </p:nvGraphicFramePr>
+        <p:xfrm>
+          <a:off x="0" y="1600200"/>
+          <a:ext cx="9144000" cy="4525963"/>
+        </p:xfrm>
+        <a:graphic>
+          <a:graphicData uri="http://schemas.openxmlformats.org/drawingml/2006/chart">
+            <c:chart xmlns:c="http://schemas.openxmlformats.org/drawingml/2006/chart" xmlns:r="http://schemas.openxmlformats.org/officeDocument/2006/relationships" r:id="rId2"/>
+          </a:graphicData>
+        </a:graphic>
+      </p:graphicFrame>
     </p:spTree>
     <p:extLst>
       <p:ext uri="{BB962C8B-B14F-4D97-AF65-F5344CB8AC3E}">
-        <p14:creationId xmlns:p14="http://schemas.microsoft.com/office/powerpoint/2010/main" val="520266324"/>
+        <p14:creationId xmlns:p14="http://schemas.microsoft.com/office/powerpoint/2010/main" xmlns="" val="520266324"/>
       </p:ext>
     </p:extLst>
   </p:cSld>

</xml_diff>

<commit_message>
* Modified the Slides.pptx : Updated the 2 graph's values * Modified the PhysicalRunway class : Modified the use of the closeTo and awayFrom variable in calculation as a local variable in the calculateParameters method ; Add the method on returning the string of calculations. * Modified the test2 : Show the calculations by calling the toCalculation method in PhysicalRunway class
</commit_message>
<xml_diff>
--- a/doc/D2/Slides.pptx
+++ b/doc/D2/Slides.pptx
@@ -129,44 +129,32 @@
           <a:lstStyle/>
           <a:p>
             <a:pPr>
-              <a:defRPr/>
+              <a:defRPr sz="2500" baseline="0"/>
             </a:pPr>
             <a:r>
-              <a:rPr lang="en-GB" altLang="zh-TW" sz="2500" baseline="0" dirty="0"/>
+              <a:rPr lang="en-GB" altLang="zh-TW" sz="2500" b="1" i="0" baseline="0"/>
               <a:t>Actual time spent distribution till 3rd March 2012</a:t>
             </a:r>
-            <a:endParaRPr lang="zh-TW" altLang="en-US" sz="2500" baseline="0" dirty="0"/>
+            <a:endParaRPr lang="zh-TW" altLang="zh-TW" sz="2500" b="1" i="0" baseline="0"/>
           </a:p>
         </c:rich>
       </c:tx>
-      <c:layout>
-        <c:manualLayout>
-          <c:xMode val="edge"/>
-          <c:yMode val="edge"/>
-          <c:x val="7.5223218625449617E-2"/>
-          <c:y val="1.6016039017552729E-2"/>
-        </c:manualLayout>
-      </c:layout>
+      <c:layout/>
     </c:title>
-    <c:view3D>
-      <c:rotX val="30"/>
-      <c:perspective val="30"/>
-    </c:view3D>
     <c:plotArea>
       <c:layout/>
-      <c:pie3DChart>
+      <c:pieChart>
         <c:varyColors val="1"/>
         <c:ser>
           <c:idx val="0"/>
           <c:order val="0"/>
-          <c:explosion val="15"/>
           <c:dLbls>
             <c:txPr>
               <a:bodyPr/>
               <a:lstStyle/>
               <a:p>
                 <a:pPr>
-                  <a:defRPr sz="2500" b="1" i="0" u="none" baseline="0"/>
+                  <a:defRPr sz="2000" baseline="0"/>
                 </a:pPr>
                 <a:endParaRPr lang="zh-TW"/>
               </a:p>
@@ -204,25 +192,26 @@
                 <c:formatCode>General</c:formatCode>
                 <c:ptCount val="5"/>
                 <c:pt idx="0">
-                  <c:v>22</c:v>
+                  <c:v>12.5</c:v>
                 </c:pt>
                 <c:pt idx="1">
-                  <c:v>20.5</c:v>
+                  <c:v>15</c:v>
                 </c:pt>
                 <c:pt idx="2">
-                  <c:v>15</c:v>
+                  <c:v>8</c:v>
                 </c:pt>
                 <c:pt idx="3">
-                  <c:v>22.25</c:v>
+                  <c:v>14.75</c:v>
                 </c:pt>
                 <c:pt idx="4">
-                  <c:v>19.75</c:v>
+                  <c:v>12</c:v>
                 </c:pt>
               </c:numCache>
             </c:numRef>
           </c:val>
         </c:ser>
-      </c:pie3DChart>
+        <c:firstSliceAng val="0"/>
+      </c:pieChart>
     </c:plotArea>
     <c:legend>
       <c:legendPos val="r"/>
@@ -230,10 +219,10 @@
         <c:manualLayout>
           <c:xMode val="edge"/>
           <c:yMode val="edge"/>
-          <c:x val="0.81338205988140366"/>
-          <c:y val="0.30463748819864411"/>
-          <c:w val="0.15970151986815601"/>
-          <c:h val="0.42208034806460037"/>
+          <c:x val="0.72001361885616322"/>
+          <c:y val="0.27082634831936347"/>
+          <c:w val="0.18445160964315752"/>
+          <c:h val="0.54069511472356302"/>
         </c:manualLayout>
       </c:layout>
       <c:txPr>
@@ -264,13 +253,13 @@
           <a:lstStyle/>
           <a:p>
             <a:pPr>
-              <a:defRPr/>
+              <a:defRPr sz="2500" baseline="0"/>
             </a:pPr>
             <a:r>
-              <a:rPr lang="en-GB" altLang="zh-TW" sz="2500" baseline="0" dirty="0"/>
-              <a:t>Actual time spent and expected time spent till 8 March</a:t>
-            </a:r>
-            <a:endParaRPr lang="zh-TW" altLang="en-US" sz="2500" baseline="0" dirty="0"/>
+              <a:rPr lang="en-GB" altLang="zh-TW" sz="2500" baseline="0"/>
+              <a:t>Actual time spent and expected time spent till 3 March</a:t>
+            </a:r>
+            <a:endParaRPr lang="zh-TW" altLang="en-US" sz="2500" baseline="0"/>
           </a:p>
         </c:rich>
       </c:tx>
@@ -282,10 +271,10 @@
           <c:layoutTarget val="inner"/>
           <c:xMode val="edge"/>
           <c:yMode val="edge"/>
-          <c:x val="7.2072827060074396E-2"/>
-          <c:y val="0.27141664984184694"/>
-          <c:w val="0.57571131847512302"/>
-          <c:h val="0.55351072086643738"/>
+          <c:x val="6.7119203849518805E-2"/>
+          <c:y val="0.16030545094906615"/>
+          <c:w val="0.65812773403324587"/>
+          <c:h val="0.70810015595876608"/>
         </c:manualLayout>
       </c:layout>
       <c:lineChart>
@@ -307,6 +296,49 @@
           <c:marker>
             <c:symbol val="none"/>
           </c:marker>
+          <c:dLbls>
+            <c:dLbl>
+              <c:idx val="0"/>
+              <c:layout>
+                <c:manualLayout>
+                  <c:x val="1.3888888888888889E-3"/>
+                  <c:y val="4.1095890410958902E-2"/>
+                </c:manualLayout>
+              </c:layout>
+              <c:showVal val="1"/>
+            </c:dLbl>
+            <c:dLbl>
+              <c:idx val="1"/>
+              <c:layout>
+                <c:manualLayout>
+                  <c:x val="5.5555555555555558E-3"/>
+                  <c:y val="1.5981735159817351E-2"/>
+                </c:manualLayout>
+              </c:layout>
+              <c:showVal val="1"/>
+            </c:dLbl>
+            <c:dLbl>
+              <c:idx val="2"/>
+              <c:layout>
+                <c:manualLayout>
+                  <c:x val="-1.8055555555555554E-2"/>
+                  <c:y val="-5.2511415525114152E-2"/>
+                </c:manualLayout>
+              </c:layout>
+              <c:showVal val="1"/>
+            </c:dLbl>
+            <c:txPr>
+              <a:bodyPr/>
+              <a:lstStyle/>
+              <a:p>
+                <a:pPr>
+                  <a:defRPr sz="1500" baseline="0"/>
+                </a:pPr>
+                <a:endParaRPr lang="zh-TW"/>
+              </a:p>
+            </c:txPr>
+            <c:showVal val="1"/>
+          </c:dLbls>
           <c:cat>
             <c:numRef>
               <c:f>Sheet1!$I$2:$L$2</c:f>
@@ -323,7 +355,7 @@
                   <c:v>40962</c:v>
                 </c:pt>
                 <c:pt idx="3">
-                  <c:v>40970</c:v>
+                  <c:v>40971</c:v>
                 </c:pt>
               </c:numCache>
             </c:numRef>
@@ -335,16 +367,16 @@
                 <c:formatCode>General</c:formatCode>
                 <c:ptCount val="4"/>
                 <c:pt idx="0">
-                  <c:v>20</c:v>
+                  <c:v>18.5</c:v>
                 </c:pt>
                 <c:pt idx="1">
-                  <c:v>28.5</c:v>
+                  <c:v>25</c:v>
                 </c:pt>
                 <c:pt idx="2">
-                  <c:v>55.25</c:v>
+                  <c:v>44.75</c:v>
                 </c:pt>
                 <c:pt idx="3">
-                  <c:v>78</c:v>
+                  <c:v>62.25</c:v>
                 </c:pt>
               </c:numCache>
             </c:numRef>
@@ -367,6 +399,39 @@
           <c:marker>
             <c:symbol val="none"/>
           </c:marker>
+          <c:dLbls>
+            <c:dLbl>
+              <c:idx val="0"/>
+              <c:layout>
+                <c:manualLayout>
+                  <c:x val="1.3888888888888889E-3"/>
+                  <c:y val="-3.8812785388127852E-2"/>
+                </c:manualLayout>
+              </c:layout>
+              <c:showVal val="1"/>
+            </c:dLbl>
+            <c:dLbl>
+              <c:idx val="1"/>
+              <c:layout>
+                <c:manualLayout>
+                  <c:x val="-1.3888888888888889E-3"/>
+                  <c:y val="-6.3926940639269486E-2"/>
+                </c:manualLayout>
+              </c:layout>
+              <c:showVal val="1"/>
+            </c:dLbl>
+            <c:txPr>
+              <a:bodyPr/>
+              <a:lstStyle/>
+              <a:p>
+                <a:pPr>
+                  <a:defRPr sz="1500" baseline="0"/>
+                </a:pPr>
+                <a:endParaRPr lang="zh-TW"/>
+              </a:p>
+            </c:txPr>
+            <c:showVal val="1"/>
+          </c:dLbls>
           <c:cat>
             <c:numRef>
               <c:f>Sheet1!$I$2:$L$2</c:f>
@@ -383,7 +448,7 @@
                   <c:v>40962</c:v>
                 </c:pt>
                 <c:pt idx="3">
-                  <c:v>40970</c:v>
+                  <c:v>40971</c:v>
                 </c:pt>
               </c:numCache>
             </c:numRef>
@@ -395,27 +460,27 @@
                 <c:formatCode>General</c:formatCode>
                 <c:ptCount val="4"/>
                 <c:pt idx="0">
-                  <c:v>18</c:v>
+                  <c:v>24</c:v>
                 </c:pt>
                 <c:pt idx="1">
-                  <c:v>28</c:v>
+                  <c:v>27.5</c:v>
                 </c:pt>
                 <c:pt idx="2">
-                  <c:v>44.5</c:v>
+                  <c:v>42</c:v>
                 </c:pt>
                 <c:pt idx="3">
-                  <c:v>80.25</c:v>
+                  <c:v>78</c:v>
                 </c:pt>
               </c:numCache>
             </c:numRef>
           </c:val>
         </c:ser>
         <c:marker val="1"/>
-        <c:axId val="132873216"/>
-        <c:axId val="136695808"/>
+        <c:axId val="36300672"/>
+        <c:axId val="36302208"/>
       </c:lineChart>
       <c:dateAx>
-        <c:axId val="132873216"/>
+        <c:axId val="36300672"/>
         <c:scaling>
           <c:orientation val="minMax"/>
         </c:scaling>
@@ -432,13 +497,13 @@
             <a:endParaRPr lang="zh-TW"/>
           </a:p>
         </c:txPr>
-        <c:crossAx val="136695808"/>
+        <c:crossAx val="36302208"/>
         <c:crosses val="autoZero"/>
         <c:auto val="1"/>
         <c:lblOffset val="100"/>
       </c:dateAx>
       <c:valAx>
-        <c:axId val="136695808"/>
+        <c:axId val="36302208"/>
         <c:scaling>
           <c:orientation val="minMax"/>
         </c:scaling>
@@ -451,12 +516,12 @@
           <a:lstStyle/>
           <a:p>
             <a:pPr>
-              <a:defRPr sz="1500" baseline="0"/>
+              <a:defRPr sz="2000" baseline="0"/>
             </a:pPr>
             <a:endParaRPr lang="zh-TW"/>
           </a:p>
         </c:txPr>
-        <c:crossAx val="132873216"/>
+        <c:crossAx val="36300672"/>
         <c:crosses val="autoZero"/>
         <c:crossBetween val="between"/>
       </c:valAx>
@@ -467,10 +532,10 @@
         <c:manualLayout>
           <c:xMode val="edge"/>
           <c:yMode val="edge"/>
-          <c:x val="0.6910589457567804"/>
-          <c:y val="0.35538536218700867"/>
-          <c:w val="0.27496931224875176"/>
-          <c:h val="0.45994852366225703"/>
+          <c:x val="0.74414523184601911"/>
+          <c:y val="0.38238557509078486"/>
+          <c:w val="0.25429024496937885"/>
+          <c:h val="0.40572825657066841"/>
         </c:manualLayout>
       </c:layout>
       <c:txPr>
@@ -478,7 +543,7 @@
         <a:lstStyle/>
         <a:p>
           <a:pPr>
-            <a:defRPr sz="2000" baseline="0"/>
+            <a:defRPr sz="1800" baseline="0"/>
           </a:pPr>
           <a:endParaRPr lang="zh-TW"/>
         </a:p>
@@ -573,7 +638,7 @@
             <a:fld id="{CE8F3FB3-3A97-408F-8F2C-779D9619247B}" type="datetimeFigureOut">
               <a:rPr lang="en-US" smtClean="0"/>
               <a:pPr/>
-              <a:t>3/8/2012</a:t>
+              <a:t>3/9/2012</a:t>
             </a:fld>
             <a:endParaRPr lang="en-US"/>
           </a:p>
@@ -742,7 +807,7 @@
     </p:spTree>
     <p:extLst>
       <p:ext uri="{BB962C8B-B14F-4D97-AF65-F5344CB8AC3E}">
-        <p14:creationId xmlns:p14="http://schemas.microsoft.com/office/powerpoint/2010/main" xmlns="" val="1229168759"/>
+        <p14:creationId xmlns="" xmlns:p14="http://schemas.microsoft.com/office/powerpoint/2010/main" val="1229168759"/>
       </p:ext>
     </p:extLst>
   </p:cSld>
@@ -929,7 +994,7 @@
     </p:spTree>
     <p:extLst>
       <p:ext uri="{BB962C8B-B14F-4D97-AF65-F5344CB8AC3E}">
-        <p14:creationId xmlns:p14="http://schemas.microsoft.com/office/powerpoint/2010/main" xmlns="" val="558691801"/>
+        <p14:creationId xmlns="" xmlns:p14="http://schemas.microsoft.com/office/powerpoint/2010/main" val="558691801"/>
       </p:ext>
     </p:extLst>
   </p:cSld>
@@ -1121,7 +1186,7 @@
             <a:fld id="{172E3D70-980A-4389-BA3F-762755736F44}" type="datetimeFigureOut">
               <a:rPr lang="en-US" smtClean="0"/>
               <a:pPr/>
-              <a:t>3/8/2012</a:t>
+              <a:t>3/9/2012</a:t>
             </a:fld>
             <a:endParaRPr lang="en-US"/>
           </a:p>
@@ -1173,7 +1238,7 @@
     </p:spTree>
     <p:extLst>
       <p:ext uri="{BB962C8B-B14F-4D97-AF65-F5344CB8AC3E}">
-        <p14:creationId xmlns:p14="http://schemas.microsoft.com/office/powerpoint/2010/main" xmlns="" val="119035379"/>
+        <p14:creationId xmlns="" xmlns:p14="http://schemas.microsoft.com/office/powerpoint/2010/main" val="119035379"/>
       </p:ext>
     </p:extLst>
   </p:cSld>
@@ -1293,7 +1358,7 @@
             <a:fld id="{172E3D70-980A-4389-BA3F-762755736F44}" type="datetimeFigureOut">
               <a:rPr lang="en-US" smtClean="0"/>
               <a:pPr/>
-              <a:t>3/8/2012</a:t>
+              <a:t>3/9/2012</a:t>
             </a:fld>
             <a:endParaRPr lang="en-US"/>
           </a:p>
@@ -1345,7 +1410,7 @@
     </p:spTree>
     <p:extLst>
       <p:ext uri="{BB962C8B-B14F-4D97-AF65-F5344CB8AC3E}">
-        <p14:creationId xmlns:p14="http://schemas.microsoft.com/office/powerpoint/2010/main" xmlns="" val="2066552751"/>
+        <p14:creationId xmlns="" xmlns:p14="http://schemas.microsoft.com/office/powerpoint/2010/main" val="2066552751"/>
       </p:ext>
     </p:extLst>
   </p:cSld>
@@ -1475,7 +1540,7 @@
             <a:fld id="{172E3D70-980A-4389-BA3F-762755736F44}" type="datetimeFigureOut">
               <a:rPr lang="en-US" smtClean="0"/>
               <a:pPr/>
-              <a:t>3/8/2012</a:t>
+              <a:t>3/9/2012</a:t>
             </a:fld>
             <a:endParaRPr lang="en-US"/>
           </a:p>
@@ -1527,7 +1592,7 @@
     </p:spTree>
     <p:extLst>
       <p:ext uri="{BB962C8B-B14F-4D97-AF65-F5344CB8AC3E}">
-        <p14:creationId xmlns:p14="http://schemas.microsoft.com/office/powerpoint/2010/main" xmlns="" val="564968224"/>
+        <p14:creationId xmlns="" xmlns:p14="http://schemas.microsoft.com/office/powerpoint/2010/main" val="564968224"/>
       </p:ext>
     </p:extLst>
   </p:cSld>
@@ -1647,7 +1712,7 @@
             <a:fld id="{172E3D70-980A-4389-BA3F-762755736F44}" type="datetimeFigureOut">
               <a:rPr lang="en-US" smtClean="0"/>
               <a:pPr/>
-              <a:t>3/8/2012</a:t>
+              <a:t>3/9/2012</a:t>
             </a:fld>
             <a:endParaRPr lang="en-US"/>
           </a:p>
@@ -1699,7 +1764,7 @@
     </p:spTree>
     <p:extLst>
       <p:ext uri="{BB962C8B-B14F-4D97-AF65-F5344CB8AC3E}">
-        <p14:creationId xmlns:p14="http://schemas.microsoft.com/office/powerpoint/2010/main" xmlns="" val="1119916372"/>
+        <p14:creationId xmlns="" xmlns:p14="http://schemas.microsoft.com/office/powerpoint/2010/main" val="1119916372"/>
       </p:ext>
     </p:extLst>
   </p:cSld>
@@ -1895,7 +1960,7 @@
             <a:fld id="{172E3D70-980A-4389-BA3F-762755736F44}" type="datetimeFigureOut">
               <a:rPr lang="en-US" smtClean="0"/>
               <a:pPr/>
-              <a:t>3/8/2012</a:t>
+              <a:t>3/9/2012</a:t>
             </a:fld>
             <a:endParaRPr lang="en-US"/>
           </a:p>
@@ -1947,7 +2012,7 @@
     </p:spTree>
     <p:extLst>
       <p:ext uri="{BB962C8B-B14F-4D97-AF65-F5344CB8AC3E}">
-        <p14:creationId xmlns:p14="http://schemas.microsoft.com/office/powerpoint/2010/main" xmlns="" val="3764001431"/>
+        <p14:creationId xmlns="" xmlns:p14="http://schemas.microsoft.com/office/powerpoint/2010/main" val="3764001431"/>
       </p:ext>
     </p:extLst>
   </p:cSld>
@@ -2185,7 +2250,7 @@
             <a:fld id="{172E3D70-980A-4389-BA3F-762755736F44}" type="datetimeFigureOut">
               <a:rPr lang="en-US" smtClean="0"/>
               <a:pPr/>
-              <a:t>3/8/2012</a:t>
+              <a:t>3/9/2012</a:t>
             </a:fld>
             <a:endParaRPr lang="en-US"/>
           </a:p>
@@ -2237,7 +2302,7 @@
     </p:spTree>
     <p:extLst>
       <p:ext uri="{BB962C8B-B14F-4D97-AF65-F5344CB8AC3E}">
-        <p14:creationId xmlns:p14="http://schemas.microsoft.com/office/powerpoint/2010/main" xmlns="" val="2597511228"/>
+        <p14:creationId xmlns="" xmlns:p14="http://schemas.microsoft.com/office/powerpoint/2010/main" val="2597511228"/>
       </p:ext>
     </p:extLst>
   </p:cSld>
@@ -2609,7 +2674,7 @@
             <a:fld id="{172E3D70-980A-4389-BA3F-762755736F44}" type="datetimeFigureOut">
               <a:rPr lang="en-US" smtClean="0"/>
               <a:pPr/>
-              <a:t>3/8/2012</a:t>
+              <a:t>3/9/2012</a:t>
             </a:fld>
             <a:endParaRPr lang="en-US"/>
           </a:p>
@@ -2661,7 +2726,7 @@
     </p:spTree>
     <p:extLst>
       <p:ext uri="{BB962C8B-B14F-4D97-AF65-F5344CB8AC3E}">
-        <p14:creationId xmlns:p14="http://schemas.microsoft.com/office/powerpoint/2010/main" xmlns="" val="2822279431"/>
+        <p14:creationId xmlns="" xmlns:p14="http://schemas.microsoft.com/office/powerpoint/2010/main" val="2822279431"/>
       </p:ext>
     </p:extLst>
   </p:cSld>
@@ -2729,7 +2794,7 @@
             <a:fld id="{172E3D70-980A-4389-BA3F-762755736F44}" type="datetimeFigureOut">
               <a:rPr lang="en-US" smtClean="0"/>
               <a:pPr/>
-              <a:t>3/8/2012</a:t>
+              <a:t>3/9/2012</a:t>
             </a:fld>
             <a:endParaRPr lang="en-US"/>
           </a:p>
@@ -2781,7 +2846,7 @@
     </p:spTree>
     <p:extLst>
       <p:ext uri="{BB962C8B-B14F-4D97-AF65-F5344CB8AC3E}">
-        <p14:creationId xmlns:p14="http://schemas.microsoft.com/office/powerpoint/2010/main" xmlns="" val="3206901730"/>
+        <p14:creationId xmlns="" xmlns:p14="http://schemas.microsoft.com/office/powerpoint/2010/main" val="3206901730"/>
       </p:ext>
     </p:extLst>
   </p:cSld>
@@ -2826,7 +2891,7 @@
             <a:fld id="{172E3D70-980A-4389-BA3F-762755736F44}" type="datetimeFigureOut">
               <a:rPr lang="en-US" smtClean="0"/>
               <a:pPr/>
-              <a:t>3/8/2012</a:t>
+              <a:t>3/9/2012</a:t>
             </a:fld>
             <a:endParaRPr lang="en-US"/>
           </a:p>
@@ -2878,7 +2943,7 @@
     </p:spTree>
     <p:extLst>
       <p:ext uri="{BB962C8B-B14F-4D97-AF65-F5344CB8AC3E}">
-        <p14:creationId xmlns:p14="http://schemas.microsoft.com/office/powerpoint/2010/main" xmlns="" val="2816216539"/>
+        <p14:creationId xmlns="" xmlns:p14="http://schemas.microsoft.com/office/powerpoint/2010/main" val="2816216539"/>
       </p:ext>
     </p:extLst>
   </p:cSld>
@@ -3105,7 +3170,7 @@
             <a:fld id="{172E3D70-980A-4389-BA3F-762755736F44}" type="datetimeFigureOut">
               <a:rPr lang="en-US" smtClean="0"/>
               <a:pPr/>
-              <a:t>3/8/2012</a:t>
+              <a:t>3/9/2012</a:t>
             </a:fld>
             <a:endParaRPr lang="en-US"/>
           </a:p>
@@ -3157,7 +3222,7 @@
     </p:spTree>
     <p:extLst>
       <p:ext uri="{BB962C8B-B14F-4D97-AF65-F5344CB8AC3E}">
-        <p14:creationId xmlns:p14="http://schemas.microsoft.com/office/powerpoint/2010/main" xmlns="" val="1195005641"/>
+        <p14:creationId xmlns="" xmlns:p14="http://schemas.microsoft.com/office/powerpoint/2010/main" val="1195005641"/>
       </p:ext>
     </p:extLst>
   </p:cSld>
@@ -3360,7 +3425,7 @@
             <a:fld id="{172E3D70-980A-4389-BA3F-762755736F44}" type="datetimeFigureOut">
               <a:rPr lang="en-US" smtClean="0"/>
               <a:pPr/>
-              <a:t>3/8/2012</a:t>
+              <a:t>3/9/2012</a:t>
             </a:fld>
             <a:endParaRPr lang="en-US"/>
           </a:p>
@@ -3412,7 +3477,7 @@
     </p:spTree>
     <p:extLst>
       <p:ext uri="{BB962C8B-B14F-4D97-AF65-F5344CB8AC3E}">
-        <p14:creationId xmlns:p14="http://schemas.microsoft.com/office/powerpoint/2010/main" xmlns="" val="82865573"/>
+        <p14:creationId xmlns="" xmlns:p14="http://schemas.microsoft.com/office/powerpoint/2010/main" val="82865573"/>
       </p:ext>
     </p:extLst>
   </p:cSld>
@@ -3575,7 +3640,7 @@
             <a:fld id="{172E3D70-980A-4389-BA3F-762755736F44}" type="datetimeFigureOut">
               <a:rPr lang="en-US" smtClean="0"/>
               <a:pPr/>
-              <a:t>3/8/2012</a:t>
+              <a:t>3/9/2012</a:t>
             </a:fld>
             <a:endParaRPr lang="en-US"/>
           </a:p>
@@ -3663,7 +3728,7 @@
     </p:spTree>
     <p:extLst>
       <p:ext uri="{BB962C8B-B14F-4D97-AF65-F5344CB8AC3E}">
-        <p14:creationId xmlns:p14="http://schemas.microsoft.com/office/powerpoint/2010/main" xmlns="" val="2173925321"/>
+        <p14:creationId xmlns="" xmlns:p14="http://schemas.microsoft.com/office/powerpoint/2010/main" val="2173925321"/>
       </p:ext>
     </p:extLst>
   </p:cSld>
@@ -4000,7 +4065,7 @@
     </p:spTree>
     <p:extLst>
       <p:ext uri="{BB962C8B-B14F-4D97-AF65-F5344CB8AC3E}">
-        <p14:creationId xmlns:p14="http://schemas.microsoft.com/office/powerpoint/2010/main" xmlns="" val="1786804303"/>
+        <p14:creationId xmlns="" xmlns:p14="http://schemas.microsoft.com/office/powerpoint/2010/main" val="1786804303"/>
       </p:ext>
     </p:extLst>
   </p:cSld>
@@ -4118,7 +4183,7 @@
     </p:spTree>
     <p:extLst>
       <p:ext uri="{BB962C8B-B14F-4D97-AF65-F5344CB8AC3E}">
-        <p14:creationId xmlns:p14="http://schemas.microsoft.com/office/powerpoint/2010/main" xmlns="" val="3707052916"/>
+        <p14:creationId xmlns="" xmlns:p14="http://schemas.microsoft.com/office/powerpoint/2010/main" val="3707052916"/>
       </p:ext>
     </p:extLst>
   </p:cSld>
@@ -4271,7 +4336,7 @@
     </p:spTree>
     <p:extLst>
       <p:ext uri="{BB962C8B-B14F-4D97-AF65-F5344CB8AC3E}">
-        <p14:creationId xmlns:p14="http://schemas.microsoft.com/office/powerpoint/2010/main" xmlns="" val="2599285141"/>
+        <p14:creationId xmlns="" xmlns:p14="http://schemas.microsoft.com/office/powerpoint/2010/main" val="2599285141"/>
       </p:ext>
     </p:extLst>
   </p:cSld>
@@ -4384,7 +4449,7 @@
     </p:spTree>
     <p:extLst>
       <p:ext uri="{BB962C8B-B14F-4D97-AF65-F5344CB8AC3E}">
-        <p14:creationId xmlns:p14="http://schemas.microsoft.com/office/powerpoint/2010/main" xmlns="" val="1684329172"/>
+        <p14:creationId xmlns="" xmlns:p14="http://schemas.microsoft.com/office/powerpoint/2010/main" val="1684329172"/>
       </p:ext>
     </p:extLst>
   </p:cSld>
@@ -4475,7 +4540,7 @@
     </p:spTree>
     <p:extLst>
       <p:ext uri="{BB962C8B-B14F-4D97-AF65-F5344CB8AC3E}">
-        <p14:creationId xmlns:p14="http://schemas.microsoft.com/office/powerpoint/2010/main" xmlns="" val="3359560538"/>
+        <p14:creationId xmlns="" xmlns:p14="http://schemas.microsoft.com/office/powerpoint/2010/main" val="3359560538"/>
       </p:ext>
     </p:extLst>
   </p:cSld>
@@ -4579,7 +4644,7 @@
     </p:spTree>
     <p:extLst>
       <p:ext uri="{BB962C8B-B14F-4D97-AF65-F5344CB8AC3E}">
-        <p14:creationId xmlns:p14="http://schemas.microsoft.com/office/powerpoint/2010/main" xmlns="" val="869076350"/>
+        <p14:creationId xmlns="" xmlns:p14="http://schemas.microsoft.com/office/powerpoint/2010/main" val="869076350"/>
       </p:ext>
     </p:extLst>
   </p:cSld>
@@ -4682,7 +4747,7 @@
     </p:spTree>
     <p:extLst>
       <p:ext uri="{BB962C8B-B14F-4D97-AF65-F5344CB8AC3E}">
-        <p14:creationId xmlns:p14="http://schemas.microsoft.com/office/powerpoint/2010/main" xmlns="" val="68516678"/>
+        <p14:creationId xmlns="" xmlns:p14="http://schemas.microsoft.com/office/powerpoint/2010/main" val="68516678"/>
       </p:ext>
     </p:extLst>
   </p:cSld>
@@ -4726,7 +4791,12 @@
             <p:ph type="title"/>
           </p:nvPr>
         </p:nvSpPr>
-        <p:spPr/>
+        <p:spPr>
+          <a:xfrm>
+            <a:off x="457200" y="0"/>
+            <a:ext cx="8229600" cy="1143000"/>
+          </a:xfrm>
+        </p:spPr>
         <p:txBody>
           <a:bodyPr/>
           <a:lstStyle/>
@@ -4741,17 +4811,13 @@
       </p:sp>
       <p:graphicFrame>
         <p:nvGraphicFramePr>
-          <p:cNvPr id="7" name="內容版面配置區 6"/>
-          <p:cNvGraphicFramePr>
-            <a:graphicFrameLocks noGrp="1"/>
-          </p:cNvGraphicFramePr>
-          <p:nvPr>
-            <p:ph idx="1"/>
-          </p:nvPr>
+          <p:cNvPr id="5" name="圖表 4"/>
+          <p:cNvGraphicFramePr/>
+          <p:nvPr/>
         </p:nvGraphicFramePr>
         <p:xfrm>
-          <a:off x="457200" y="1600200"/>
-          <a:ext cx="8229600" cy="4525963"/>
+          <a:off x="457200" y="1295400"/>
+          <a:ext cx="8458200" cy="5105400"/>
         </p:xfrm>
         <a:graphic>
           <a:graphicData uri="http://schemas.openxmlformats.org/drawingml/2006/chart">
@@ -4759,10 +4825,84 @@
           </a:graphicData>
         </a:graphic>
       </p:graphicFrame>
+      <p:sp>
+        <p:nvSpPr>
+          <p:cNvPr id="6" name="Title 1"/>
+          <p:cNvSpPr txBox="1">
+            <a:spLocks/>
+          </p:cNvSpPr>
+          <p:nvPr/>
+        </p:nvSpPr>
+        <p:spPr>
+          <a:xfrm>
+            <a:off x="0" y="6096000"/>
+            <a:ext cx="4191000" cy="762000"/>
+          </a:xfrm>
+          <a:prstGeom prst="rect">
+            <a:avLst/>
+          </a:prstGeom>
+        </p:spPr>
+        <p:txBody>
+          <a:bodyPr vert="horz" lIns="91440" tIns="45720" rIns="91440" bIns="45720" rtlCol="0" anchor="ctr">
+            <a:normAutofit/>
+          </a:bodyPr>
+          <a:lstStyle/>
+          <a:p>
+            <a:pPr marL="0" marR="0" lvl="0" indent="0" algn="ctr" defTabSz="914400" rtl="0" eaLnBrk="1" fontAlgn="auto" latinLnBrk="0" hangingPunct="1">
+              <a:lnSpc>
+                <a:spcPct val="100000"/>
+              </a:lnSpc>
+              <a:spcBef>
+                <a:spcPct val="0"/>
+              </a:spcBef>
+              <a:spcAft>
+                <a:spcPts val="0"/>
+              </a:spcAft>
+              <a:buClrTx/>
+              <a:buSzTx/>
+              <a:buFontTx/>
+              <a:buNone/>
+              <a:tabLst/>
+              <a:defRPr/>
+            </a:pPr>
+            <a:r>
+              <a:rPr kumimoji="0" lang="en-US" sz="2000" b="0" i="0" u="none" strike="noStrike" kern="1200" cap="none" spc="0" normalizeH="0" baseline="0" noProof="0" dirty="0" smtClean="0">
+                <a:ln>
+                  <a:noFill/>
+                </a:ln>
+                <a:solidFill>
+                  <a:schemeClr val="tx1"/>
+                </a:solidFill>
+                <a:effectLst/>
+                <a:uLnTx/>
+                <a:uFillTx/>
+                <a:latin typeface="+mj-lt"/>
+                <a:ea typeface="+mj-ea"/>
+                <a:cs typeface="+mj-cs"/>
+              </a:rPr>
+              <a:t>P.S. Expected time spent / Person : 16</a:t>
+            </a:r>
+            <a:endParaRPr kumimoji="0" lang="en-US" sz="2000" b="0" i="0" u="none" strike="noStrike" kern="1200" cap="none" spc="0" normalizeH="0" baseline="0" noProof="0" dirty="0">
+              <a:ln>
+                <a:noFill/>
+              </a:ln>
+              <a:solidFill>
+                <a:schemeClr val="tx1"/>
+              </a:solidFill>
+              <a:effectLst/>
+              <a:uLnTx/>
+              <a:uFillTx/>
+              <a:latin typeface="+mj-lt"/>
+              <a:ea typeface="+mj-ea"/>
+              <a:cs typeface="+mj-cs"/>
+            </a:endParaRPr>
+          </a:p>
+        </p:txBody>
+      </p:sp>
     </p:spTree>
     <p:extLst>
       <p:ext uri="{BB962C8B-B14F-4D97-AF65-F5344CB8AC3E}">
-        <p14:creationId xmlns:p14="http://schemas.microsoft.com/office/powerpoint/2010/main" xmlns="" val="3838499978"/>
+        <p14:creationId xmlns="" xmlns:p14="http://schemas.microsoft.com/office/powerpoint/2010/main" val="3838499978"/>
       </p:ext>
     </p:extLst>
   </p:cSld>
@@ -4806,7 +4946,12 @@
             <p:ph type="title"/>
           </p:nvPr>
         </p:nvSpPr>
-        <p:spPr/>
+        <p:spPr>
+          <a:xfrm>
+            <a:off x="457200" y="0"/>
+            <a:ext cx="8229600" cy="1143000"/>
+          </a:xfrm>
+        </p:spPr>
         <p:txBody>
           <a:bodyPr/>
           <a:lstStyle/>
@@ -4821,7 +4966,7 @@
       </p:sp>
       <p:graphicFrame>
         <p:nvGraphicFramePr>
-          <p:cNvPr id="4" name="內容版面配置區 3"/>
+          <p:cNvPr id="6" name="內容版面配置區 5"/>
           <p:cNvGraphicFramePr>
             <a:graphicFrameLocks noGrp="1"/>
           </p:cNvGraphicFramePr>
@@ -4830,8 +4975,8 @@
           </p:nvPr>
         </p:nvGraphicFramePr>
         <p:xfrm>
-          <a:off x="0" y="1600200"/>
-          <a:ext cx="9144000" cy="4525963"/>
+          <a:off x="0" y="1066800"/>
+          <a:ext cx="9144000" cy="5562600"/>
         </p:xfrm>
         <a:graphic>
           <a:graphicData uri="http://schemas.openxmlformats.org/drawingml/2006/chart">
@@ -4842,7 +4987,7 @@
     </p:spTree>
     <p:extLst>
       <p:ext uri="{BB962C8B-B14F-4D97-AF65-F5344CB8AC3E}">
-        <p14:creationId xmlns:p14="http://schemas.microsoft.com/office/powerpoint/2010/main" xmlns="" val="520266324"/>
+        <p14:creationId xmlns="" xmlns:p14="http://schemas.microsoft.com/office/powerpoint/2010/main" val="520266324"/>
       </p:ext>
     </p:extLst>
   </p:cSld>

</xml_diff>

<commit_message>
Added new Gantt Chart
</commit_message>
<xml_diff>
--- a/doc/D2/Slides.pptx
+++ b/doc/D2/Slides.pptx
@@ -5,7 +5,7 @@
     <p:sldMasterId id="2147483756" r:id="rId1"/>
   </p:sldMasterIdLst>
   <p:notesMasterIdLst>
-    <p:notesMasterId r:id="rId12"/>
+    <p:notesMasterId r:id="rId13"/>
   </p:notesMasterIdLst>
   <p:sldIdLst>
     <p:sldId id="256" r:id="rId2"/>
@@ -16,8 +16,9 @@
     <p:sldId id="262" r:id="rId7"/>
     <p:sldId id="266" r:id="rId8"/>
     <p:sldId id="263" r:id="rId9"/>
-    <p:sldId id="264" r:id="rId10"/>
-    <p:sldId id="265" r:id="rId11"/>
+    <p:sldId id="267" r:id="rId10"/>
+    <p:sldId id="264" r:id="rId11"/>
+    <p:sldId id="265" r:id="rId12"/>
   </p:sldIdLst>
   <p:sldSz cx="9144000" cy="6858000" type="screen4x3"/>
   <p:notesSz cx="6858000" cy="9144000"/>
@@ -569,11 +570,11 @@
         </c:dLbls>
         <c:marker val="1"/>
         <c:smooth val="0"/>
-        <c:axId val="172599552"/>
-        <c:axId val="173146112"/>
+        <c:axId val="52937088"/>
+        <c:axId val="52938624"/>
       </c:lineChart>
       <c:dateAx>
-        <c:axId val="172599552"/>
+        <c:axId val="52937088"/>
         <c:scaling>
           <c:orientation val="minMax"/>
         </c:scaling>
@@ -593,14 +594,14 @@
             <a:endParaRPr lang="en-US"/>
           </a:p>
         </c:txPr>
-        <c:crossAx val="173146112"/>
+        <c:crossAx val="52938624"/>
         <c:crosses val="autoZero"/>
         <c:auto val="1"/>
         <c:lblOffset val="100"/>
         <c:baseTimeUnit val="days"/>
       </c:dateAx>
       <c:valAx>
-        <c:axId val="173146112"/>
+        <c:axId val="52938624"/>
         <c:scaling>
           <c:orientation val="minMax"/>
         </c:scaling>
@@ -621,7 +622,7 @@
             <a:endParaRPr lang="en-US"/>
           </a:p>
         </c:txPr>
-        <c:crossAx val="172599552"/>
+        <c:crossAx val="52937088"/>
         <c:crosses val="autoZero"/>
         <c:crossBetween val="between"/>
       </c:valAx>
@@ -743,7 +744,7 @@
             <a:fld id="{CE8F3FB3-3A97-408F-8F2C-779D9619247B}" type="datetimeFigureOut">
               <a:rPr lang="en-US" smtClean="0"/>
               <a:pPr/>
-              <a:t>3/11/2012</a:t>
+              <a:t>3/13/2012</a:t>
             </a:fld>
             <a:endParaRPr lang="en-US"/>
           </a:p>
@@ -1291,7 +1292,7 @@
             <a:fld id="{172E3D70-980A-4389-BA3F-762755736F44}" type="datetimeFigureOut">
               <a:rPr lang="en-US" smtClean="0"/>
               <a:pPr/>
-              <a:t>3/11/2012</a:t>
+              <a:t>3/13/2012</a:t>
             </a:fld>
             <a:endParaRPr lang="en-US"/>
           </a:p>
@@ -1350,11 +1351,11 @@
   <p:clrMapOvr>
     <a:masterClrMapping/>
   </p:clrMapOvr>
-  <mc:AlternateContent xmlns:mc="http://schemas.openxmlformats.org/markup-compatibility/2006">
-    <mc:Choice xmlns:p14="http://schemas.microsoft.com/office/powerpoint/2010/main" Requires="p14">
+  <mc:AlternateContent xmlns:mc="http://schemas.openxmlformats.org/markup-compatibility/2006" xmlns:p14="http://schemas.microsoft.com/office/powerpoint/2010/main">
+    <mc:Choice Requires="p14">
       <p:transition p14:dur="0"/>
     </mc:Choice>
-    <mc:Fallback>
+    <mc:Fallback xmlns="">
       <p:transition/>
     </mc:Fallback>
   </mc:AlternateContent>
@@ -1471,7 +1472,7 @@
             <a:fld id="{172E3D70-980A-4389-BA3F-762755736F44}" type="datetimeFigureOut">
               <a:rPr lang="en-US" smtClean="0"/>
               <a:pPr/>
-              <a:t>3/11/2012</a:t>
+              <a:t>3/13/2012</a:t>
             </a:fld>
             <a:endParaRPr lang="en-US"/>
           </a:p>
@@ -1530,11 +1531,11 @@
   <p:clrMapOvr>
     <a:masterClrMapping/>
   </p:clrMapOvr>
-  <mc:AlternateContent xmlns:mc="http://schemas.openxmlformats.org/markup-compatibility/2006">
-    <mc:Choice xmlns:p14="http://schemas.microsoft.com/office/powerpoint/2010/main" Requires="p14">
+  <mc:AlternateContent xmlns:mc="http://schemas.openxmlformats.org/markup-compatibility/2006" xmlns:p14="http://schemas.microsoft.com/office/powerpoint/2010/main">
+    <mc:Choice Requires="p14">
       <p:transition p14:dur="0"/>
     </mc:Choice>
-    <mc:Fallback>
+    <mc:Fallback xmlns="">
       <p:transition/>
     </mc:Fallback>
   </mc:AlternateContent>
@@ -1661,7 +1662,7 @@
             <a:fld id="{172E3D70-980A-4389-BA3F-762755736F44}" type="datetimeFigureOut">
               <a:rPr lang="en-US" smtClean="0"/>
               <a:pPr/>
-              <a:t>3/11/2012</a:t>
+              <a:t>3/13/2012</a:t>
             </a:fld>
             <a:endParaRPr lang="en-US"/>
           </a:p>
@@ -1720,11 +1721,11 @@
   <p:clrMapOvr>
     <a:masterClrMapping/>
   </p:clrMapOvr>
-  <mc:AlternateContent xmlns:mc="http://schemas.openxmlformats.org/markup-compatibility/2006">
-    <mc:Choice xmlns:p14="http://schemas.microsoft.com/office/powerpoint/2010/main" Requires="p14">
+  <mc:AlternateContent xmlns:mc="http://schemas.openxmlformats.org/markup-compatibility/2006" xmlns:p14="http://schemas.microsoft.com/office/powerpoint/2010/main">
+    <mc:Choice Requires="p14">
       <p:transition p14:dur="0"/>
     </mc:Choice>
-    <mc:Fallback>
+    <mc:Fallback xmlns="">
       <p:transition/>
     </mc:Fallback>
   </mc:AlternateContent>
@@ -1841,7 +1842,7 @@
             <a:fld id="{172E3D70-980A-4389-BA3F-762755736F44}" type="datetimeFigureOut">
               <a:rPr lang="en-US" smtClean="0"/>
               <a:pPr/>
-              <a:t>3/11/2012</a:t>
+              <a:t>3/13/2012</a:t>
             </a:fld>
             <a:endParaRPr lang="en-US"/>
           </a:p>
@@ -1900,11 +1901,11 @@
   <p:clrMapOvr>
     <a:masterClrMapping/>
   </p:clrMapOvr>
-  <mc:AlternateContent xmlns:mc="http://schemas.openxmlformats.org/markup-compatibility/2006">
-    <mc:Choice xmlns:p14="http://schemas.microsoft.com/office/powerpoint/2010/main" Requires="p14">
+  <mc:AlternateContent xmlns:mc="http://schemas.openxmlformats.org/markup-compatibility/2006" xmlns:p14="http://schemas.microsoft.com/office/powerpoint/2010/main">
+    <mc:Choice Requires="p14">
       <p:transition p14:dur="0"/>
     </mc:Choice>
-    <mc:Fallback>
+    <mc:Fallback xmlns="">
       <p:transition/>
     </mc:Fallback>
   </mc:AlternateContent>
@@ -2097,7 +2098,7 @@
             <a:fld id="{172E3D70-980A-4389-BA3F-762755736F44}" type="datetimeFigureOut">
               <a:rPr lang="en-US" smtClean="0"/>
               <a:pPr/>
-              <a:t>3/11/2012</a:t>
+              <a:t>3/13/2012</a:t>
             </a:fld>
             <a:endParaRPr lang="en-US"/>
           </a:p>
@@ -2156,11 +2157,11 @@
   <p:clrMapOvr>
     <a:masterClrMapping/>
   </p:clrMapOvr>
-  <mc:AlternateContent xmlns:mc="http://schemas.openxmlformats.org/markup-compatibility/2006">
-    <mc:Choice xmlns:p14="http://schemas.microsoft.com/office/powerpoint/2010/main" Requires="p14">
+  <mc:AlternateContent xmlns:mc="http://schemas.openxmlformats.org/markup-compatibility/2006" xmlns:p14="http://schemas.microsoft.com/office/powerpoint/2010/main">
+    <mc:Choice Requires="p14">
       <p:transition p14:dur="0"/>
     </mc:Choice>
-    <mc:Fallback>
+    <mc:Fallback xmlns="">
       <p:transition/>
     </mc:Fallback>
   </mc:AlternateContent>
@@ -2395,7 +2396,7 @@
             <a:fld id="{172E3D70-980A-4389-BA3F-762755736F44}" type="datetimeFigureOut">
               <a:rPr lang="en-US" smtClean="0"/>
               <a:pPr/>
-              <a:t>3/11/2012</a:t>
+              <a:t>3/13/2012</a:t>
             </a:fld>
             <a:endParaRPr lang="en-US"/>
           </a:p>
@@ -2454,11 +2455,11 @@
   <p:clrMapOvr>
     <a:masterClrMapping/>
   </p:clrMapOvr>
-  <mc:AlternateContent xmlns:mc="http://schemas.openxmlformats.org/markup-compatibility/2006">
-    <mc:Choice xmlns:p14="http://schemas.microsoft.com/office/powerpoint/2010/main" Requires="p14">
+  <mc:AlternateContent xmlns:mc="http://schemas.openxmlformats.org/markup-compatibility/2006" xmlns:p14="http://schemas.microsoft.com/office/powerpoint/2010/main">
+    <mc:Choice Requires="p14">
       <p:transition p14:dur="0"/>
     </mc:Choice>
-    <mc:Fallback>
+    <mc:Fallback xmlns="">
       <p:transition/>
     </mc:Fallback>
   </mc:AlternateContent>
@@ -2827,7 +2828,7 @@
             <a:fld id="{172E3D70-980A-4389-BA3F-762755736F44}" type="datetimeFigureOut">
               <a:rPr lang="en-US" smtClean="0"/>
               <a:pPr/>
-              <a:t>3/11/2012</a:t>
+              <a:t>3/13/2012</a:t>
             </a:fld>
             <a:endParaRPr lang="en-US"/>
           </a:p>
@@ -2886,11 +2887,11 @@
   <p:clrMapOvr>
     <a:masterClrMapping/>
   </p:clrMapOvr>
-  <mc:AlternateContent xmlns:mc="http://schemas.openxmlformats.org/markup-compatibility/2006">
-    <mc:Choice xmlns:p14="http://schemas.microsoft.com/office/powerpoint/2010/main" Requires="p14">
+  <mc:AlternateContent xmlns:mc="http://schemas.openxmlformats.org/markup-compatibility/2006" xmlns:p14="http://schemas.microsoft.com/office/powerpoint/2010/main">
+    <mc:Choice Requires="p14">
       <p:transition p14:dur="0"/>
     </mc:Choice>
-    <mc:Fallback>
+    <mc:Fallback xmlns="">
       <p:transition/>
     </mc:Fallback>
   </mc:AlternateContent>
@@ -2955,7 +2956,7 @@
             <a:fld id="{172E3D70-980A-4389-BA3F-762755736F44}" type="datetimeFigureOut">
               <a:rPr lang="en-US" smtClean="0"/>
               <a:pPr/>
-              <a:t>3/11/2012</a:t>
+              <a:t>3/13/2012</a:t>
             </a:fld>
             <a:endParaRPr lang="en-US"/>
           </a:p>
@@ -3014,11 +3015,11 @@
   <p:clrMapOvr>
     <a:masterClrMapping/>
   </p:clrMapOvr>
-  <mc:AlternateContent xmlns:mc="http://schemas.openxmlformats.org/markup-compatibility/2006">
-    <mc:Choice xmlns:p14="http://schemas.microsoft.com/office/powerpoint/2010/main" Requires="p14">
+  <mc:AlternateContent xmlns:mc="http://schemas.openxmlformats.org/markup-compatibility/2006" xmlns:p14="http://schemas.microsoft.com/office/powerpoint/2010/main">
+    <mc:Choice Requires="p14">
       <p:transition p14:dur="0"/>
     </mc:Choice>
-    <mc:Fallback>
+    <mc:Fallback xmlns="">
       <p:transition/>
     </mc:Fallback>
   </mc:AlternateContent>
@@ -3060,7 +3061,7 @@
             <a:fld id="{172E3D70-980A-4389-BA3F-762755736F44}" type="datetimeFigureOut">
               <a:rPr lang="en-US" smtClean="0"/>
               <a:pPr/>
-              <a:t>3/11/2012</a:t>
+              <a:t>3/13/2012</a:t>
             </a:fld>
             <a:endParaRPr lang="en-US"/>
           </a:p>
@@ -3119,11 +3120,11 @@
   <p:clrMapOvr>
     <a:masterClrMapping/>
   </p:clrMapOvr>
-  <mc:AlternateContent xmlns:mc="http://schemas.openxmlformats.org/markup-compatibility/2006">
-    <mc:Choice xmlns:p14="http://schemas.microsoft.com/office/powerpoint/2010/main" Requires="p14">
+  <mc:AlternateContent xmlns:mc="http://schemas.openxmlformats.org/markup-compatibility/2006" xmlns:p14="http://schemas.microsoft.com/office/powerpoint/2010/main">
+    <mc:Choice Requires="p14">
       <p:transition p14:dur="0"/>
     </mc:Choice>
-    <mc:Fallback>
+    <mc:Fallback xmlns="">
       <p:transition/>
     </mc:Fallback>
   </mc:AlternateContent>
@@ -3347,7 +3348,7 @@
             <a:fld id="{172E3D70-980A-4389-BA3F-762755736F44}" type="datetimeFigureOut">
               <a:rPr lang="en-US" smtClean="0"/>
               <a:pPr/>
-              <a:t>3/11/2012</a:t>
+              <a:t>3/13/2012</a:t>
             </a:fld>
             <a:endParaRPr lang="en-US"/>
           </a:p>
@@ -3406,11 +3407,11 @@
   <p:clrMapOvr>
     <a:masterClrMapping/>
   </p:clrMapOvr>
-  <mc:AlternateContent xmlns:mc="http://schemas.openxmlformats.org/markup-compatibility/2006">
-    <mc:Choice xmlns:p14="http://schemas.microsoft.com/office/powerpoint/2010/main" Requires="p14">
+  <mc:AlternateContent xmlns:mc="http://schemas.openxmlformats.org/markup-compatibility/2006" xmlns:p14="http://schemas.microsoft.com/office/powerpoint/2010/main">
+    <mc:Choice Requires="p14">
       <p:transition p14:dur="0"/>
     </mc:Choice>
-    <mc:Fallback>
+    <mc:Fallback xmlns="">
       <p:transition/>
     </mc:Fallback>
   </mc:AlternateContent>
@@ -3610,7 +3611,7 @@
             <a:fld id="{172E3D70-980A-4389-BA3F-762755736F44}" type="datetimeFigureOut">
               <a:rPr lang="en-US" smtClean="0"/>
               <a:pPr/>
-              <a:t>3/11/2012</a:t>
+              <a:t>3/13/2012</a:t>
             </a:fld>
             <a:endParaRPr lang="en-US"/>
           </a:p>
@@ -3669,11 +3670,11 @@
   <p:clrMapOvr>
     <a:masterClrMapping/>
   </p:clrMapOvr>
-  <mc:AlternateContent xmlns:mc="http://schemas.openxmlformats.org/markup-compatibility/2006">
-    <mc:Choice xmlns:p14="http://schemas.microsoft.com/office/powerpoint/2010/main" Requires="p14">
+  <mc:AlternateContent xmlns:mc="http://schemas.openxmlformats.org/markup-compatibility/2006" xmlns:p14="http://schemas.microsoft.com/office/powerpoint/2010/main">
+    <mc:Choice Requires="p14">
       <p:transition p14:dur="0"/>
     </mc:Choice>
-    <mc:Fallback>
+    <mc:Fallback xmlns="">
       <p:transition/>
     </mc:Fallback>
   </mc:AlternateContent>
@@ -3851,7 +3852,7 @@
             <a:fld id="{172E3D70-980A-4389-BA3F-762755736F44}" type="datetimeFigureOut">
               <a:rPr lang="en-US" smtClean="0"/>
               <a:pPr/>
-              <a:t>3/11/2012</a:t>
+              <a:t>3/13/2012</a:t>
             </a:fld>
             <a:endParaRPr lang="en-US"/>
           </a:p>
@@ -3957,11 +3958,11 @@
     <p:sldLayoutId id="2147483766" r:id="rId10"/>
     <p:sldLayoutId id="2147483767" r:id="rId11"/>
   </p:sldLayoutIdLst>
-  <mc:AlternateContent xmlns:mc="http://schemas.openxmlformats.org/markup-compatibility/2006">
-    <mc:Choice xmlns:p14="http://schemas.microsoft.com/office/powerpoint/2010/main" Requires="p14">
+  <mc:AlternateContent xmlns:mc="http://schemas.openxmlformats.org/markup-compatibility/2006" xmlns:p14="http://schemas.microsoft.com/office/powerpoint/2010/main">
+    <mc:Choice Requires="p14">
       <p:transition p14:dur="0"/>
     </mc:Choice>
-    <mc:Fallback>
+    <mc:Fallback xmlns="">
       <p:transition/>
     </mc:Fallback>
   </mc:AlternateContent>
@@ -4280,11 +4281,7 @@
           <a:p>
             <a:r>
               <a:rPr lang="en-US" dirty="0" smtClean="0"/>
-              <a:t>Group </a:t>
-            </a:r>
-            <a:r>
-              <a:rPr lang="en-US" dirty="0" smtClean="0"/>
-              <a:t>9</a:t>
+              <a:t>Group 9</a:t>
             </a:r>
           </a:p>
           <a:p>
@@ -4322,11 +4319,11 @@
   <p:clrMapOvr>
     <a:masterClrMapping/>
   </p:clrMapOvr>
-  <mc:AlternateContent xmlns:mc="http://schemas.openxmlformats.org/markup-compatibility/2006">
-    <mc:Choice xmlns:p14="http://schemas.microsoft.com/office/powerpoint/2010/main" Requires="p14">
+  <mc:AlternateContent xmlns:mc="http://schemas.openxmlformats.org/markup-compatibility/2006" xmlns:p14="http://schemas.microsoft.com/office/powerpoint/2010/main">
+    <mc:Choice Requires="p14">
       <p:transition p14:dur="0"/>
     </mc:Choice>
-    <mc:Fallback>
+    <mc:Fallback xmlns="">
       <p:transition/>
     </mc:Fallback>
   </mc:AlternateContent>
@@ -4387,6 +4384,169 @@
       </p:sp>
       <p:graphicFrame>
         <p:nvGraphicFramePr>
+          <p:cNvPr id="5" name="圖表 4"/>
+          <p:cNvGraphicFramePr/>
+          <p:nvPr/>
+        </p:nvGraphicFramePr>
+        <p:xfrm>
+          <a:off x="457200" y="1295400"/>
+          <a:ext cx="8458200" cy="5105400"/>
+        </p:xfrm>
+        <a:graphic>
+          <a:graphicData uri="http://schemas.openxmlformats.org/drawingml/2006/chart">
+            <c:chart xmlns:c="http://schemas.openxmlformats.org/drawingml/2006/chart" xmlns:r="http://schemas.openxmlformats.org/officeDocument/2006/relationships" r:id="rId2"/>
+          </a:graphicData>
+        </a:graphic>
+      </p:graphicFrame>
+      <p:sp>
+        <p:nvSpPr>
+          <p:cNvPr id="6" name="Title 1"/>
+          <p:cNvSpPr txBox="1">
+            <a:spLocks/>
+          </p:cNvSpPr>
+          <p:nvPr/>
+        </p:nvSpPr>
+        <p:spPr>
+          <a:xfrm>
+            <a:off x="0" y="6096000"/>
+            <a:ext cx="4191000" cy="762000"/>
+          </a:xfrm>
+          <a:prstGeom prst="rect">
+            <a:avLst/>
+          </a:prstGeom>
+        </p:spPr>
+        <p:txBody>
+          <a:bodyPr vert="horz" lIns="91440" tIns="45720" rIns="91440" bIns="45720" rtlCol="0" anchor="ctr">
+            <a:normAutofit/>
+          </a:bodyPr>
+          <a:lstStyle/>
+          <a:p>
+            <a:pPr marL="0" marR="0" lvl="0" indent="0" algn="ctr" defTabSz="914400" rtl="0" eaLnBrk="1" fontAlgn="auto" latinLnBrk="0" hangingPunct="1">
+              <a:lnSpc>
+                <a:spcPct val="100000"/>
+              </a:lnSpc>
+              <a:spcBef>
+                <a:spcPct val="0"/>
+              </a:spcBef>
+              <a:spcAft>
+                <a:spcPts val="0"/>
+              </a:spcAft>
+              <a:buClrTx/>
+              <a:buSzTx/>
+              <a:buFontTx/>
+              <a:buNone/>
+              <a:tabLst/>
+              <a:defRPr/>
+            </a:pPr>
+            <a:r>
+              <a:rPr kumimoji="0" lang="en-US" sz="2000" b="0" i="0" u="none" strike="noStrike" kern="1200" cap="none" spc="0" normalizeH="0" baseline="0" noProof="0" dirty="0" smtClean="0">
+                <a:ln>
+                  <a:noFill/>
+                </a:ln>
+                <a:solidFill>
+                  <a:schemeClr val="tx1"/>
+                </a:solidFill>
+                <a:effectLst/>
+                <a:uLnTx/>
+                <a:uFillTx/>
+                <a:latin typeface="+mj-lt"/>
+                <a:ea typeface="+mj-ea"/>
+                <a:cs typeface="+mj-cs"/>
+              </a:rPr>
+              <a:t>P.S. Expected time spent / Person : 16</a:t>
+            </a:r>
+            <a:endParaRPr kumimoji="0" lang="en-US" sz="2000" b="0" i="0" u="none" strike="noStrike" kern="1200" cap="none" spc="0" normalizeH="0" baseline="0" noProof="0" dirty="0">
+              <a:ln>
+                <a:noFill/>
+              </a:ln>
+              <a:solidFill>
+                <a:schemeClr val="tx1"/>
+              </a:solidFill>
+              <a:effectLst/>
+              <a:uLnTx/>
+              <a:uFillTx/>
+              <a:latin typeface="+mj-lt"/>
+              <a:ea typeface="+mj-ea"/>
+              <a:cs typeface="+mj-cs"/>
+            </a:endParaRPr>
+          </a:p>
+        </p:txBody>
+      </p:sp>
+    </p:spTree>
+    <p:extLst>
+      <p:ext uri="{BB962C8B-B14F-4D97-AF65-F5344CB8AC3E}">
+        <p14:creationId xmlns:p14="http://schemas.microsoft.com/office/powerpoint/2010/main" val="3838499978"/>
+      </p:ext>
+    </p:extLst>
+  </p:cSld>
+  <p:clrMapOvr>
+    <a:masterClrMapping/>
+  </p:clrMapOvr>
+  <mc:AlternateContent xmlns:mc="http://schemas.openxmlformats.org/markup-compatibility/2006" xmlns:p14="http://schemas.microsoft.com/office/powerpoint/2010/main">
+    <mc:Choice Requires="p14">
+      <p:transition p14:dur="0"/>
+    </mc:Choice>
+    <mc:Fallback xmlns="">
+      <p:transition/>
+    </mc:Fallback>
+  </mc:AlternateContent>
+  <p:timing>
+    <p:tnLst>
+      <p:par>
+        <p:cTn id="1" dur="indefinite" restart="never" nodeType="tmRoot"/>
+      </p:par>
+    </p:tnLst>
+  </p:timing>
+</p:sld>
+</file>
+
+<file path=ppt/slides/slide11.xml><?xml version="1.0" encoding="utf-8"?>
+<p:sld xmlns:a="http://schemas.openxmlformats.org/drawingml/2006/main" xmlns:r="http://schemas.openxmlformats.org/officeDocument/2006/relationships" xmlns:p="http://schemas.openxmlformats.org/presentationml/2006/main">
+  <p:cSld>
+    <p:spTree>
+      <p:nvGrpSpPr>
+        <p:cNvPr id="1" name=""/>
+        <p:cNvGrpSpPr/>
+        <p:nvPr/>
+      </p:nvGrpSpPr>
+      <p:grpSpPr>
+        <a:xfrm>
+          <a:off x="0" y="0"/>
+          <a:ext cx="0" cy="0"/>
+          <a:chOff x="0" y="0"/>
+          <a:chExt cx="0" cy="0"/>
+        </a:xfrm>
+      </p:grpSpPr>
+      <p:sp>
+        <p:nvSpPr>
+          <p:cNvPr id="2" name="Title 1"/>
+          <p:cNvSpPr>
+            <a:spLocks noGrp="1"/>
+          </p:cNvSpPr>
+          <p:nvPr>
+            <p:ph type="title"/>
+          </p:nvPr>
+        </p:nvSpPr>
+        <p:spPr>
+          <a:xfrm>
+            <a:off x="457200" y="0"/>
+            <a:ext cx="8229600" cy="1143000"/>
+          </a:xfrm>
+        </p:spPr>
+        <p:txBody>
+          <a:bodyPr/>
+          <a:lstStyle/>
+          <a:p>
+            <a:r>
+              <a:rPr lang="en-US" dirty="0" smtClean="0"/>
+              <a:t>Time spent</a:t>
+            </a:r>
+            <a:endParaRPr lang="en-US" dirty="0"/>
+          </a:p>
+        </p:txBody>
+      </p:sp>
+      <p:graphicFrame>
+        <p:nvGraphicFramePr>
           <p:cNvPr id="6" name="內容版面配置區 5"/>
           <p:cNvGraphicFramePr>
             <a:graphicFrameLocks noGrp="1"/>
@@ -4415,11 +4575,11 @@
   <p:clrMapOvr>
     <a:masterClrMapping/>
   </p:clrMapOvr>
-  <mc:AlternateContent xmlns:mc="http://schemas.openxmlformats.org/markup-compatibility/2006">
-    <mc:Choice xmlns:p14="http://schemas.microsoft.com/office/powerpoint/2010/main" Requires="p14">
+  <mc:AlternateContent xmlns:mc="http://schemas.openxmlformats.org/markup-compatibility/2006" xmlns:p14="http://schemas.microsoft.com/office/powerpoint/2010/main">
+    <mc:Choice Requires="p14">
       <p:transition p14:dur="0"/>
     </mc:Choice>
-    <mc:Fallback>
+    <mc:Fallback xmlns="">
       <p:transition/>
     </mc:Fallback>
   </mc:AlternateContent>
@@ -4490,21 +4650,13 @@
           <a:p>
             <a:r>
               <a:rPr lang="en-US" dirty="0" smtClean="0"/>
-              <a:t>Meetings </a:t>
-            </a:r>
+              <a:t>Meetings – weekly formal meeting plus additional informal meetings throughout the working week</a:t>
+            </a:r>
+          </a:p>
+          <a:p>
             <a:r>
               <a:rPr lang="en-US" dirty="0" smtClean="0"/>
-              <a:t>– weekly formal meeting plus additional informal meetings throughout the working week</a:t>
-            </a:r>
-          </a:p>
-          <a:p>
-            <a:r>
-              <a:rPr lang="en-US" dirty="0" smtClean="0"/>
-              <a:t>Dynamics – we get on well (we stormed during sad. Now we are performing). Smooth progression so far</a:t>
-            </a:r>
-            <a:r>
-              <a:rPr lang="en-US" dirty="0" smtClean="0"/>
-              <a:t>.</a:t>
+              <a:t>Dynamics – we get on well (we stormed during sad. Now we are performing). Smooth progression so far.</a:t>
             </a:r>
           </a:p>
           <a:p>
@@ -4512,7 +4664,6 @@
               <a:rPr lang="en-US" dirty="0" smtClean="0"/>
               <a:t>Spiral development model</a:t>
             </a:r>
-            <a:endParaRPr lang="en-US" dirty="0" smtClean="0"/>
           </a:p>
           <a:p>
             <a:endParaRPr lang="en-US" dirty="0" smtClean="0"/>
@@ -4541,11 +4692,11 @@
   <p:clrMapOvr>
     <a:masterClrMapping/>
   </p:clrMapOvr>
-  <mc:AlternateContent xmlns:mc="http://schemas.openxmlformats.org/markup-compatibility/2006">
-    <mc:Choice xmlns:p14="http://schemas.microsoft.com/office/powerpoint/2010/main" Requires="p14">
+  <mc:AlternateContent xmlns:mc="http://schemas.openxmlformats.org/markup-compatibility/2006" xmlns:p14="http://schemas.microsoft.com/office/powerpoint/2010/main">
+    <mc:Choice Requires="p14">
       <p:transition p14:dur="0"/>
     </mc:Choice>
-    <mc:Fallback>
+    <mc:Fallback xmlns="">
       <p:transition/>
     </mc:Fallback>
   </mc:AlternateContent>
@@ -4620,11 +4771,7 @@
           <a:p>
             <a:r>
               <a:rPr lang="en-US" dirty="0" smtClean="0"/>
-              <a:t>SVN</a:t>
-            </a:r>
-            <a:r>
-              <a:rPr lang="en-US" dirty="0" smtClean="0"/>
-              <a:t>: Unix: terminal; Windows: </a:t>
+              <a:t>SVN: Unix: terminal; Windows: </a:t>
             </a:r>
             <a:r>
               <a:rPr lang="en-US" dirty="0" err="1" smtClean="0"/>
@@ -4700,11 +4847,11 @@
   <p:clrMapOvr>
     <a:masterClrMapping/>
   </p:clrMapOvr>
-  <mc:AlternateContent xmlns:mc="http://schemas.openxmlformats.org/markup-compatibility/2006">
-    <mc:Choice xmlns:p14="http://schemas.microsoft.com/office/powerpoint/2010/main" Requires="p14">
+  <mc:AlternateContent xmlns:mc="http://schemas.openxmlformats.org/markup-compatibility/2006" xmlns:p14="http://schemas.microsoft.com/office/powerpoint/2010/main">
+    <mc:Choice Requires="p14">
       <p:transition p14:dur="0"/>
     </mc:Choice>
-    <mc:Fallback>
+    <mc:Fallback xmlns="">
       <p:transition/>
     </mc:Fallback>
   </mc:AlternateContent>
@@ -4804,13 +4951,8 @@
           <a:p>
             <a:r>
               <a:rPr lang="en-US" dirty="0" smtClean="0"/>
-              <a:t>General analysis and design: class diagrams and use case </a:t>
-            </a:r>
-            <a:r>
-              <a:rPr lang="en-US" dirty="0" smtClean="0"/>
-              <a:t>diagrams</a:t>
-            </a:r>
-            <a:endParaRPr lang="en-US" dirty="0" smtClean="0"/>
+              <a:t>General analysis and design: class diagrams and use case diagrams</a:t>
+            </a:r>
           </a:p>
         </p:txBody>
       </p:sp>
@@ -4824,11 +4966,11 @@
   <p:clrMapOvr>
     <a:masterClrMapping/>
   </p:clrMapOvr>
-  <mc:AlternateContent xmlns:mc="http://schemas.openxmlformats.org/markup-compatibility/2006">
-    <mc:Choice xmlns:p14="http://schemas.microsoft.com/office/powerpoint/2010/main" Requires="p14">
+  <mc:AlternateContent xmlns:mc="http://schemas.openxmlformats.org/markup-compatibility/2006" xmlns:p14="http://schemas.microsoft.com/office/powerpoint/2010/main">
+    <mc:Choice Requires="p14">
       <p:transition p14:dur="0"/>
     </mc:Choice>
-    <mc:Fallback>
+    <mc:Fallback xmlns="">
       <p:transition/>
     </mc:Fallback>
   </mc:AlternateContent>
@@ -4923,11 +5065,11 @@
   <p:clrMapOvr>
     <a:masterClrMapping/>
   </p:clrMapOvr>
-  <mc:AlternateContent xmlns:mc="http://schemas.openxmlformats.org/markup-compatibility/2006">
-    <mc:Choice xmlns:p14="http://schemas.microsoft.com/office/powerpoint/2010/main" Requires="p14">
+  <mc:AlternateContent xmlns:mc="http://schemas.openxmlformats.org/markup-compatibility/2006" xmlns:p14="http://schemas.microsoft.com/office/powerpoint/2010/main">
+    <mc:Choice Requires="p14">
       <p:transition p14:dur="0"/>
     </mc:Choice>
-    <mc:Fallback>
+    <mc:Fallback xmlns="">
       <p:transition/>
     </mc:Fallback>
   </mc:AlternateContent>
@@ -5035,11 +5177,11 @@
   <p:clrMapOvr>
     <a:masterClrMapping/>
   </p:clrMapOvr>
-  <mc:AlternateContent xmlns:mc="http://schemas.openxmlformats.org/markup-compatibility/2006">
-    <mc:Choice xmlns:p14="http://schemas.microsoft.com/office/powerpoint/2010/main" Requires="p14">
+  <mc:AlternateContent xmlns:mc="http://schemas.openxmlformats.org/markup-compatibility/2006" xmlns:p14="http://schemas.microsoft.com/office/powerpoint/2010/main">
+    <mc:Choice Requires="p14">
       <p:transition p14:dur="0"/>
     </mc:Choice>
-    <mc:Fallback>
+    <mc:Fallback xmlns="">
       <p:transition/>
     </mc:Fallback>
   </mc:AlternateContent>
@@ -5110,11 +5252,11 @@
   <p:clrMapOvr>
     <a:masterClrMapping/>
   </p:clrMapOvr>
-  <mc:AlternateContent xmlns:mc="http://schemas.openxmlformats.org/markup-compatibility/2006">
-    <mc:Choice xmlns:p14="http://schemas.microsoft.com/office/powerpoint/2010/main" Requires="p14">
+  <mc:AlternateContent xmlns:mc="http://schemas.openxmlformats.org/markup-compatibility/2006" xmlns:p14="http://schemas.microsoft.com/office/powerpoint/2010/main">
+    <mc:Choice Requires="p14">
       <p:transition p14:dur="0"/>
     </mc:Choice>
-    <mc:Fallback>
+    <mc:Fallback xmlns="">
       <p:transition/>
     </mc:Fallback>
   </mc:AlternateContent>
@@ -5191,15 +5333,7 @@
           <a:p>
             <a:r>
               <a:rPr lang="en-US" dirty="0" smtClean="0"/>
-              <a:t>Plans: We are on target in terms of the work allocations and </a:t>
-            </a:r>
-            <a:r>
-              <a:rPr lang="en-US" dirty="0" smtClean="0"/>
-              <a:t>Gantt </a:t>
-            </a:r>
-            <a:r>
-              <a:rPr lang="en-US" dirty="0" smtClean="0"/>
-              <a:t>chart times</a:t>
+              <a:t>Plans: We are on target in terms of the work allocations and Gantt chart times</a:t>
             </a:r>
           </a:p>
           <a:p>
@@ -5221,11 +5355,11 @@
   <p:clrMapOvr>
     <a:masterClrMapping/>
   </p:clrMapOvr>
-  <mc:AlternateContent xmlns:mc="http://schemas.openxmlformats.org/markup-compatibility/2006">
-    <mc:Choice xmlns:p14="http://schemas.microsoft.com/office/powerpoint/2010/main" Requires="p14">
+  <mc:AlternateContent xmlns:mc="http://schemas.openxmlformats.org/markup-compatibility/2006" xmlns:p14="http://schemas.microsoft.com/office/powerpoint/2010/main">
+    <mc:Choice Requires="p14">
       <p:transition p14:dur="0"/>
     </mc:Choice>
-    <mc:Fallback>
+    <mc:Fallback xmlns="">
       <p:transition/>
     </mc:Fallback>
   </mc:AlternateContent>
@@ -5266,139 +5400,93 @@
             <p:ph type="title"/>
           </p:nvPr>
         </p:nvSpPr>
-        <p:spPr>
+        <p:spPr/>
+        <p:txBody>
+          <a:bodyPr/>
+          <a:lstStyle/>
+          <a:p>
+            <a:endParaRPr lang="en-GB"/>
+          </a:p>
+        </p:txBody>
+      </p:sp>
+      <p:sp>
+        <p:nvSpPr>
+          <p:cNvPr id="3" name="Content Placeholder 2"/>
+          <p:cNvSpPr>
+            <a:spLocks noGrp="1"/>
+          </p:cNvSpPr>
+          <p:nvPr>
+            <p:ph idx="1"/>
+          </p:nvPr>
+        </p:nvSpPr>
+        <p:spPr/>
+        <p:txBody>
+          <a:bodyPr/>
+          <a:lstStyle/>
+          <a:p>
+            <a:endParaRPr lang="en-GB"/>
+          </a:p>
+        </p:txBody>
+      </p:sp>
+      <p:pic>
+        <p:nvPicPr>
+          <p:cNvPr id="1026" name="Picture 2" descr="C:\Users\User\Downloads\SmartSheetExport (1).png"/>
+          <p:cNvPicPr>
+            <a:picLocks noChangeAspect="1" noChangeArrowheads="1"/>
+          </p:cNvPicPr>
+          <p:nvPr/>
+        </p:nvPicPr>
+        <p:blipFill>
+          <a:blip r:embed="rId2">
+            <a:extLst>
+              <a:ext uri="{28A0092B-C50C-407E-A947-70E740481C1C}">
+                <a14:useLocalDpi xmlns:a14="http://schemas.microsoft.com/office/drawing/2010/main" val="0"/>
+              </a:ext>
+            </a:extLst>
+          </a:blip>
+          <a:srcRect/>
+          <a:stretch>
+            <a:fillRect/>
+          </a:stretch>
+        </p:blipFill>
+        <p:spPr bwMode="auto">
           <a:xfrm>
-            <a:off x="457200" y="0"/>
-            <a:ext cx="8229600" cy="1143000"/>
-          </a:xfrm>
-        </p:spPr>
-        <p:txBody>
-          <a:bodyPr/>
-          <a:lstStyle/>
-          <a:p>
-            <a:r>
-              <a:rPr lang="en-US" dirty="0" smtClean="0"/>
-              <a:t>Time spent</a:t>
-            </a:r>
-            <a:endParaRPr lang="en-US" dirty="0"/>
-          </a:p>
-        </p:txBody>
-      </p:sp>
-      <p:graphicFrame>
-        <p:nvGraphicFramePr>
-          <p:cNvPr id="5" name="圖表 4"/>
-          <p:cNvGraphicFramePr/>
-          <p:nvPr/>
-        </p:nvGraphicFramePr>
-        <p:xfrm>
-          <a:off x="457200" y="1295400"/>
-          <a:ext cx="8458200" cy="5105400"/>
-        </p:xfrm>
-        <a:graphic>
-          <a:graphicData uri="http://schemas.openxmlformats.org/drawingml/2006/chart">
-            <c:chart xmlns:c="http://schemas.openxmlformats.org/drawingml/2006/chart" xmlns:r="http://schemas.openxmlformats.org/officeDocument/2006/relationships" r:id="rId2"/>
-          </a:graphicData>
-        </a:graphic>
-      </p:graphicFrame>
-      <p:sp>
-        <p:nvSpPr>
-          <p:cNvPr id="6" name="Title 1"/>
-          <p:cNvSpPr txBox="1">
-            <a:spLocks/>
-          </p:cNvSpPr>
-          <p:nvPr/>
-        </p:nvSpPr>
-        <p:spPr>
-          <a:xfrm>
-            <a:off x="0" y="6096000"/>
-            <a:ext cx="4191000" cy="762000"/>
+            <a:off x="0" y="959902"/>
+            <a:ext cx="9144000" cy="4938195"/>
           </a:xfrm>
           <a:prstGeom prst="rect">
             <a:avLst/>
           </a:prstGeom>
+          <a:noFill/>
+          <a:extLst>
+            <a:ext uri="{909E8E84-426E-40DD-AFC4-6F175D3DCCD1}">
+              <a14:hiddenFill xmlns:a14="http://schemas.microsoft.com/office/drawing/2010/main">
+                <a:solidFill>
+                  <a:srgbClr val="FFFFFF"/>
+                </a:solidFill>
+              </a14:hiddenFill>
+            </a:ext>
+          </a:extLst>
         </p:spPr>
-        <p:txBody>
-          <a:bodyPr vert="horz" lIns="91440" tIns="45720" rIns="91440" bIns="45720" rtlCol="0" anchor="ctr">
-            <a:normAutofit/>
-          </a:bodyPr>
-          <a:lstStyle/>
-          <a:p>
-            <a:pPr marL="0" marR="0" lvl="0" indent="0" algn="ctr" defTabSz="914400" rtl="0" eaLnBrk="1" fontAlgn="auto" latinLnBrk="0" hangingPunct="1">
-              <a:lnSpc>
-                <a:spcPct val="100000"/>
-              </a:lnSpc>
-              <a:spcBef>
-                <a:spcPct val="0"/>
-              </a:spcBef>
-              <a:spcAft>
-                <a:spcPts val="0"/>
-              </a:spcAft>
-              <a:buClrTx/>
-              <a:buSzTx/>
-              <a:buFontTx/>
-              <a:buNone/>
-              <a:tabLst/>
-              <a:defRPr/>
-            </a:pPr>
-            <a:r>
-              <a:rPr kumimoji="0" lang="en-US" sz="2000" b="0" i="0" u="none" strike="noStrike" kern="1200" cap="none" spc="0" normalizeH="0" baseline="0" noProof="0" dirty="0" smtClean="0">
-                <a:ln>
-                  <a:noFill/>
-                </a:ln>
-                <a:solidFill>
-                  <a:schemeClr val="tx1"/>
-                </a:solidFill>
-                <a:effectLst/>
-                <a:uLnTx/>
-                <a:uFillTx/>
-                <a:latin typeface="+mj-lt"/>
-                <a:ea typeface="+mj-ea"/>
-                <a:cs typeface="+mj-cs"/>
-              </a:rPr>
-              <a:t>P.S. Expected time spent / Person : 16</a:t>
-            </a:r>
-            <a:endParaRPr kumimoji="0" lang="en-US" sz="2000" b="0" i="0" u="none" strike="noStrike" kern="1200" cap="none" spc="0" normalizeH="0" baseline="0" noProof="0" dirty="0">
-              <a:ln>
-                <a:noFill/>
-              </a:ln>
-              <a:solidFill>
-                <a:schemeClr val="tx1"/>
-              </a:solidFill>
-              <a:effectLst/>
-              <a:uLnTx/>
-              <a:uFillTx/>
-              <a:latin typeface="+mj-lt"/>
-              <a:ea typeface="+mj-ea"/>
-              <a:cs typeface="+mj-cs"/>
-            </a:endParaRPr>
-          </a:p>
-        </p:txBody>
-      </p:sp>
+      </p:pic>
     </p:spTree>
     <p:extLst>
       <p:ext uri="{BB962C8B-B14F-4D97-AF65-F5344CB8AC3E}">
-        <p14:creationId xmlns:p14="http://schemas.microsoft.com/office/powerpoint/2010/main" val="3838499978"/>
+        <p14:creationId xmlns:p14="http://schemas.microsoft.com/office/powerpoint/2010/main" val="1726562854"/>
       </p:ext>
     </p:extLst>
   </p:cSld>
   <p:clrMapOvr>
     <a:masterClrMapping/>
   </p:clrMapOvr>
-  <mc:AlternateContent xmlns:mc="http://schemas.openxmlformats.org/markup-compatibility/2006">
-    <mc:Choice xmlns:p14="http://schemas.microsoft.com/office/powerpoint/2010/main" Requires="p14">
+  <mc:AlternateContent xmlns:mc="http://schemas.openxmlformats.org/markup-compatibility/2006" xmlns:p14="http://schemas.microsoft.com/office/powerpoint/2010/main">
+    <mc:Choice Requires="p14">
       <p:transition p14:dur="0"/>
     </mc:Choice>
-    <mc:Fallback>
+    <mc:Fallback xmlns="">
       <p:transition/>
     </mc:Fallback>
   </mc:AlternateContent>
-  <p:timing>
-    <p:tnLst>
-      <p:par>
-        <p:cTn id="1" dur="indefinite" restart="never" nodeType="tmRoot"/>
-      </p:par>
-    </p:tnLst>
-  </p:timing>
 </p:sld>
 </file>
 

</xml_diff>

<commit_message>
*Small changes to the class diagram *Added class diagram to slides
</commit_message>
<xml_diff>
--- a/doc/D2/Slides.pptx
+++ b/doc/D2/Slides.pptx
@@ -5,20 +5,19 @@
     <p:sldMasterId id="2147483756" r:id="rId1"/>
   </p:sldMasterIdLst>
   <p:notesMasterIdLst>
-    <p:notesMasterId r:id="rId13"/>
+    <p:notesMasterId r:id="rId12"/>
   </p:notesMasterIdLst>
   <p:sldIdLst>
     <p:sldId id="256" r:id="rId2"/>
     <p:sldId id="261" r:id="rId3"/>
     <p:sldId id="258" r:id="rId4"/>
     <p:sldId id="257" r:id="rId5"/>
-    <p:sldId id="259" r:id="rId6"/>
-    <p:sldId id="262" r:id="rId7"/>
-    <p:sldId id="266" r:id="rId8"/>
-    <p:sldId id="263" r:id="rId9"/>
-    <p:sldId id="267" r:id="rId10"/>
-    <p:sldId id="264" r:id="rId11"/>
-    <p:sldId id="265" r:id="rId12"/>
+    <p:sldId id="262" r:id="rId6"/>
+    <p:sldId id="266" r:id="rId7"/>
+    <p:sldId id="263" r:id="rId8"/>
+    <p:sldId id="267" r:id="rId9"/>
+    <p:sldId id="264" r:id="rId10"/>
+    <p:sldId id="265" r:id="rId11"/>
   </p:sldIdLst>
   <p:sldSz cx="9144000" cy="6858000" type="screen4x3"/>
   <p:notesSz cx="6858000" cy="9144000"/>
@@ -570,11 +569,11 @@
         </c:dLbls>
         <c:marker val="1"/>
         <c:smooth val="0"/>
-        <c:axId val="52937088"/>
-        <c:axId val="52938624"/>
+        <c:axId val="84777216"/>
+        <c:axId val="86048768"/>
       </c:lineChart>
       <c:dateAx>
-        <c:axId val="52937088"/>
+        <c:axId val="84777216"/>
         <c:scaling>
           <c:orientation val="minMax"/>
         </c:scaling>
@@ -594,14 +593,14 @@
             <a:endParaRPr lang="en-US"/>
           </a:p>
         </c:txPr>
-        <c:crossAx val="52938624"/>
+        <c:crossAx val="86048768"/>
         <c:crosses val="autoZero"/>
         <c:auto val="1"/>
         <c:lblOffset val="100"/>
         <c:baseTimeUnit val="days"/>
       </c:dateAx>
       <c:valAx>
-        <c:axId val="52938624"/>
+        <c:axId val="86048768"/>
         <c:scaling>
           <c:orientation val="minMax"/>
         </c:scaling>
@@ -622,7 +621,7 @@
             <a:endParaRPr lang="en-US"/>
           </a:p>
         </c:txPr>
-        <c:crossAx val="52937088"/>
+        <c:crossAx val="84777216"/>
         <c:crosses val="autoZero"/>
         <c:crossBetween val="between"/>
       </c:valAx>
@@ -1091,7 +1090,7 @@
             <a:fld id="{EC6078B8-B29D-44C4-8B20-495FFF114CDA}" type="slidenum">
               <a:rPr lang="en-US" smtClean="0"/>
               <a:pPr/>
-              <a:t>8</a:t>
+              <a:t>7</a:t>
             </a:fld>
             <a:endParaRPr lang="en-US"/>
           </a:p>
@@ -4384,169 +4383,6 @@
       </p:sp>
       <p:graphicFrame>
         <p:nvGraphicFramePr>
-          <p:cNvPr id="5" name="圖表 4"/>
-          <p:cNvGraphicFramePr/>
-          <p:nvPr/>
-        </p:nvGraphicFramePr>
-        <p:xfrm>
-          <a:off x="457200" y="1295400"/>
-          <a:ext cx="8458200" cy="5105400"/>
-        </p:xfrm>
-        <a:graphic>
-          <a:graphicData uri="http://schemas.openxmlformats.org/drawingml/2006/chart">
-            <c:chart xmlns:c="http://schemas.openxmlformats.org/drawingml/2006/chart" xmlns:r="http://schemas.openxmlformats.org/officeDocument/2006/relationships" r:id="rId2"/>
-          </a:graphicData>
-        </a:graphic>
-      </p:graphicFrame>
-      <p:sp>
-        <p:nvSpPr>
-          <p:cNvPr id="6" name="Title 1"/>
-          <p:cNvSpPr txBox="1">
-            <a:spLocks/>
-          </p:cNvSpPr>
-          <p:nvPr/>
-        </p:nvSpPr>
-        <p:spPr>
-          <a:xfrm>
-            <a:off x="0" y="6096000"/>
-            <a:ext cx="4191000" cy="762000"/>
-          </a:xfrm>
-          <a:prstGeom prst="rect">
-            <a:avLst/>
-          </a:prstGeom>
-        </p:spPr>
-        <p:txBody>
-          <a:bodyPr vert="horz" lIns="91440" tIns="45720" rIns="91440" bIns="45720" rtlCol="0" anchor="ctr">
-            <a:normAutofit/>
-          </a:bodyPr>
-          <a:lstStyle/>
-          <a:p>
-            <a:pPr marL="0" marR="0" lvl="0" indent="0" algn="ctr" defTabSz="914400" rtl="0" eaLnBrk="1" fontAlgn="auto" latinLnBrk="0" hangingPunct="1">
-              <a:lnSpc>
-                <a:spcPct val="100000"/>
-              </a:lnSpc>
-              <a:spcBef>
-                <a:spcPct val="0"/>
-              </a:spcBef>
-              <a:spcAft>
-                <a:spcPts val="0"/>
-              </a:spcAft>
-              <a:buClrTx/>
-              <a:buSzTx/>
-              <a:buFontTx/>
-              <a:buNone/>
-              <a:tabLst/>
-              <a:defRPr/>
-            </a:pPr>
-            <a:r>
-              <a:rPr kumimoji="0" lang="en-US" sz="2000" b="0" i="0" u="none" strike="noStrike" kern="1200" cap="none" spc="0" normalizeH="0" baseline="0" noProof="0" dirty="0" smtClean="0">
-                <a:ln>
-                  <a:noFill/>
-                </a:ln>
-                <a:solidFill>
-                  <a:schemeClr val="tx1"/>
-                </a:solidFill>
-                <a:effectLst/>
-                <a:uLnTx/>
-                <a:uFillTx/>
-                <a:latin typeface="+mj-lt"/>
-                <a:ea typeface="+mj-ea"/>
-                <a:cs typeface="+mj-cs"/>
-              </a:rPr>
-              <a:t>P.S. Expected time spent / Person : 16</a:t>
-            </a:r>
-            <a:endParaRPr kumimoji="0" lang="en-US" sz="2000" b="0" i="0" u="none" strike="noStrike" kern="1200" cap="none" spc="0" normalizeH="0" baseline="0" noProof="0" dirty="0">
-              <a:ln>
-                <a:noFill/>
-              </a:ln>
-              <a:solidFill>
-                <a:schemeClr val="tx1"/>
-              </a:solidFill>
-              <a:effectLst/>
-              <a:uLnTx/>
-              <a:uFillTx/>
-              <a:latin typeface="+mj-lt"/>
-              <a:ea typeface="+mj-ea"/>
-              <a:cs typeface="+mj-cs"/>
-            </a:endParaRPr>
-          </a:p>
-        </p:txBody>
-      </p:sp>
-    </p:spTree>
-    <p:extLst>
-      <p:ext uri="{BB962C8B-B14F-4D97-AF65-F5344CB8AC3E}">
-        <p14:creationId xmlns:p14="http://schemas.microsoft.com/office/powerpoint/2010/main" val="3838499978"/>
-      </p:ext>
-    </p:extLst>
-  </p:cSld>
-  <p:clrMapOvr>
-    <a:masterClrMapping/>
-  </p:clrMapOvr>
-  <mc:AlternateContent xmlns:mc="http://schemas.openxmlformats.org/markup-compatibility/2006" xmlns:p14="http://schemas.microsoft.com/office/powerpoint/2010/main">
-    <mc:Choice Requires="p14">
-      <p:transition p14:dur="0"/>
-    </mc:Choice>
-    <mc:Fallback xmlns="">
-      <p:transition/>
-    </mc:Fallback>
-  </mc:AlternateContent>
-  <p:timing>
-    <p:tnLst>
-      <p:par>
-        <p:cTn id="1" dur="indefinite" restart="never" nodeType="tmRoot"/>
-      </p:par>
-    </p:tnLst>
-  </p:timing>
-</p:sld>
-</file>
-
-<file path=ppt/slides/slide11.xml><?xml version="1.0" encoding="utf-8"?>
-<p:sld xmlns:a="http://schemas.openxmlformats.org/drawingml/2006/main" xmlns:r="http://schemas.openxmlformats.org/officeDocument/2006/relationships" xmlns:p="http://schemas.openxmlformats.org/presentationml/2006/main">
-  <p:cSld>
-    <p:spTree>
-      <p:nvGrpSpPr>
-        <p:cNvPr id="1" name=""/>
-        <p:cNvGrpSpPr/>
-        <p:nvPr/>
-      </p:nvGrpSpPr>
-      <p:grpSpPr>
-        <a:xfrm>
-          <a:off x="0" y="0"/>
-          <a:ext cx="0" cy="0"/>
-          <a:chOff x="0" y="0"/>
-          <a:chExt cx="0" cy="0"/>
-        </a:xfrm>
-      </p:grpSpPr>
-      <p:sp>
-        <p:nvSpPr>
-          <p:cNvPr id="2" name="Title 1"/>
-          <p:cNvSpPr>
-            <a:spLocks noGrp="1"/>
-          </p:cNvSpPr>
-          <p:nvPr>
-            <p:ph type="title"/>
-          </p:nvPr>
-        </p:nvSpPr>
-        <p:spPr>
-          <a:xfrm>
-            <a:off x="457200" y="0"/>
-            <a:ext cx="8229600" cy="1143000"/>
-          </a:xfrm>
-        </p:spPr>
-        <p:txBody>
-          <a:bodyPr/>
-          <a:lstStyle/>
-          <a:p>
-            <a:r>
-              <a:rPr lang="en-US" dirty="0" smtClean="0"/>
-              <a:t>Time spent</a:t>
-            </a:r>
-            <a:endParaRPr lang="en-US" dirty="0"/>
-          </a:p>
-        </p:txBody>
-      </p:sp>
-      <p:graphicFrame>
-        <p:nvGraphicFramePr>
           <p:cNvPr id="6" name="內容版面配置區 5"/>
           <p:cNvGraphicFramePr>
             <a:graphicFrameLocks noGrp="1"/>
@@ -5018,47 +4854,57 @@
           <a:p>
             <a:r>
               <a:rPr lang="en-US" dirty="0" smtClean="0"/>
-              <a:t>Class diagram so far</a:t>
+              <a:t>Architectural concepts</a:t>
             </a:r>
             <a:endParaRPr lang="en-US" dirty="0"/>
           </a:p>
         </p:txBody>
       </p:sp>
-      <p:sp>
-        <p:nvSpPr>
-          <p:cNvPr id="3" name="Content Placeholder 2"/>
-          <p:cNvSpPr>
-            <a:spLocks noGrp="1"/>
-          </p:cNvSpPr>
-          <p:nvPr>
-            <p:ph idx="1"/>
-          </p:nvPr>
-        </p:nvSpPr>
-        <p:spPr/>
-        <p:txBody>
-          <a:bodyPr/>
-          <a:lstStyle/>
-          <a:p>
-            <a:r>
-              <a:rPr lang="en-US" dirty="0" smtClean="0"/>
-              <a:t>&lt;</a:t>
-            </a:r>
-            <a:r>
-              <a:rPr lang="en-US" dirty="0" err="1" smtClean="0"/>
-              <a:t>ed</a:t>
-            </a:r>
-            <a:r>
-              <a:rPr lang="en-US" dirty="0" smtClean="0"/>
-              <a:t> add class diagram&gt;</a:t>
-            </a:r>
-            <a:endParaRPr lang="en-US" dirty="0"/>
-          </a:p>
-        </p:txBody>
-      </p:sp>
+      <p:pic>
+        <p:nvPicPr>
+          <p:cNvPr id="1026" name="Picture 2" descr="C:\Users\edward\Dropbox\src\year2\seg2012gp9\src\ClassDiagrams\img\classDiagram.png"/>
+          <p:cNvPicPr>
+            <a:picLocks noChangeAspect="1" noChangeArrowheads="1"/>
+          </p:cNvPicPr>
+          <p:nvPr/>
+        </p:nvPicPr>
+        <p:blipFill>
+          <a:blip r:embed="rId2">
+            <a:extLst>
+              <a:ext uri="{28A0092B-C50C-407E-A947-70E740481C1C}">
+                <a14:useLocalDpi xmlns:a14="http://schemas.microsoft.com/office/drawing/2010/main" val="0"/>
+              </a:ext>
+            </a:extLst>
+          </a:blip>
+          <a:srcRect/>
+          <a:stretch>
+            <a:fillRect/>
+          </a:stretch>
+        </p:blipFill>
+        <p:spPr bwMode="auto">
+          <a:xfrm>
+            <a:off x="152400" y="1752600"/>
+            <a:ext cx="8806805" cy="4096046"/>
+          </a:xfrm>
+          <a:prstGeom prst="rect">
+            <a:avLst/>
+          </a:prstGeom>
+          <a:noFill/>
+          <a:extLst>
+            <a:ext uri="{909E8E84-426E-40DD-AFC4-6F175D3DCCD1}">
+              <a14:hiddenFill xmlns:a14="http://schemas.microsoft.com/office/drawing/2010/main">
+                <a:solidFill>
+                  <a:srgbClr val="FFFFFF"/>
+                </a:solidFill>
+              </a14:hiddenFill>
+            </a:ext>
+          </a:extLst>
+        </p:spPr>
+      </p:pic>
     </p:spTree>
     <p:extLst>
       <p:ext uri="{BB962C8B-B14F-4D97-AF65-F5344CB8AC3E}">
-        <p14:creationId xmlns:p14="http://schemas.microsoft.com/office/powerpoint/2010/main" val="3359560538"/>
+        <p14:creationId xmlns:p14="http://schemas.microsoft.com/office/powerpoint/2010/main" val="869076350"/>
       </p:ext>
     </p:extLst>
   </p:cSld>
@@ -5102,75 +4948,38 @@
       </p:grpSpPr>
       <p:sp>
         <p:nvSpPr>
-          <p:cNvPr id="2" name="Title 1"/>
-          <p:cNvSpPr>
-            <a:spLocks noGrp="1"/>
-          </p:cNvSpPr>
-          <p:nvPr>
-            <p:ph type="title"/>
-          </p:nvPr>
-        </p:nvSpPr>
-        <p:spPr/>
-        <p:txBody>
-          <a:bodyPr/>
-          <a:lstStyle/>
-          <a:p>
-            <a:r>
-              <a:rPr lang="en-US" dirty="0" smtClean="0"/>
-              <a:t>Architectural concepts</a:t>
-            </a:r>
-            <a:endParaRPr lang="en-US" dirty="0"/>
-          </a:p>
-        </p:txBody>
-      </p:sp>
-      <p:sp>
-        <p:nvSpPr>
-          <p:cNvPr id="3" name="Content Placeholder 2"/>
-          <p:cNvSpPr>
-            <a:spLocks noGrp="1"/>
-          </p:cNvSpPr>
-          <p:nvPr>
-            <p:ph idx="1"/>
-          </p:nvPr>
-        </p:nvSpPr>
-        <p:spPr/>
-        <p:txBody>
-          <a:bodyPr/>
-          <a:lstStyle/>
-          <a:p>
-            <a:r>
-              <a:rPr lang="en-US" dirty="0" smtClean="0"/>
-              <a:t>Our approach to the MVC architecture</a:t>
-            </a:r>
-          </a:p>
-          <a:p>
-            <a:r>
-              <a:rPr lang="en-US" dirty="0" smtClean="0"/>
-              <a:t>Block diagram of the core architecture</a:t>
-            </a:r>
-          </a:p>
-          <a:p>
-            <a:pPr lvl="1"/>
-            <a:r>
-              <a:rPr lang="en-US" dirty="0" smtClean="0"/>
-              <a:t>&lt;Diagram here, </a:t>
-            </a:r>
-            <a:r>
-              <a:rPr lang="en-US" dirty="0" err="1" smtClean="0"/>
-              <a:t>ed</a:t>
-            </a:r>
-            <a:r>
-              <a:rPr lang="en-US" dirty="0" smtClean="0"/>
-              <a:t>&gt;</a:t>
-            </a:r>
-            <a:endParaRPr lang="en-US" dirty="0"/>
+          <p:cNvPr id="4" name="Rectangle 3"/>
+          <p:cNvSpPr/>
+          <p:nvPr/>
+        </p:nvSpPr>
+        <p:spPr>
+          <a:xfrm>
+            <a:off x="3124200" y="2514600"/>
+            <a:ext cx="4419600" cy="1015663"/>
+          </a:xfrm>
+          <a:prstGeom prst="rect">
+            <a:avLst/>
+          </a:prstGeom>
+        </p:spPr>
+        <p:txBody>
+          <a:bodyPr wrap="square">
+            <a:spAutoFit/>
+          </a:bodyPr>
+          <a:lstStyle/>
+          <a:p>
+            <a:r>
+              <a:rPr lang="en-US" sz="6000" i="1" spc="-300" dirty="0" smtClean="0">
+                <a:latin typeface="Comic Sans MS" pitchFamily="66" charset="0"/>
+              </a:rPr>
+              <a:t>Demo</a:t>
+            </a:r>
           </a:p>
         </p:txBody>
       </p:sp>
     </p:spTree>
     <p:extLst>
       <p:ext uri="{BB962C8B-B14F-4D97-AF65-F5344CB8AC3E}">
-        <p14:creationId xmlns:p14="http://schemas.microsoft.com/office/powerpoint/2010/main" val="869076350"/>
+        <p14:creationId xmlns:p14="http://schemas.microsoft.com/office/powerpoint/2010/main" val="1161608251"/>
       </p:ext>
     </p:extLst>
   </p:cSld>
@@ -5214,81 +5023,6 @@
       </p:grpSpPr>
       <p:sp>
         <p:nvSpPr>
-          <p:cNvPr id="4" name="Rectangle 3"/>
-          <p:cNvSpPr/>
-          <p:nvPr/>
-        </p:nvSpPr>
-        <p:spPr>
-          <a:xfrm>
-            <a:off x="3124200" y="2514600"/>
-            <a:ext cx="4419600" cy="1015663"/>
-          </a:xfrm>
-          <a:prstGeom prst="rect">
-            <a:avLst/>
-          </a:prstGeom>
-        </p:spPr>
-        <p:txBody>
-          <a:bodyPr wrap="square">
-            <a:spAutoFit/>
-          </a:bodyPr>
-          <a:lstStyle/>
-          <a:p>
-            <a:r>
-              <a:rPr lang="en-US" sz="6000" i="1" spc="-300" dirty="0" smtClean="0">
-                <a:latin typeface="Comic Sans MS" pitchFamily="66" charset="0"/>
-              </a:rPr>
-              <a:t>Demo</a:t>
-            </a:r>
-          </a:p>
-        </p:txBody>
-      </p:sp>
-    </p:spTree>
-    <p:extLst>
-      <p:ext uri="{BB962C8B-B14F-4D97-AF65-F5344CB8AC3E}">
-        <p14:creationId xmlns:p14="http://schemas.microsoft.com/office/powerpoint/2010/main" val="1161608251"/>
-      </p:ext>
-    </p:extLst>
-  </p:cSld>
-  <p:clrMapOvr>
-    <a:masterClrMapping/>
-  </p:clrMapOvr>
-  <mc:AlternateContent xmlns:mc="http://schemas.openxmlformats.org/markup-compatibility/2006" xmlns:p14="http://schemas.microsoft.com/office/powerpoint/2010/main">
-    <mc:Choice Requires="p14">
-      <p:transition p14:dur="0"/>
-    </mc:Choice>
-    <mc:Fallback xmlns="">
-      <p:transition/>
-    </mc:Fallback>
-  </mc:AlternateContent>
-  <p:timing>
-    <p:tnLst>
-      <p:par>
-        <p:cTn id="1" dur="indefinite" restart="never" nodeType="tmRoot"/>
-      </p:par>
-    </p:tnLst>
-  </p:timing>
-</p:sld>
-</file>
-
-<file path=ppt/slides/slide8.xml><?xml version="1.0" encoding="utf-8"?>
-<p:sld xmlns:a="http://schemas.openxmlformats.org/drawingml/2006/main" xmlns:r="http://schemas.openxmlformats.org/officeDocument/2006/relationships" xmlns:p="http://schemas.openxmlformats.org/presentationml/2006/main">
-  <p:cSld>
-    <p:spTree>
-      <p:nvGrpSpPr>
-        <p:cNvPr id="1" name=""/>
-        <p:cNvGrpSpPr/>
-        <p:nvPr/>
-      </p:nvGrpSpPr>
-      <p:grpSpPr>
-        <a:xfrm>
-          <a:off x="0" y="0"/>
-          <a:ext cx="0" cy="0"/>
-          <a:chOff x="0" y="0"/>
-          <a:chExt cx="0" cy="0"/>
-        </a:xfrm>
-      </p:grpSpPr>
-      <p:sp>
-        <p:nvSpPr>
           <p:cNvPr id="2" name="Title 1"/>
           <p:cNvSpPr>
             <a:spLocks noGrp="1"/>
@@ -5373,7 +5107,7 @@
 </p:sld>
 </file>
 
-<file path=ppt/slides/slide9.xml><?xml version="1.0" encoding="utf-8"?>
+<file path=ppt/slides/slide8.xml><?xml version="1.0" encoding="utf-8"?>
 <p:sld xmlns:a="http://schemas.openxmlformats.org/drawingml/2006/main" xmlns:r="http://schemas.openxmlformats.org/officeDocument/2006/relationships" xmlns:p="http://schemas.openxmlformats.org/presentationml/2006/main">
   <p:cSld>
     <p:spTree>
@@ -5487,6 +5221,169 @@
       <p:transition/>
     </mc:Fallback>
   </mc:AlternateContent>
+</p:sld>
+</file>
+
+<file path=ppt/slides/slide9.xml><?xml version="1.0" encoding="utf-8"?>
+<p:sld xmlns:a="http://schemas.openxmlformats.org/drawingml/2006/main" xmlns:r="http://schemas.openxmlformats.org/officeDocument/2006/relationships" xmlns:p="http://schemas.openxmlformats.org/presentationml/2006/main">
+  <p:cSld>
+    <p:spTree>
+      <p:nvGrpSpPr>
+        <p:cNvPr id="1" name=""/>
+        <p:cNvGrpSpPr/>
+        <p:nvPr/>
+      </p:nvGrpSpPr>
+      <p:grpSpPr>
+        <a:xfrm>
+          <a:off x="0" y="0"/>
+          <a:ext cx="0" cy="0"/>
+          <a:chOff x="0" y="0"/>
+          <a:chExt cx="0" cy="0"/>
+        </a:xfrm>
+      </p:grpSpPr>
+      <p:sp>
+        <p:nvSpPr>
+          <p:cNvPr id="2" name="Title 1"/>
+          <p:cNvSpPr>
+            <a:spLocks noGrp="1"/>
+          </p:cNvSpPr>
+          <p:nvPr>
+            <p:ph type="title"/>
+          </p:nvPr>
+        </p:nvSpPr>
+        <p:spPr>
+          <a:xfrm>
+            <a:off x="457200" y="0"/>
+            <a:ext cx="8229600" cy="1143000"/>
+          </a:xfrm>
+        </p:spPr>
+        <p:txBody>
+          <a:bodyPr/>
+          <a:lstStyle/>
+          <a:p>
+            <a:r>
+              <a:rPr lang="en-US" dirty="0" smtClean="0"/>
+              <a:t>Time spent</a:t>
+            </a:r>
+            <a:endParaRPr lang="en-US" dirty="0"/>
+          </a:p>
+        </p:txBody>
+      </p:sp>
+      <p:graphicFrame>
+        <p:nvGraphicFramePr>
+          <p:cNvPr id="5" name="圖表 4"/>
+          <p:cNvGraphicFramePr/>
+          <p:nvPr/>
+        </p:nvGraphicFramePr>
+        <p:xfrm>
+          <a:off x="457200" y="1295400"/>
+          <a:ext cx="8458200" cy="5105400"/>
+        </p:xfrm>
+        <a:graphic>
+          <a:graphicData uri="http://schemas.openxmlformats.org/drawingml/2006/chart">
+            <c:chart xmlns:c="http://schemas.openxmlformats.org/drawingml/2006/chart" xmlns:r="http://schemas.openxmlformats.org/officeDocument/2006/relationships" r:id="rId2"/>
+          </a:graphicData>
+        </a:graphic>
+      </p:graphicFrame>
+      <p:sp>
+        <p:nvSpPr>
+          <p:cNvPr id="6" name="Title 1"/>
+          <p:cNvSpPr txBox="1">
+            <a:spLocks/>
+          </p:cNvSpPr>
+          <p:nvPr/>
+        </p:nvSpPr>
+        <p:spPr>
+          <a:xfrm>
+            <a:off x="0" y="6096000"/>
+            <a:ext cx="4191000" cy="762000"/>
+          </a:xfrm>
+          <a:prstGeom prst="rect">
+            <a:avLst/>
+          </a:prstGeom>
+        </p:spPr>
+        <p:txBody>
+          <a:bodyPr vert="horz" lIns="91440" tIns="45720" rIns="91440" bIns="45720" rtlCol="0" anchor="ctr">
+            <a:normAutofit/>
+          </a:bodyPr>
+          <a:lstStyle/>
+          <a:p>
+            <a:pPr marL="0" marR="0" lvl="0" indent="0" algn="ctr" defTabSz="914400" rtl="0" eaLnBrk="1" fontAlgn="auto" latinLnBrk="0" hangingPunct="1">
+              <a:lnSpc>
+                <a:spcPct val="100000"/>
+              </a:lnSpc>
+              <a:spcBef>
+                <a:spcPct val="0"/>
+              </a:spcBef>
+              <a:spcAft>
+                <a:spcPts val="0"/>
+              </a:spcAft>
+              <a:buClrTx/>
+              <a:buSzTx/>
+              <a:buFontTx/>
+              <a:buNone/>
+              <a:tabLst/>
+              <a:defRPr/>
+            </a:pPr>
+            <a:r>
+              <a:rPr kumimoji="0" lang="en-US" sz="2000" b="0" i="0" u="none" strike="noStrike" kern="1200" cap="none" spc="0" normalizeH="0" baseline="0" noProof="0" dirty="0" smtClean="0">
+                <a:ln>
+                  <a:noFill/>
+                </a:ln>
+                <a:solidFill>
+                  <a:schemeClr val="tx1"/>
+                </a:solidFill>
+                <a:effectLst/>
+                <a:uLnTx/>
+                <a:uFillTx/>
+                <a:latin typeface="+mj-lt"/>
+                <a:ea typeface="+mj-ea"/>
+                <a:cs typeface="+mj-cs"/>
+              </a:rPr>
+              <a:t>P.S. Expected time spent / Person : 16</a:t>
+            </a:r>
+            <a:endParaRPr kumimoji="0" lang="en-US" sz="2000" b="0" i="0" u="none" strike="noStrike" kern="1200" cap="none" spc="0" normalizeH="0" baseline="0" noProof="0" dirty="0">
+              <a:ln>
+                <a:noFill/>
+              </a:ln>
+              <a:solidFill>
+                <a:schemeClr val="tx1"/>
+              </a:solidFill>
+              <a:effectLst/>
+              <a:uLnTx/>
+              <a:uFillTx/>
+              <a:latin typeface="+mj-lt"/>
+              <a:ea typeface="+mj-ea"/>
+              <a:cs typeface="+mj-cs"/>
+            </a:endParaRPr>
+          </a:p>
+        </p:txBody>
+      </p:sp>
+    </p:spTree>
+    <p:extLst>
+      <p:ext uri="{BB962C8B-B14F-4D97-AF65-F5344CB8AC3E}">
+        <p14:creationId xmlns:p14="http://schemas.microsoft.com/office/powerpoint/2010/main" val="3838499978"/>
+      </p:ext>
+    </p:extLst>
+  </p:cSld>
+  <p:clrMapOvr>
+    <a:masterClrMapping/>
+  </p:clrMapOvr>
+  <mc:AlternateContent xmlns:mc="http://schemas.openxmlformats.org/markup-compatibility/2006" xmlns:p14="http://schemas.microsoft.com/office/powerpoint/2010/main">
+    <mc:Choice Requires="p14">
+      <p:transition p14:dur="0"/>
+    </mc:Choice>
+    <mc:Fallback xmlns="">
+      <p:transition/>
+    </mc:Fallback>
+  </mc:AlternateContent>
+  <p:timing>
+    <p:tnLst>
+      <p:par>
+        <p:cTn id="1" dur="indefinite" restart="never" nodeType="tmRoot"/>
+      </p:par>
+    </p:tnLst>
+  </p:timing>
 </p:sld>
 </file>
 

</xml_diff>

<commit_message>
*Minor edits to class diagram
</commit_message>
<xml_diff>
--- a/doc/D2/Slides.pptx
+++ b/doc/D2/Slides.pptx
@@ -569,11 +569,11 @@
         </c:dLbls>
         <c:marker val="1"/>
         <c:smooth val="0"/>
-        <c:axId val="84777216"/>
-        <c:axId val="86048768"/>
+        <c:axId val="88312064"/>
+        <c:axId val="88346624"/>
       </c:lineChart>
       <c:dateAx>
-        <c:axId val="84777216"/>
+        <c:axId val="88312064"/>
         <c:scaling>
           <c:orientation val="minMax"/>
         </c:scaling>
@@ -593,14 +593,14 @@
             <a:endParaRPr lang="en-US"/>
           </a:p>
         </c:txPr>
-        <c:crossAx val="86048768"/>
+        <c:crossAx val="88346624"/>
         <c:crosses val="autoZero"/>
         <c:auto val="1"/>
         <c:lblOffset val="100"/>
         <c:baseTimeUnit val="days"/>
       </c:dateAx>
       <c:valAx>
-        <c:axId val="86048768"/>
+        <c:axId val="88346624"/>
         <c:scaling>
           <c:orientation val="minMax"/>
         </c:scaling>
@@ -621,7 +621,7 @@
             <a:endParaRPr lang="en-US"/>
           </a:p>
         </c:txPr>
-        <c:crossAx val="84777216"/>
+        <c:crossAx val="88312064"/>
         <c:crosses val="autoZero"/>
         <c:crossBetween val="between"/>
       </c:valAx>
@@ -4862,7 +4862,7 @@
       </p:sp>
       <p:pic>
         <p:nvPicPr>
-          <p:cNvPr id="1026" name="Picture 2" descr="C:\Users\edward\Dropbox\src\year2\seg2012gp9\src\ClassDiagrams\img\classDiagram.png"/>
+          <p:cNvPr id="1027" name="Picture 3" descr="C:\Users\edward\Dropbox\src\year2\seg2012gp9\src\ClassDiagrams\img\classDiagram.png"/>
           <p:cNvPicPr>
             <a:picLocks noChangeAspect="1" noChangeArrowheads="1"/>
           </p:cNvPicPr>
@@ -4883,23 +4883,27 @@
         </p:blipFill>
         <p:spPr bwMode="auto">
           <a:xfrm>
-            <a:off x="152400" y="1752600"/>
-            <a:ext cx="8806805" cy="4096046"/>
+            <a:off x="228600" y="1828800"/>
+            <a:ext cx="8681578" cy="3971925"/>
           </a:xfrm>
           <a:prstGeom prst="rect">
             <a:avLst/>
           </a:prstGeom>
-          <a:noFill/>
-          <a:extLst>
-            <a:ext uri="{909E8E84-426E-40DD-AFC4-6F175D3DCCD1}">
-              <a14:hiddenFill xmlns:a14="http://schemas.microsoft.com/office/drawing/2010/main">
-                <a:solidFill>
-                  <a:srgbClr val="FFFFFF"/>
-                </a:solidFill>
-              </a14:hiddenFill>
-            </a:ext>
-          </a:extLst>
         </p:spPr>
+        <p:style>
+          <a:lnRef idx="2">
+            <a:schemeClr val="accent5"/>
+          </a:lnRef>
+          <a:fillRef idx="1">
+            <a:schemeClr val="lt1"/>
+          </a:fillRef>
+          <a:effectRef idx="0">
+            <a:schemeClr val="accent5"/>
+          </a:effectRef>
+          <a:fontRef idx="minor">
+            <a:schemeClr val="dk1"/>
+          </a:fontRef>
+        </p:style>
       </p:pic>
     </p:spTree>
     <p:extLst>

</xml_diff>

<commit_message>
* Modified the Slides.pptx : Modified the content page's title, added use case diagram * Modified the Test2 for having a better demonstration in D2
</commit_message>
<xml_diff>
--- a/doc/D2/Slides.pptx
+++ b/doc/D2/Slides.pptx
@@ -5,19 +5,20 @@
     <p:sldMasterId id="2147483756" r:id="rId1"/>
   </p:sldMasterIdLst>
   <p:notesMasterIdLst>
-    <p:notesMasterId r:id="rId12"/>
+    <p:notesMasterId r:id="rId13"/>
   </p:notesMasterIdLst>
   <p:sldIdLst>
     <p:sldId id="256" r:id="rId2"/>
     <p:sldId id="261" r:id="rId3"/>
     <p:sldId id="258" r:id="rId4"/>
-    <p:sldId id="257" r:id="rId5"/>
-    <p:sldId id="262" r:id="rId6"/>
-    <p:sldId id="266" r:id="rId7"/>
-    <p:sldId id="263" r:id="rId8"/>
-    <p:sldId id="267" r:id="rId9"/>
-    <p:sldId id="264" r:id="rId10"/>
-    <p:sldId id="265" r:id="rId11"/>
+    <p:sldId id="268" r:id="rId5"/>
+    <p:sldId id="257" r:id="rId6"/>
+    <p:sldId id="262" r:id="rId7"/>
+    <p:sldId id="266" r:id="rId8"/>
+    <p:sldId id="263" r:id="rId9"/>
+    <p:sldId id="267" r:id="rId10"/>
+    <p:sldId id="264" r:id="rId11"/>
+    <p:sldId id="265" r:id="rId12"/>
   </p:sldIdLst>
   <p:sldSz cx="9144000" cy="6858000" type="screen4x3"/>
   <p:notesSz cx="6858000" cy="9144000"/>
@@ -121,17 +122,7 @@
 
 <file path=ppt/charts/chart1.xml><?xml version="1.0" encoding="utf-8"?>
 <c:chartSpace xmlns:c="http://schemas.openxmlformats.org/drawingml/2006/chart" xmlns:a="http://schemas.openxmlformats.org/drawingml/2006/main" xmlns:r="http://schemas.openxmlformats.org/officeDocument/2006/relationships">
-  <c:date1904 val="0"/>
-  <c:lang val="en-GB"/>
-  <c:roundedCorners val="0"/>
-  <mc:AlternateContent xmlns:mc="http://schemas.openxmlformats.org/markup-compatibility/2006">
-    <mc:Choice xmlns:c14="http://schemas.microsoft.com/office/drawing/2007/8/2/chart" Requires="c14">
-      <c14:style val="102"/>
-    </mc:Choice>
-    <mc:Fallback>
-      <c:style val="2"/>
-    </mc:Fallback>
-  </mc:AlternateContent>
+  <c:lang val="zh-TW"/>
   <c:chart>
     <c:title>
       <c:tx>
@@ -151,9 +142,7 @@
         </c:rich>
       </c:tx>
       <c:layout/>
-      <c:overlay val="0"/>
     </c:title>
-    <c:autoTitleDeleted val="0"/>
     <c:plotArea>
       <c:layout/>
       <c:pieChart>
@@ -169,15 +158,10 @@
                 <a:pPr>
                   <a:defRPr sz="2000" baseline="0"/>
                 </a:pPr>
-                <a:endParaRPr lang="en-US"/>
+                <a:endParaRPr lang="zh-TW"/>
               </a:p>
             </c:txPr>
-            <c:showLegendKey val="0"/>
             <c:showVal val="1"/>
-            <c:showCatName val="0"/>
-            <c:showSerName val="0"/>
-            <c:showPercent val="0"/>
-            <c:showBubbleSize val="0"/>
             <c:showLeaderLines val="1"/>
           </c:dLbls>
           <c:cat>
@@ -228,15 +212,7 @@
             </c:numRef>
           </c:val>
         </c:ser>
-        <c:dLbls>
-          <c:showLegendKey val="0"/>
-          <c:showVal val="0"/>
-          <c:showCatName val="0"/>
-          <c:showSerName val="0"/>
-          <c:showPercent val="0"/>
-          <c:showBubbleSize val="0"/>
-          <c:showLeaderLines val="1"/>
-        </c:dLbls>
+        <c:dLbls/>
         <c:firstSliceAng val="0"/>
       </c:pieChart>
     </c:plotArea>
@@ -247,12 +223,11 @@
           <c:xMode val="edge"/>
           <c:yMode val="edge"/>
           <c:x val="0.72001361885616322"/>
-          <c:y val="0.27082634831936347"/>
+          <c:y val="0.27082634831936353"/>
           <c:w val="0.18445160964315752"/>
-          <c:h val="0.54069511472356302"/>
+          <c:h val="0.54069511472356313"/>
         </c:manualLayout>
       </c:layout>
-      <c:overlay val="0"/>
       <c:txPr>
         <a:bodyPr/>
         <a:lstStyle/>
@@ -260,33 +235,20 @@
           <a:pPr>
             <a:defRPr sz="2000" baseline="0"/>
           </a:pPr>
-          <a:endParaRPr lang="en-US"/>
+          <a:endParaRPr lang="zh-TW"/>
         </a:p>
       </c:txPr>
     </c:legend>
     <c:plotVisOnly val="1"/>
-    <c:dispBlanksAs val="gap"/>
-    <c:showDLblsOverMax val="0"/>
+    <c:dispBlanksAs val="zero"/>
   </c:chart>
-  <c:externalData r:id="rId1">
-    <c:autoUpdate val="0"/>
-  </c:externalData>
+  <c:externalData r:id="rId1"/>
 </c:chartSpace>
 </file>
 
 <file path=ppt/charts/chart2.xml><?xml version="1.0" encoding="utf-8"?>
 <c:chartSpace xmlns:c="http://schemas.openxmlformats.org/drawingml/2006/chart" xmlns:a="http://schemas.openxmlformats.org/drawingml/2006/main" xmlns:r="http://schemas.openxmlformats.org/officeDocument/2006/relationships">
-  <c:date1904 val="0"/>
-  <c:lang val="en-GB"/>
-  <c:roundedCorners val="0"/>
-  <mc:AlternateContent xmlns:mc="http://schemas.openxmlformats.org/markup-compatibility/2006">
-    <mc:Choice xmlns:c14="http://schemas.microsoft.com/office/drawing/2007/8/2/chart" Requires="c14">
-      <c14:style val="102"/>
-    </mc:Choice>
-    <mc:Fallback>
-      <c:style val="2"/>
-    </mc:Fallback>
-  </mc:AlternateContent>
+  <c:lang val="zh-TW"/>
   <c:chart>
     <c:title>
       <c:tx>
@@ -306,24 +268,21 @@
         </c:rich>
       </c:tx>
       <c:layout/>
-      <c:overlay val="0"/>
     </c:title>
-    <c:autoTitleDeleted val="0"/>
     <c:plotArea>
       <c:layout>
         <c:manualLayout>
           <c:layoutTarget val="inner"/>
           <c:xMode val="edge"/>
           <c:yMode val="edge"/>
-          <c:x val="6.7119203849518805E-2"/>
-          <c:y val="0.16030545094906615"/>
-          <c:w val="0.65812773403324587"/>
+          <c:x val="6.7119203849518833E-2"/>
+          <c:y val="0.16030545094906617"/>
+          <c:w val="0.65812773403324598"/>
           <c:h val="0.70810015595876608"/>
         </c:manualLayout>
       </c:layout>
       <c:lineChart>
         <c:grouping val="standard"/>
-        <c:varyColors val="0"/>
         <c:ser>
           <c:idx val="0"/>
           <c:order val="0"/>
@@ -346,46 +305,31 @@
               <c:idx val="0"/>
               <c:layout>
                 <c:manualLayout>
-                  <c:x val="1.3888888888888889E-3"/>
-                  <c:y val="4.1095890410958902E-2"/>
+                  <c:x val="1.3888888888888894E-3"/>
+                  <c:y val="4.1095890410958895E-2"/>
                 </c:manualLayout>
               </c:layout>
-              <c:showLegendKey val="0"/>
               <c:showVal val="1"/>
-              <c:showCatName val="0"/>
-              <c:showSerName val="0"/>
-              <c:showPercent val="0"/>
-              <c:showBubbleSize val="0"/>
             </c:dLbl>
             <c:dLbl>
               <c:idx val="1"/>
               <c:layout>
                 <c:manualLayout>
                   <c:x val="5.5555555555555558E-3"/>
-                  <c:y val="1.5981735159817351E-2"/>
+                  <c:y val="1.5981735159817354E-2"/>
                 </c:manualLayout>
               </c:layout>
-              <c:showLegendKey val="0"/>
               <c:showVal val="1"/>
-              <c:showCatName val="0"/>
-              <c:showSerName val="0"/>
-              <c:showPercent val="0"/>
-              <c:showBubbleSize val="0"/>
             </c:dLbl>
             <c:dLbl>
               <c:idx val="2"/>
               <c:layout>
                 <c:manualLayout>
-                  <c:x val="-1.8055555555555554E-2"/>
+                  <c:x val="-1.8055555555555557E-2"/>
                   <c:y val="-5.2511415525114152E-2"/>
                 </c:manualLayout>
               </c:layout>
-              <c:showLegendKey val="0"/>
               <c:showVal val="1"/>
-              <c:showCatName val="0"/>
-              <c:showSerName val="0"/>
-              <c:showPercent val="0"/>
-              <c:showBubbleSize val="0"/>
             </c:dLbl>
             <c:txPr>
               <a:bodyPr/>
@@ -394,16 +338,10 @@
                 <a:pPr>
                   <a:defRPr sz="1500" baseline="0"/>
                 </a:pPr>
-                <a:endParaRPr lang="en-US"/>
+                <a:endParaRPr lang="zh-TW"/>
               </a:p>
             </c:txPr>
-            <c:showLegendKey val="0"/>
             <c:showVal val="1"/>
-            <c:showCatName val="0"/>
-            <c:showSerName val="0"/>
-            <c:showPercent val="0"/>
-            <c:showBubbleSize val="0"/>
-            <c:showLeaderLines val="0"/>
           </c:dLbls>
           <c:cat>
             <c:numRef>
@@ -447,7 +385,6 @@
               </c:numCache>
             </c:numRef>
           </c:val>
-          <c:smooth val="0"/>
         </c:ser>
         <c:ser>
           <c:idx val="1"/>
@@ -472,30 +409,20 @@
               <c:layout>
                 <c:manualLayout>
                   <c:x val="1.3888888888888889E-3"/>
-                  <c:y val="-3.8812785388127852E-2"/>
+                  <c:y val="-2.7397260273972601E-2"/>
                 </c:manualLayout>
               </c:layout>
-              <c:showLegendKey val="0"/>
               <c:showVal val="1"/>
-              <c:showCatName val="0"/>
-              <c:showSerName val="0"/>
-              <c:showPercent val="0"/>
-              <c:showBubbleSize val="0"/>
             </c:dLbl>
             <c:dLbl>
               <c:idx val="1"/>
               <c:layout>
                 <c:manualLayout>
-                  <c:x val="-1.3888888888888889E-3"/>
+                  <c:x val="-1.3888888888888894E-3"/>
                   <c:y val="-6.3926940639269486E-2"/>
                 </c:manualLayout>
               </c:layout>
-              <c:showLegendKey val="0"/>
               <c:showVal val="1"/>
-              <c:showCatName val="0"/>
-              <c:showSerName val="0"/>
-              <c:showPercent val="0"/>
-              <c:showBubbleSize val="0"/>
             </c:dLbl>
             <c:txPr>
               <a:bodyPr/>
@@ -504,16 +431,10 @@
                 <a:pPr>
                   <a:defRPr sz="1500" baseline="0"/>
                 </a:pPr>
-                <a:endParaRPr lang="en-US"/>
+                <a:endParaRPr lang="zh-TW"/>
               </a:p>
             </c:txPr>
-            <c:showLegendKey val="0"/>
             <c:showVal val="1"/>
-            <c:showCatName val="0"/>
-            <c:showSerName val="0"/>
-            <c:showPercent val="0"/>
-            <c:showBubbleSize val="0"/>
-            <c:showLeaderLines val="0"/>
           </c:dLbls>
           <c:cat>
             <c:numRef>
@@ -557,31 +478,19 @@
               </c:numCache>
             </c:numRef>
           </c:val>
-          <c:smooth val="0"/>
         </c:ser>
-        <c:dLbls>
-          <c:showLegendKey val="0"/>
-          <c:showVal val="0"/>
-          <c:showCatName val="0"/>
-          <c:showSerName val="0"/>
-          <c:showPercent val="0"/>
-          <c:showBubbleSize val="0"/>
-        </c:dLbls>
+        <c:dLbls/>
         <c:marker val="1"/>
-        <c:smooth val="0"/>
-        <c:axId val="76456704"/>
-        <c:axId val="76458240"/>
+        <c:axId val="126682624"/>
+        <c:axId val="126684160"/>
       </c:lineChart>
       <c:dateAx>
-        <c:axId val="76456704"/>
+        <c:axId val="126682624"/>
         <c:scaling>
           <c:orientation val="minMax"/>
         </c:scaling>
-        <c:delete val="0"/>
         <c:axPos val="b"/>
         <c:numFmt formatCode="d\-mmm" sourceLinked="1"/>
-        <c:majorTickMark val="out"/>
-        <c:minorTickMark val="none"/>
         <c:tickLblPos val="nextTo"/>
         <c:txPr>
           <a:bodyPr/>
@@ -590,26 +499,23 @@
             <a:pPr>
               <a:defRPr sz="1500" baseline="0"/>
             </a:pPr>
-            <a:endParaRPr lang="en-US"/>
+            <a:endParaRPr lang="zh-TW"/>
           </a:p>
         </c:txPr>
-        <c:crossAx val="76458240"/>
+        <c:crossAx val="126684160"/>
         <c:crosses val="autoZero"/>
         <c:auto val="1"/>
         <c:lblOffset val="100"/>
         <c:baseTimeUnit val="days"/>
       </c:dateAx>
       <c:valAx>
-        <c:axId val="76458240"/>
+        <c:axId val="126684160"/>
         <c:scaling>
           <c:orientation val="minMax"/>
         </c:scaling>
-        <c:delete val="0"/>
         <c:axPos val="l"/>
         <c:majorGridlines/>
         <c:numFmt formatCode="General" sourceLinked="1"/>
-        <c:majorTickMark val="out"/>
-        <c:minorTickMark val="none"/>
         <c:tickLblPos val="nextTo"/>
         <c:txPr>
           <a:bodyPr/>
@@ -618,10 +524,10 @@
             <a:pPr>
               <a:defRPr sz="2000" baseline="0"/>
             </a:pPr>
-            <a:endParaRPr lang="en-US"/>
+            <a:endParaRPr lang="zh-TW"/>
           </a:p>
         </c:txPr>
-        <c:crossAx val="76456704"/>
+        <c:crossAx val="126682624"/>
         <c:crosses val="autoZero"/>
         <c:crossBetween val="between"/>
       </c:valAx>
@@ -632,13 +538,12 @@
         <c:manualLayout>
           <c:xMode val="edge"/>
           <c:yMode val="edge"/>
-          <c:x val="0.74414523184601911"/>
-          <c:y val="0.38238557509078486"/>
-          <c:w val="0.25429024496937885"/>
+          <c:x val="0.74414523184601922"/>
+          <c:y val="0.38238557509078497"/>
+          <c:w val="0.2542902449693788"/>
           <c:h val="0.40572825657066841"/>
         </c:manualLayout>
       </c:layout>
-      <c:overlay val="0"/>
       <c:txPr>
         <a:bodyPr/>
         <a:lstStyle/>
@@ -646,17 +551,14 @@
           <a:pPr>
             <a:defRPr sz="1800" baseline="0"/>
           </a:pPr>
-          <a:endParaRPr lang="en-US"/>
+          <a:endParaRPr lang="zh-TW"/>
         </a:p>
       </c:txPr>
     </c:legend>
     <c:plotVisOnly val="1"/>
     <c:dispBlanksAs val="gap"/>
-    <c:showDLblsOverMax val="0"/>
   </c:chart>
-  <c:externalData r:id="rId1">
-    <c:autoUpdate val="0"/>
-  </c:externalData>
+  <c:externalData r:id="rId1"/>
 </c:chartSpace>
 </file>
 
@@ -912,7 +814,7 @@
     </p:spTree>
     <p:extLst>
       <p:ext uri="{BB962C8B-B14F-4D97-AF65-F5344CB8AC3E}">
-        <p14:creationId xmlns:p14="http://schemas.microsoft.com/office/powerpoint/2010/main" val="1229168759"/>
+        <p14:creationId xmlns:p14="http://schemas.microsoft.com/office/powerpoint/2010/main" xmlns="" val="1229168759"/>
       </p:ext>
     </p:extLst>
   </p:cSld>
@@ -1090,7 +992,7 @@
             <a:fld id="{EC6078B8-B29D-44C4-8B20-495FFF114CDA}" type="slidenum">
               <a:rPr lang="en-US" smtClean="0"/>
               <a:pPr/>
-              <a:t>7</a:t>
+              <a:t>8</a:t>
             </a:fld>
             <a:endParaRPr lang="en-US"/>
           </a:p>
@@ -1099,7 +1001,7 @@
     </p:spTree>
     <p:extLst>
       <p:ext uri="{BB962C8B-B14F-4D97-AF65-F5344CB8AC3E}">
-        <p14:creationId xmlns:p14="http://schemas.microsoft.com/office/powerpoint/2010/main" val="558691801"/>
+        <p14:creationId xmlns:p14="http://schemas.microsoft.com/office/powerpoint/2010/main" xmlns="" val="558691801"/>
       </p:ext>
     </p:extLst>
   </p:cSld>
@@ -1343,18 +1245,18 @@
     </p:spTree>
     <p:extLst>
       <p:ext uri="{BB962C8B-B14F-4D97-AF65-F5344CB8AC3E}">
-        <p14:creationId xmlns:p14="http://schemas.microsoft.com/office/powerpoint/2010/main" val="912485160"/>
+        <p14:creationId xmlns:p14="http://schemas.microsoft.com/office/powerpoint/2010/main" xmlns="" val="912485160"/>
       </p:ext>
     </p:extLst>
   </p:cSld>
   <p:clrMapOvr>
     <a:masterClrMapping/>
   </p:clrMapOvr>
-  <mc:AlternateContent xmlns:mc="http://schemas.openxmlformats.org/markup-compatibility/2006" xmlns:p14="http://schemas.microsoft.com/office/powerpoint/2010/main">
-    <mc:Choice Requires="p14">
+  <mc:AlternateContent xmlns:mc="http://schemas.openxmlformats.org/markup-compatibility/2006">
+    <mc:Choice xmlns:p14="http://schemas.microsoft.com/office/powerpoint/2010/main" xmlns="" Requires="p14">
       <p:transition p14:dur="0"/>
     </mc:Choice>
-    <mc:Fallback xmlns="">
+    <mc:Fallback>
       <p:transition/>
     </mc:Fallback>
   </mc:AlternateContent>
@@ -1523,18 +1425,18 @@
     </p:spTree>
     <p:extLst>
       <p:ext uri="{BB962C8B-B14F-4D97-AF65-F5344CB8AC3E}">
-        <p14:creationId xmlns:p14="http://schemas.microsoft.com/office/powerpoint/2010/main" val="735022636"/>
+        <p14:creationId xmlns:p14="http://schemas.microsoft.com/office/powerpoint/2010/main" xmlns="" val="735022636"/>
       </p:ext>
     </p:extLst>
   </p:cSld>
   <p:clrMapOvr>
     <a:masterClrMapping/>
   </p:clrMapOvr>
-  <mc:AlternateContent xmlns:mc="http://schemas.openxmlformats.org/markup-compatibility/2006" xmlns:p14="http://schemas.microsoft.com/office/powerpoint/2010/main">
-    <mc:Choice Requires="p14">
+  <mc:AlternateContent xmlns:mc="http://schemas.openxmlformats.org/markup-compatibility/2006">
+    <mc:Choice xmlns:p14="http://schemas.microsoft.com/office/powerpoint/2010/main" xmlns="" Requires="p14">
       <p:transition p14:dur="0"/>
     </mc:Choice>
-    <mc:Fallback xmlns="">
+    <mc:Fallback>
       <p:transition/>
     </mc:Fallback>
   </mc:AlternateContent>
@@ -1713,18 +1615,18 @@
     </p:spTree>
     <p:extLst>
       <p:ext uri="{BB962C8B-B14F-4D97-AF65-F5344CB8AC3E}">
-        <p14:creationId xmlns:p14="http://schemas.microsoft.com/office/powerpoint/2010/main" val="3882791656"/>
+        <p14:creationId xmlns:p14="http://schemas.microsoft.com/office/powerpoint/2010/main" xmlns="" val="3882791656"/>
       </p:ext>
     </p:extLst>
   </p:cSld>
   <p:clrMapOvr>
     <a:masterClrMapping/>
   </p:clrMapOvr>
-  <mc:AlternateContent xmlns:mc="http://schemas.openxmlformats.org/markup-compatibility/2006" xmlns:p14="http://schemas.microsoft.com/office/powerpoint/2010/main">
-    <mc:Choice Requires="p14">
+  <mc:AlternateContent xmlns:mc="http://schemas.openxmlformats.org/markup-compatibility/2006">
+    <mc:Choice xmlns:p14="http://schemas.microsoft.com/office/powerpoint/2010/main" xmlns="" Requires="p14">
       <p:transition p14:dur="0"/>
     </mc:Choice>
-    <mc:Fallback xmlns="">
+    <mc:Fallback>
       <p:transition/>
     </mc:Fallback>
   </mc:AlternateContent>
@@ -1893,18 +1795,18 @@
     </p:spTree>
     <p:extLst>
       <p:ext uri="{BB962C8B-B14F-4D97-AF65-F5344CB8AC3E}">
-        <p14:creationId xmlns:p14="http://schemas.microsoft.com/office/powerpoint/2010/main" val="1548358692"/>
+        <p14:creationId xmlns:p14="http://schemas.microsoft.com/office/powerpoint/2010/main" xmlns="" val="1548358692"/>
       </p:ext>
     </p:extLst>
   </p:cSld>
   <p:clrMapOvr>
     <a:masterClrMapping/>
   </p:clrMapOvr>
-  <mc:AlternateContent xmlns:mc="http://schemas.openxmlformats.org/markup-compatibility/2006" xmlns:p14="http://schemas.microsoft.com/office/powerpoint/2010/main">
-    <mc:Choice Requires="p14">
+  <mc:AlternateContent xmlns:mc="http://schemas.openxmlformats.org/markup-compatibility/2006">
+    <mc:Choice xmlns:p14="http://schemas.microsoft.com/office/powerpoint/2010/main" xmlns="" Requires="p14">
       <p:transition p14:dur="0"/>
     </mc:Choice>
-    <mc:Fallback xmlns="">
+    <mc:Fallback>
       <p:transition/>
     </mc:Fallback>
   </mc:AlternateContent>
@@ -2149,18 +2051,18 @@
     </p:spTree>
     <p:extLst>
       <p:ext uri="{BB962C8B-B14F-4D97-AF65-F5344CB8AC3E}">
-        <p14:creationId xmlns:p14="http://schemas.microsoft.com/office/powerpoint/2010/main" val="2204643936"/>
+        <p14:creationId xmlns:p14="http://schemas.microsoft.com/office/powerpoint/2010/main" xmlns="" val="2204643936"/>
       </p:ext>
     </p:extLst>
   </p:cSld>
   <p:clrMapOvr>
     <a:masterClrMapping/>
   </p:clrMapOvr>
-  <mc:AlternateContent xmlns:mc="http://schemas.openxmlformats.org/markup-compatibility/2006" xmlns:p14="http://schemas.microsoft.com/office/powerpoint/2010/main">
-    <mc:Choice Requires="p14">
+  <mc:AlternateContent xmlns:mc="http://schemas.openxmlformats.org/markup-compatibility/2006">
+    <mc:Choice xmlns:p14="http://schemas.microsoft.com/office/powerpoint/2010/main" xmlns="" Requires="p14">
       <p:transition p14:dur="0"/>
     </mc:Choice>
-    <mc:Fallback xmlns="">
+    <mc:Fallback>
       <p:transition/>
     </mc:Fallback>
   </mc:AlternateContent>
@@ -2447,18 +2349,18 @@
     </p:spTree>
     <p:extLst>
       <p:ext uri="{BB962C8B-B14F-4D97-AF65-F5344CB8AC3E}">
-        <p14:creationId xmlns:p14="http://schemas.microsoft.com/office/powerpoint/2010/main" val="3364290513"/>
+        <p14:creationId xmlns:p14="http://schemas.microsoft.com/office/powerpoint/2010/main" xmlns="" val="3364290513"/>
       </p:ext>
     </p:extLst>
   </p:cSld>
   <p:clrMapOvr>
     <a:masterClrMapping/>
   </p:clrMapOvr>
-  <mc:AlternateContent xmlns:mc="http://schemas.openxmlformats.org/markup-compatibility/2006" xmlns:p14="http://schemas.microsoft.com/office/powerpoint/2010/main">
-    <mc:Choice Requires="p14">
+  <mc:AlternateContent xmlns:mc="http://schemas.openxmlformats.org/markup-compatibility/2006">
+    <mc:Choice xmlns:p14="http://schemas.microsoft.com/office/powerpoint/2010/main" xmlns="" Requires="p14">
       <p:transition p14:dur="0"/>
     </mc:Choice>
-    <mc:Fallback xmlns="">
+    <mc:Fallback>
       <p:transition/>
     </mc:Fallback>
   </mc:AlternateContent>
@@ -2879,18 +2781,18 @@
     </p:spTree>
     <p:extLst>
       <p:ext uri="{BB962C8B-B14F-4D97-AF65-F5344CB8AC3E}">
-        <p14:creationId xmlns:p14="http://schemas.microsoft.com/office/powerpoint/2010/main" val="3061895688"/>
+        <p14:creationId xmlns:p14="http://schemas.microsoft.com/office/powerpoint/2010/main" xmlns="" val="3061895688"/>
       </p:ext>
     </p:extLst>
   </p:cSld>
   <p:clrMapOvr>
     <a:masterClrMapping/>
   </p:clrMapOvr>
-  <mc:AlternateContent xmlns:mc="http://schemas.openxmlformats.org/markup-compatibility/2006" xmlns:p14="http://schemas.microsoft.com/office/powerpoint/2010/main">
-    <mc:Choice Requires="p14">
+  <mc:AlternateContent xmlns:mc="http://schemas.openxmlformats.org/markup-compatibility/2006">
+    <mc:Choice xmlns:p14="http://schemas.microsoft.com/office/powerpoint/2010/main" xmlns="" Requires="p14">
       <p:transition p14:dur="0"/>
     </mc:Choice>
-    <mc:Fallback xmlns="">
+    <mc:Fallback>
       <p:transition/>
     </mc:Fallback>
   </mc:AlternateContent>
@@ -3007,18 +2909,18 @@
     </p:spTree>
     <p:extLst>
       <p:ext uri="{BB962C8B-B14F-4D97-AF65-F5344CB8AC3E}">
-        <p14:creationId xmlns:p14="http://schemas.microsoft.com/office/powerpoint/2010/main" val="2535646022"/>
+        <p14:creationId xmlns:p14="http://schemas.microsoft.com/office/powerpoint/2010/main" xmlns="" val="2535646022"/>
       </p:ext>
     </p:extLst>
   </p:cSld>
   <p:clrMapOvr>
     <a:masterClrMapping/>
   </p:clrMapOvr>
-  <mc:AlternateContent xmlns:mc="http://schemas.openxmlformats.org/markup-compatibility/2006" xmlns:p14="http://schemas.microsoft.com/office/powerpoint/2010/main">
-    <mc:Choice Requires="p14">
+  <mc:AlternateContent xmlns:mc="http://schemas.openxmlformats.org/markup-compatibility/2006">
+    <mc:Choice xmlns:p14="http://schemas.microsoft.com/office/powerpoint/2010/main" xmlns="" Requires="p14">
       <p:transition p14:dur="0"/>
     </mc:Choice>
-    <mc:Fallback xmlns="">
+    <mc:Fallback>
       <p:transition/>
     </mc:Fallback>
   </mc:AlternateContent>
@@ -3112,18 +3014,18 @@
     </p:spTree>
     <p:extLst>
       <p:ext uri="{BB962C8B-B14F-4D97-AF65-F5344CB8AC3E}">
-        <p14:creationId xmlns:p14="http://schemas.microsoft.com/office/powerpoint/2010/main" val="2904577763"/>
+        <p14:creationId xmlns:p14="http://schemas.microsoft.com/office/powerpoint/2010/main" xmlns="" val="2904577763"/>
       </p:ext>
     </p:extLst>
   </p:cSld>
   <p:clrMapOvr>
     <a:masterClrMapping/>
   </p:clrMapOvr>
-  <mc:AlternateContent xmlns:mc="http://schemas.openxmlformats.org/markup-compatibility/2006" xmlns:p14="http://schemas.microsoft.com/office/powerpoint/2010/main">
-    <mc:Choice Requires="p14">
+  <mc:AlternateContent xmlns:mc="http://schemas.openxmlformats.org/markup-compatibility/2006">
+    <mc:Choice xmlns:p14="http://schemas.microsoft.com/office/powerpoint/2010/main" xmlns="" Requires="p14">
       <p:transition p14:dur="0"/>
     </mc:Choice>
-    <mc:Fallback xmlns="">
+    <mc:Fallback>
       <p:transition/>
     </mc:Fallback>
   </mc:AlternateContent>
@@ -3399,18 +3301,18 @@
     </p:spTree>
     <p:extLst>
       <p:ext uri="{BB962C8B-B14F-4D97-AF65-F5344CB8AC3E}">
-        <p14:creationId xmlns:p14="http://schemas.microsoft.com/office/powerpoint/2010/main" val="952417034"/>
+        <p14:creationId xmlns:p14="http://schemas.microsoft.com/office/powerpoint/2010/main" xmlns="" val="952417034"/>
       </p:ext>
     </p:extLst>
   </p:cSld>
   <p:clrMapOvr>
     <a:masterClrMapping/>
   </p:clrMapOvr>
-  <mc:AlternateContent xmlns:mc="http://schemas.openxmlformats.org/markup-compatibility/2006" xmlns:p14="http://schemas.microsoft.com/office/powerpoint/2010/main">
-    <mc:Choice Requires="p14">
+  <mc:AlternateContent xmlns:mc="http://schemas.openxmlformats.org/markup-compatibility/2006">
+    <mc:Choice xmlns:p14="http://schemas.microsoft.com/office/powerpoint/2010/main" xmlns="" Requires="p14">
       <p:transition p14:dur="0"/>
     </mc:Choice>
-    <mc:Fallback xmlns="">
+    <mc:Fallback>
       <p:transition/>
     </mc:Fallback>
   </mc:AlternateContent>
@@ -3662,18 +3564,18 @@
     </p:spTree>
     <p:extLst>
       <p:ext uri="{BB962C8B-B14F-4D97-AF65-F5344CB8AC3E}">
-        <p14:creationId xmlns:p14="http://schemas.microsoft.com/office/powerpoint/2010/main" val="1836398859"/>
+        <p14:creationId xmlns:p14="http://schemas.microsoft.com/office/powerpoint/2010/main" xmlns="" val="1836398859"/>
       </p:ext>
     </p:extLst>
   </p:cSld>
   <p:clrMapOvr>
     <a:masterClrMapping/>
   </p:clrMapOvr>
-  <mc:AlternateContent xmlns:mc="http://schemas.openxmlformats.org/markup-compatibility/2006" xmlns:p14="http://schemas.microsoft.com/office/powerpoint/2010/main">
-    <mc:Choice Requires="p14">
+  <mc:AlternateContent xmlns:mc="http://schemas.openxmlformats.org/markup-compatibility/2006">
+    <mc:Choice xmlns:p14="http://schemas.microsoft.com/office/powerpoint/2010/main" xmlns="" Requires="p14">
       <p:transition p14:dur="0"/>
     </mc:Choice>
-    <mc:Fallback xmlns="">
+    <mc:Fallback>
       <p:transition/>
     </mc:Fallback>
   </mc:AlternateContent>
@@ -3939,7 +3841,7 @@
     </p:spTree>
     <p:extLst>
       <p:ext uri="{BB962C8B-B14F-4D97-AF65-F5344CB8AC3E}">
-        <p14:creationId xmlns:p14="http://schemas.microsoft.com/office/powerpoint/2010/main" val="4244202142"/>
+        <p14:creationId xmlns:p14="http://schemas.microsoft.com/office/powerpoint/2010/main" xmlns="" val="4244202142"/>
       </p:ext>
     </p:extLst>
   </p:cSld>
@@ -3957,11 +3859,11 @@
     <p:sldLayoutId id="2147483766" r:id="rId10"/>
     <p:sldLayoutId id="2147483767" r:id="rId11"/>
   </p:sldLayoutIdLst>
-  <mc:AlternateContent xmlns:mc="http://schemas.openxmlformats.org/markup-compatibility/2006" xmlns:p14="http://schemas.microsoft.com/office/powerpoint/2010/main">
-    <mc:Choice Requires="p14">
+  <mc:AlternateContent xmlns:mc="http://schemas.openxmlformats.org/markup-compatibility/2006">
+    <mc:Choice xmlns:p14="http://schemas.microsoft.com/office/powerpoint/2010/main" xmlns="" Requires="p14">
       <p:transition p14:dur="0"/>
     </mc:Choice>
-    <mc:Fallback xmlns="">
+    <mc:Fallback>
       <p:transition/>
     </mc:Fallback>
   </mc:AlternateContent>
@@ -4252,7 +4154,7 @@
           <a:p>
             <a:r>
               <a:rPr lang="en-US" dirty="0" smtClean="0"/>
-              <a:t>D2</a:t>
+              <a:t>D2 – Presentation</a:t>
             </a:r>
             <a:endParaRPr lang="en-US" dirty="0"/>
           </a:p>
@@ -4311,18 +4213,18 @@
     </p:spTree>
     <p:extLst>
       <p:ext uri="{BB962C8B-B14F-4D97-AF65-F5344CB8AC3E}">
-        <p14:creationId xmlns:p14="http://schemas.microsoft.com/office/powerpoint/2010/main" val="1786804303"/>
+        <p14:creationId xmlns:p14="http://schemas.microsoft.com/office/powerpoint/2010/main" xmlns="" val="1786804303"/>
       </p:ext>
     </p:extLst>
   </p:cSld>
   <p:clrMapOvr>
     <a:masterClrMapping/>
   </p:clrMapOvr>
-  <mc:AlternateContent xmlns:mc="http://schemas.openxmlformats.org/markup-compatibility/2006" xmlns:p14="http://schemas.microsoft.com/office/powerpoint/2010/main">
-    <mc:Choice Requires="p14">
+  <mc:AlternateContent xmlns:mc="http://schemas.openxmlformats.org/markup-compatibility/2006">
+    <mc:Choice xmlns:p14="http://schemas.microsoft.com/office/powerpoint/2010/main" xmlns="" Requires="p14">
       <p:transition p14:dur="0"/>
     </mc:Choice>
-    <mc:Fallback xmlns="">
+    <mc:Fallback>
       <p:transition/>
     </mc:Fallback>
   </mc:AlternateContent>
@@ -4383,6 +4285,169 @@
       </p:sp>
       <p:graphicFrame>
         <p:nvGraphicFramePr>
+          <p:cNvPr id="5" name="圖表 4"/>
+          <p:cNvGraphicFramePr/>
+          <p:nvPr/>
+        </p:nvGraphicFramePr>
+        <p:xfrm>
+          <a:off x="457200" y="1295400"/>
+          <a:ext cx="8458200" cy="5105400"/>
+        </p:xfrm>
+        <a:graphic>
+          <a:graphicData uri="http://schemas.openxmlformats.org/drawingml/2006/chart">
+            <c:chart xmlns:c="http://schemas.openxmlformats.org/drawingml/2006/chart" xmlns:r="http://schemas.openxmlformats.org/officeDocument/2006/relationships" r:id="rId2"/>
+          </a:graphicData>
+        </a:graphic>
+      </p:graphicFrame>
+      <p:sp>
+        <p:nvSpPr>
+          <p:cNvPr id="6" name="Title 1"/>
+          <p:cNvSpPr txBox="1">
+            <a:spLocks/>
+          </p:cNvSpPr>
+          <p:nvPr/>
+        </p:nvSpPr>
+        <p:spPr>
+          <a:xfrm>
+            <a:off x="0" y="6096000"/>
+            <a:ext cx="4191000" cy="762000"/>
+          </a:xfrm>
+          <a:prstGeom prst="rect">
+            <a:avLst/>
+          </a:prstGeom>
+        </p:spPr>
+        <p:txBody>
+          <a:bodyPr vert="horz" lIns="91440" tIns="45720" rIns="91440" bIns="45720" rtlCol="0" anchor="ctr">
+            <a:normAutofit/>
+          </a:bodyPr>
+          <a:lstStyle/>
+          <a:p>
+            <a:pPr marL="0" marR="0" lvl="0" indent="0" algn="ctr" defTabSz="914400" rtl="0" eaLnBrk="1" fontAlgn="auto" latinLnBrk="0" hangingPunct="1">
+              <a:lnSpc>
+                <a:spcPct val="100000"/>
+              </a:lnSpc>
+              <a:spcBef>
+                <a:spcPct val="0"/>
+              </a:spcBef>
+              <a:spcAft>
+                <a:spcPts val="0"/>
+              </a:spcAft>
+              <a:buClrTx/>
+              <a:buSzTx/>
+              <a:buFontTx/>
+              <a:buNone/>
+              <a:tabLst/>
+              <a:defRPr/>
+            </a:pPr>
+            <a:r>
+              <a:rPr kumimoji="0" lang="en-US" sz="2000" b="0" i="0" u="none" strike="noStrike" kern="1200" cap="none" spc="0" normalizeH="0" baseline="0" noProof="0" dirty="0" smtClean="0">
+                <a:ln>
+                  <a:noFill/>
+                </a:ln>
+                <a:solidFill>
+                  <a:schemeClr val="tx1"/>
+                </a:solidFill>
+                <a:effectLst/>
+                <a:uLnTx/>
+                <a:uFillTx/>
+                <a:latin typeface="+mj-lt"/>
+                <a:ea typeface="+mj-ea"/>
+                <a:cs typeface="+mj-cs"/>
+              </a:rPr>
+              <a:t>P.S. Expected time spent / Person : 16</a:t>
+            </a:r>
+            <a:endParaRPr kumimoji="0" lang="en-US" sz="2000" b="0" i="0" u="none" strike="noStrike" kern="1200" cap="none" spc="0" normalizeH="0" baseline="0" noProof="0" dirty="0">
+              <a:ln>
+                <a:noFill/>
+              </a:ln>
+              <a:solidFill>
+                <a:schemeClr val="tx1"/>
+              </a:solidFill>
+              <a:effectLst/>
+              <a:uLnTx/>
+              <a:uFillTx/>
+              <a:latin typeface="+mj-lt"/>
+              <a:ea typeface="+mj-ea"/>
+              <a:cs typeface="+mj-cs"/>
+            </a:endParaRPr>
+          </a:p>
+        </p:txBody>
+      </p:sp>
+    </p:spTree>
+    <p:extLst>
+      <p:ext uri="{BB962C8B-B14F-4D97-AF65-F5344CB8AC3E}">
+        <p14:creationId xmlns:p14="http://schemas.microsoft.com/office/powerpoint/2010/main" xmlns="" val="3838499978"/>
+      </p:ext>
+    </p:extLst>
+  </p:cSld>
+  <p:clrMapOvr>
+    <a:masterClrMapping/>
+  </p:clrMapOvr>
+  <mc:AlternateContent xmlns:mc="http://schemas.openxmlformats.org/markup-compatibility/2006">
+    <mc:Choice xmlns:p14="http://schemas.microsoft.com/office/powerpoint/2010/main" xmlns="" Requires="p14">
+      <p:transition p14:dur="0"/>
+    </mc:Choice>
+    <mc:Fallback>
+      <p:transition/>
+    </mc:Fallback>
+  </mc:AlternateContent>
+  <p:timing>
+    <p:tnLst>
+      <p:par>
+        <p:cTn id="1" dur="indefinite" restart="never" nodeType="tmRoot"/>
+      </p:par>
+    </p:tnLst>
+  </p:timing>
+</p:sld>
+</file>
+
+<file path=ppt/slides/slide11.xml><?xml version="1.0" encoding="utf-8"?>
+<p:sld xmlns:a="http://schemas.openxmlformats.org/drawingml/2006/main" xmlns:r="http://schemas.openxmlformats.org/officeDocument/2006/relationships" xmlns:p="http://schemas.openxmlformats.org/presentationml/2006/main">
+  <p:cSld>
+    <p:spTree>
+      <p:nvGrpSpPr>
+        <p:cNvPr id="1" name=""/>
+        <p:cNvGrpSpPr/>
+        <p:nvPr/>
+      </p:nvGrpSpPr>
+      <p:grpSpPr>
+        <a:xfrm>
+          <a:off x="0" y="0"/>
+          <a:ext cx="0" cy="0"/>
+          <a:chOff x="0" y="0"/>
+          <a:chExt cx="0" cy="0"/>
+        </a:xfrm>
+      </p:grpSpPr>
+      <p:sp>
+        <p:nvSpPr>
+          <p:cNvPr id="2" name="Title 1"/>
+          <p:cNvSpPr>
+            <a:spLocks noGrp="1"/>
+          </p:cNvSpPr>
+          <p:nvPr>
+            <p:ph type="title"/>
+          </p:nvPr>
+        </p:nvSpPr>
+        <p:spPr>
+          <a:xfrm>
+            <a:off x="457200" y="0"/>
+            <a:ext cx="8229600" cy="1143000"/>
+          </a:xfrm>
+        </p:spPr>
+        <p:txBody>
+          <a:bodyPr/>
+          <a:lstStyle/>
+          <a:p>
+            <a:r>
+              <a:rPr lang="en-US" dirty="0" smtClean="0"/>
+              <a:t>Time spent</a:t>
+            </a:r>
+            <a:endParaRPr lang="en-US" dirty="0"/>
+          </a:p>
+        </p:txBody>
+      </p:sp>
+      <p:graphicFrame>
+        <p:nvGraphicFramePr>
           <p:cNvPr id="6" name="內容版面配置區 5"/>
           <p:cNvGraphicFramePr>
             <a:graphicFrameLocks noGrp="1"/>
@@ -4404,18 +4469,18 @@
     </p:spTree>
     <p:extLst>
       <p:ext uri="{BB962C8B-B14F-4D97-AF65-F5344CB8AC3E}">
-        <p14:creationId xmlns:p14="http://schemas.microsoft.com/office/powerpoint/2010/main" val="520266324"/>
+        <p14:creationId xmlns:p14="http://schemas.microsoft.com/office/powerpoint/2010/main" xmlns="" val="520266324"/>
       </p:ext>
     </p:extLst>
   </p:cSld>
   <p:clrMapOvr>
     <a:masterClrMapping/>
   </p:clrMapOvr>
-  <mc:AlternateContent xmlns:mc="http://schemas.openxmlformats.org/markup-compatibility/2006" xmlns:p14="http://schemas.microsoft.com/office/powerpoint/2010/main">
-    <mc:Choice Requires="p14">
+  <mc:AlternateContent xmlns:mc="http://schemas.openxmlformats.org/markup-compatibility/2006">
+    <mc:Choice xmlns:p14="http://schemas.microsoft.com/office/powerpoint/2010/main" xmlns="" Requires="p14">
       <p:transition p14:dur="0"/>
     </mc:Choice>
-    <mc:Fallback xmlns="">
+    <mc:Fallback>
       <p:transition/>
     </mc:Fallback>
   </mc:AlternateContent>
@@ -4521,18 +4586,18 @@
     </p:spTree>
     <p:extLst>
       <p:ext uri="{BB962C8B-B14F-4D97-AF65-F5344CB8AC3E}">
-        <p14:creationId xmlns:p14="http://schemas.microsoft.com/office/powerpoint/2010/main" val="3707052916"/>
+        <p14:creationId xmlns:p14="http://schemas.microsoft.com/office/powerpoint/2010/main" xmlns="" val="3707052916"/>
       </p:ext>
     </p:extLst>
   </p:cSld>
   <p:clrMapOvr>
     <a:masterClrMapping/>
   </p:clrMapOvr>
-  <mc:AlternateContent xmlns:mc="http://schemas.openxmlformats.org/markup-compatibility/2006" xmlns:p14="http://schemas.microsoft.com/office/powerpoint/2010/main">
-    <mc:Choice Requires="p14">
+  <mc:AlternateContent xmlns:mc="http://schemas.openxmlformats.org/markup-compatibility/2006">
+    <mc:Choice xmlns:p14="http://schemas.microsoft.com/office/powerpoint/2010/main" xmlns="" Requires="p14">
       <p:transition p14:dur="0"/>
     </mc:Choice>
-    <mc:Fallback xmlns="">
+    <mc:Fallback>
       <p:transition/>
     </mc:Fallback>
   </mc:AlternateContent>
@@ -4676,18 +4741,18 @@
     </p:spTree>
     <p:extLst>
       <p:ext uri="{BB962C8B-B14F-4D97-AF65-F5344CB8AC3E}">
-        <p14:creationId xmlns:p14="http://schemas.microsoft.com/office/powerpoint/2010/main" val="2599285141"/>
+        <p14:creationId xmlns:p14="http://schemas.microsoft.com/office/powerpoint/2010/main" xmlns="" val="2599285141"/>
       </p:ext>
     </p:extLst>
   </p:cSld>
   <p:clrMapOvr>
     <a:masterClrMapping/>
   </p:clrMapOvr>
-  <mc:AlternateContent xmlns:mc="http://schemas.openxmlformats.org/markup-compatibility/2006" xmlns:p14="http://schemas.microsoft.com/office/powerpoint/2010/main">
-    <mc:Choice Requires="p14">
+  <mc:AlternateContent xmlns:mc="http://schemas.openxmlformats.org/markup-compatibility/2006">
+    <mc:Choice xmlns:p14="http://schemas.microsoft.com/office/powerpoint/2010/main" xmlns="" Requires="p14">
       <p:transition p14:dur="0"/>
     </mc:Choice>
-    <mc:Fallback xmlns="">
+    <mc:Fallback>
       <p:transition/>
     </mc:Fallback>
   </mc:AlternateContent>
@@ -4718,95 +4783,42 @@
           <a:chExt cx="0" cy="0"/>
         </a:xfrm>
       </p:grpSpPr>
-      <p:sp>
-        <p:nvSpPr>
-          <p:cNvPr id="2" name="Title 1"/>
-          <p:cNvSpPr>
-            <a:spLocks noGrp="1"/>
-          </p:cNvSpPr>
-          <p:nvPr>
-            <p:ph type="title"/>
-          </p:nvPr>
-        </p:nvSpPr>
-        <p:spPr/>
-        <p:txBody>
-          <a:bodyPr>
-            <a:normAutofit/>
-          </a:bodyPr>
-          <a:lstStyle/>
-          <a:p>
-            <a:r>
-              <a:rPr lang="en-US" dirty="0"/>
-              <a:t>E</a:t>
-            </a:r>
-            <a:r>
-              <a:rPr lang="en-US" dirty="0" smtClean="0"/>
-              <a:t>vidence </a:t>
-            </a:r>
-            <a:r>
-              <a:rPr lang="en-US" dirty="0"/>
-              <a:t>of early analysis &amp; design</a:t>
-            </a:r>
-          </a:p>
-        </p:txBody>
-      </p:sp>
-      <p:sp>
-        <p:nvSpPr>
-          <p:cNvPr id="3" name="Content Placeholder 2"/>
-          <p:cNvSpPr>
-            <a:spLocks noGrp="1"/>
-          </p:cNvSpPr>
-          <p:nvPr>
-            <p:ph idx="1"/>
-          </p:nvPr>
-        </p:nvSpPr>
-        <p:spPr/>
-        <p:txBody>
-          <a:bodyPr/>
-          <a:lstStyle/>
-          <a:p>
-            <a:r>
-              <a:rPr lang="en-US" dirty="0" smtClean="0"/>
-              <a:t>MVC formed the core of our project</a:t>
-            </a:r>
-          </a:p>
-          <a:p>
-            <a:pPr lvl="1"/>
-            <a:r>
-              <a:rPr lang="en-US" dirty="0" smtClean="0"/>
-              <a:t>Project planning</a:t>
-            </a:r>
-          </a:p>
-          <a:p>
-            <a:pPr lvl="1"/>
-            <a:r>
-              <a:rPr lang="en-US" dirty="0" smtClean="0"/>
-              <a:t>Design</a:t>
-            </a:r>
-          </a:p>
-          <a:p>
-            <a:r>
-              <a:rPr lang="en-US" dirty="0" smtClean="0"/>
-              <a:t>General analysis and design: class diagrams and use case diagrams</a:t>
-            </a:r>
-          </a:p>
-        </p:txBody>
-      </p:sp>
+      <p:pic>
+        <p:nvPicPr>
+          <p:cNvPr id="1026" name="Picture 2" descr="D:\DropBox\Dropbox\Soton\YR2 SEM2\COMP2012 SEG\Sources Files\seg2012gp9\doc\Analysis Design Testing\SEG_use_case_diagram.jpg"/>
+          <p:cNvPicPr>
+            <a:picLocks noChangeAspect="1" noChangeArrowheads="1"/>
+          </p:cNvPicPr>
+          <p:nvPr/>
+        </p:nvPicPr>
+        <p:blipFill>
+          <a:blip r:embed="rId2" cstate="print"/>
+          <a:srcRect t="9079"/>
+          <a:stretch>
+            <a:fillRect/>
+          </a:stretch>
+        </p:blipFill>
+        <p:spPr bwMode="auto">
+          <a:xfrm>
+            <a:off x="1219200" y="-9525"/>
+            <a:ext cx="6920906" cy="6867525"/>
+          </a:xfrm>
+          <a:prstGeom prst="rect">
+            <a:avLst/>
+          </a:prstGeom>
+          <a:noFill/>
+        </p:spPr>
+      </p:pic>
     </p:spTree>
-    <p:extLst>
-      <p:ext uri="{BB962C8B-B14F-4D97-AF65-F5344CB8AC3E}">
-        <p14:creationId xmlns:p14="http://schemas.microsoft.com/office/powerpoint/2010/main" val="1684329172"/>
-      </p:ext>
-    </p:extLst>
   </p:cSld>
   <p:clrMapOvr>
     <a:masterClrMapping/>
   </p:clrMapOvr>
-  <mc:AlternateContent xmlns:mc="http://schemas.openxmlformats.org/markup-compatibility/2006" xmlns:p14="http://schemas.microsoft.com/office/powerpoint/2010/main">
-    <mc:Choice Requires="p14">
+  <mc:AlternateContent xmlns:mc="http://schemas.openxmlformats.org/markup-compatibility/2006">
+    <mc:Choice xmlns:p14="http://schemas.microsoft.com/office/powerpoint/2010/main" xmlns="" Requires="p14">
       <p:transition p14:dur="0"/>
     </mc:Choice>
-    <mc:Fallback xmlns="">
+    <mc:Fallback>
       <p:transition/>
     </mc:Fallback>
   </mc:AlternateContent>
@@ -4849,6 +4861,125 @@
         </p:nvSpPr>
         <p:spPr/>
         <p:txBody>
+          <a:bodyPr>
+            <a:normAutofit/>
+          </a:bodyPr>
+          <a:lstStyle/>
+          <a:p>
+            <a:r>
+              <a:rPr lang="en-US" dirty="0"/>
+              <a:t>E</a:t>
+            </a:r>
+            <a:r>
+              <a:rPr lang="en-US" dirty="0" smtClean="0"/>
+              <a:t>vidence </a:t>
+            </a:r>
+            <a:r>
+              <a:rPr lang="en-US" dirty="0"/>
+              <a:t>of early analysis &amp; design</a:t>
+            </a:r>
+          </a:p>
+        </p:txBody>
+      </p:sp>
+      <p:sp>
+        <p:nvSpPr>
+          <p:cNvPr id="3" name="Content Placeholder 2"/>
+          <p:cNvSpPr>
+            <a:spLocks noGrp="1"/>
+          </p:cNvSpPr>
+          <p:nvPr>
+            <p:ph idx="1"/>
+          </p:nvPr>
+        </p:nvSpPr>
+        <p:spPr/>
+        <p:txBody>
+          <a:bodyPr/>
+          <a:lstStyle/>
+          <a:p>
+            <a:r>
+              <a:rPr lang="en-US" dirty="0" smtClean="0"/>
+              <a:t>MVC formed the core of our project</a:t>
+            </a:r>
+          </a:p>
+          <a:p>
+            <a:pPr lvl="1"/>
+            <a:r>
+              <a:rPr lang="en-US" dirty="0" smtClean="0"/>
+              <a:t>Project planning</a:t>
+            </a:r>
+          </a:p>
+          <a:p>
+            <a:pPr lvl="1"/>
+            <a:r>
+              <a:rPr lang="en-US" dirty="0" smtClean="0"/>
+              <a:t>Design</a:t>
+            </a:r>
+          </a:p>
+          <a:p>
+            <a:r>
+              <a:rPr lang="en-US" dirty="0" smtClean="0"/>
+              <a:t>General analysis and design: class diagrams and use case diagrams</a:t>
+            </a:r>
+          </a:p>
+        </p:txBody>
+      </p:sp>
+    </p:spTree>
+    <p:extLst>
+      <p:ext uri="{BB962C8B-B14F-4D97-AF65-F5344CB8AC3E}">
+        <p14:creationId xmlns:p14="http://schemas.microsoft.com/office/powerpoint/2010/main" xmlns="" val="1684329172"/>
+      </p:ext>
+    </p:extLst>
+  </p:cSld>
+  <p:clrMapOvr>
+    <a:masterClrMapping/>
+  </p:clrMapOvr>
+  <mc:AlternateContent xmlns:mc="http://schemas.openxmlformats.org/markup-compatibility/2006">
+    <mc:Choice xmlns:p14="http://schemas.microsoft.com/office/powerpoint/2010/main" xmlns="" Requires="p14">
+      <p:transition p14:dur="0"/>
+    </mc:Choice>
+    <mc:Fallback>
+      <p:transition/>
+    </mc:Fallback>
+  </mc:AlternateContent>
+  <p:timing>
+    <p:tnLst>
+      <p:par>
+        <p:cTn id="1" dur="indefinite" restart="never" nodeType="tmRoot"/>
+      </p:par>
+    </p:tnLst>
+  </p:timing>
+</p:sld>
+</file>
+
+<file path=ppt/slides/slide6.xml><?xml version="1.0" encoding="utf-8"?>
+<p:sld xmlns:a="http://schemas.openxmlformats.org/drawingml/2006/main" xmlns:r="http://schemas.openxmlformats.org/officeDocument/2006/relationships" xmlns:p="http://schemas.openxmlformats.org/presentationml/2006/main">
+  <p:cSld>
+    <p:spTree>
+      <p:nvGrpSpPr>
+        <p:cNvPr id="1" name=""/>
+        <p:cNvGrpSpPr/>
+        <p:nvPr/>
+      </p:nvGrpSpPr>
+      <p:grpSpPr>
+        <a:xfrm>
+          <a:off x="0" y="0"/>
+          <a:ext cx="0" cy="0"/>
+          <a:chOff x="0" y="0"/>
+          <a:chExt cx="0" cy="0"/>
+        </a:xfrm>
+      </p:grpSpPr>
+      <p:sp>
+        <p:nvSpPr>
+          <p:cNvPr id="2" name="Title 1"/>
+          <p:cNvSpPr>
+            <a:spLocks noGrp="1"/>
+          </p:cNvSpPr>
+          <p:nvPr>
+            <p:ph type="title"/>
+          </p:nvPr>
+        </p:nvSpPr>
+        <p:spPr/>
+        <p:txBody>
           <a:bodyPr/>
           <a:lstStyle/>
           <a:p>
@@ -4869,10 +5000,10 @@
           <p:nvPr/>
         </p:nvPicPr>
         <p:blipFill>
-          <a:blip r:embed="rId2">
+          <a:blip r:embed="rId2" cstate="print">
             <a:extLst>
               <a:ext uri="{28A0092B-C50C-407E-A947-70E740481C1C}">
-                <a14:useLocalDpi xmlns:a14="http://schemas.microsoft.com/office/drawing/2010/main" val="0"/>
+                <a14:useLocalDpi xmlns:a14="http://schemas.microsoft.com/office/drawing/2010/main" xmlns="" val="0"/>
               </a:ext>
             </a:extLst>
           </a:blip>
@@ -4908,93 +5039,18 @@
     </p:spTree>
     <p:extLst>
       <p:ext uri="{BB962C8B-B14F-4D97-AF65-F5344CB8AC3E}">
-        <p14:creationId xmlns:p14="http://schemas.microsoft.com/office/powerpoint/2010/main" val="869076350"/>
+        <p14:creationId xmlns:p14="http://schemas.microsoft.com/office/powerpoint/2010/main" xmlns="" val="869076350"/>
       </p:ext>
     </p:extLst>
   </p:cSld>
   <p:clrMapOvr>
     <a:masterClrMapping/>
   </p:clrMapOvr>
-  <mc:AlternateContent xmlns:mc="http://schemas.openxmlformats.org/markup-compatibility/2006" xmlns:p14="http://schemas.microsoft.com/office/powerpoint/2010/main">
-    <mc:Choice Requires="p14">
+  <mc:AlternateContent xmlns:mc="http://schemas.openxmlformats.org/markup-compatibility/2006">
+    <mc:Choice xmlns:p14="http://schemas.microsoft.com/office/powerpoint/2010/main" xmlns="" Requires="p14">
       <p:transition p14:dur="0"/>
     </mc:Choice>
-    <mc:Fallback xmlns="">
-      <p:transition/>
-    </mc:Fallback>
-  </mc:AlternateContent>
-  <p:timing>
-    <p:tnLst>
-      <p:par>
-        <p:cTn id="1" dur="indefinite" restart="never" nodeType="tmRoot"/>
-      </p:par>
-    </p:tnLst>
-  </p:timing>
-</p:sld>
-</file>
-
-<file path=ppt/slides/slide6.xml><?xml version="1.0" encoding="utf-8"?>
-<p:sld xmlns:a="http://schemas.openxmlformats.org/drawingml/2006/main" xmlns:r="http://schemas.openxmlformats.org/officeDocument/2006/relationships" xmlns:p="http://schemas.openxmlformats.org/presentationml/2006/main">
-  <p:cSld>
-    <p:spTree>
-      <p:nvGrpSpPr>
-        <p:cNvPr id="1" name=""/>
-        <p:cNvGrpSpPr/>
-        <p:nvPr/>
-      </p:nvGrpSpPr>
-      <p:grpSpPr>
-        <a:xfrm>
-          <a:off x="0" y="0"/>
-          <a:ext cx="0" cy="0"/>
-          <a:chOff x="0" y="0"/>
-          <a:chExt cx="0" cy="0"/>
-        </a:xfrm>
-      </p:grpSpPr>
-      <p:sp>
-        <p:nvSpPr>
-          <p:cNvPr id="4" name="Rectangle 3"/>
-          <p:cNvSpPr/>
-          <p:nvPr/>
-        </p:nvSpPr>
-        <p:spPr>
-          <a:xfrm>
-            <a:off x="3124200" y="2514600"/>
-            <a:ext cx="4419600" cy="1015663"/>
-          </a:xfrm>
-          <a:prstGeom prst="rect">
-            <a:avLst/>
-          </a:prstGeom>
-        </p:spPr>
-        <p:txBody>
-          <a:bodyPr wrap="square">
-            <a:spAutoFit/>
-          </a:bodyPr>
-          <a:lstStyle/>
-          <a:p>
-            <a:r>
-              <a:rPr lang="en-US" sz="6000" i="1" spc="-300" dirty="0" smtClean="0">
-                <a:latin typeface="Comic Sans MS" pitchFamily="66" charset="0"/>
-              </a:rPr>
-              <a:t>Demo</a:t>
-            </a:r>
-          </a:p>
-        </p:txBody>
-      </p:sp>
-    </p:spTree>
-    <p:extLst>
-      <p:ext uri="{BB962C8B-B14F-4D97-AF65-F5344CB8AC3E}">
-        <p14:creationId xmlns:p14="http://schemas.microsoft.com/office/powerpoint/2010/main" val="1161608251"/>
-      </p:ext>
-    </p:extLst>
-  </p:cSld>
-  <p:clrMapOvr>
-    <a:masterClrMapping/>
-  </p:clrMapOvr>
-  <mc:AlternateContent xmlns:mc="http://schemas.openxmlformats.org/markup-compatibility/2006" xmlns:p14="http://schemas.microsoft.com/office/powerpoint/2010/main">
-    <mc:Choice Requires="p14">
-      <p:transition p14:dur="0"/>
-    </mc:Choice>
-    <mc:Fallback xmlns="">
+    <mc:Fallback>
       <p:transition/>
     </mc:Fallback>
   </mc:AlternateContent>
@@ -5027,85 +5083,49 @@
       </p:grpSpPr>
       <p:sp>
         <p:nvSpPr>
-          <p:cNvPr id="2" name="Title 1"/>
-          <p:cNvSpPr>
-            <a:spLocks noGrp="1"/>
-          </p:cNvSpPr>
-          <p:nvPr>
-            <p:ph type="title"/>
-          </p:nvPr>
-        </p:nvSpPr>
-        <p:spPr/>
-        <p:txBody>
-          <a:bodyPr/>
-          <a:lstStyle/>
-          <a:p>
-            <a:r>
-              <a:rPr lang="en-US" dirty="0" smtClean="0"/>
-              <a:t>Project so far</a:t>
-            </a:r>
-            <a:endParaRPr lang="en-US" dirty="0"/>
-          </a:p>
-        </p:txBody>
-      </p:sp>
-      <p:sp>
-        <p:nvSpPr>
-          <p:cNvPr id="3" name="Content Placeholder 2"/>
-          <p:cNvSpPr>
-            <a:spLocks noGrp="1"/>
-          </p:cNvSpPr>
-          <p:nvPr>
-            <p:ph idx="1"/>
-          </p:nvPr>
-        </p:nvSpPr>
-        <p:spPr/>
-        <p:txBody>
-          <a:bodyPr/>
-          <a:lstStyle/>
-          <a:p>
-            <a:r>
-              <a:rPr lang="en-US" dirty="0" smtClean="0"/>
-              <a:t>Current state: programming, testing, refining analysis and design</a:t>
-            </a:r>
-          </a:p>
-          <a:p>
-            <a:r>
-              <a:rPr lang="en-US" dirty="0" smtClean="0"/>
-              <a:t>Plans</a:t>
-            </a:r>
-            <a:r>
-              <a:rPr lang="en-US" smtClean="0"/>
-              <a:t>: What's </a:t>
-            </a:r>
-            <a:r>
-              <a:rPr lang="en-US" dirty="0" smtClean="0"/>
-              <a:t>happening next</a:t>
-            </a:r>
-          </a:p>
-          <a:p>
-            <a:r>
-              <a:rPr lang="en-US" dirty="0" smtClean="0"/>
-              <a:t>Changes: Gantt Chart</a:t>
-            </a:r>
-            <a:endParaRPr lang="en-US" dirty="0" smtClean="0"/>
+          <p:cNvPr id="4" name="Rectangle 3"/>
+          <p:cNvSpPr/>
+          <p:nvPr/>
+        </p:nvSpPr>
+        <p:spPr>
+          <a:xfrm>
+            <a:off x="3124200" y="2514600"/>
+            <a:ext cx="4419600" cy="1015663"/>
+          </a:xfrm>
+          <a:prstGeom prst="rect">
+            <a:avLst/>
+          </a:prstGeom>
+        </p:spPr>
+        <p:txBody>
+          <a:bodyPr wrap="square">
+            <a:spAutoFit/>
+          </a:bodyPr>
+          <a:lstStyle/>
+          <a:p>
+            <a:r>
+              <a:rPr lang="en-US" sz="6000" i="1" spc="-300" dirty="0" smtClean="0">
+                <a:latin typeface="Comic Sans MS" pitchFamily="66" charset="0"/>
+              </a:rPr>
+              <a:t>Demo</a:t>
+            </a:r>
           </a:p>
         </p:txBody>
       </p:sp>
     </p:spTree>
     <p:extLst>
       <p:ext uri="{BB962C8B-B14F-4D97-AF65-F5344CB8AC3E}">
-        <p14:creationId xmlns:p14="http://schemas.microsoft.com/office/powerpoint/2010/main" val="68516678"/>
+        <p14:creationId xmlns:p14="http://schemas.microsoft.com/office/powerpoint/2010/main" xmlns="" val="1161608251"/>
       </p:ext>
     </p:extLst>
   </p:cSld>
   <p:clrMapOvr>
     <a:masterClrMapping/>
   </p:clrMapOvr>
-  <mc:AlternateContent xmlns:mc="http://schemas.openxmlformats.org/markup-compatibility/2006" xmlns:p14="http://schemas.microsoft.com/office/powerpoint/2010/main">
-    <mc:Choice Requires="p14">
+  <mc:AlternateContent xmlns:mc="http://schemas.openxmlformats.org/markup-compatibility/2006">
+    <mc:Choice xmlns:p14="http://schemas.microsoft.com/office/powerpoint/2010/main" xmlns="" Requires="p14">
       <p:transition p14:dur="0"/>
     </mc:Choice>
-    <mc:Fallback xmlns="">
+    <mc:Fallback>
       <p:transition/>
     </mc:Fallback>
   </mc:AlternateContent>
@@ -5151,7 +5171,11 @@
           <a:bodyPr/>
           <a:lstStyle/>
           <a:p>
-            <a:endParaRPr lang="en-GB"/>
+            <a:r>
+              <a:rPr lang="en-US" dirty="0" smtClean="0"/>
+              <a:t>Project so far</a:t>
+            </a:r>
+            <a:endParaRPr lang="en-US" dirty="0"/>
           </a:p>
         </p:txBody>
       </p:sp>
@@ -5170,69 +5194,51 @@
           <a:bodyPr/>
           <a:lstStyle/>
           <a:p>
-            <a:endParaRPr lang="en-GB"/>
-          </a:p>
-        </p:txBody>
-      </p:sp>
-      <p:pic>
-        <p:nvPicPr>
-          <p:cNvPr id="1026" name="Picture 2" descr="C:\Users\User\Downloads\SmartSheetExport (1).png"/>
-          <p:cNvPicPr>
-            <a:picLocks noChangeAspect="1" noChangeArrowheads="1"/>
-          </p:cNvPicPr>
-          <p:nvPr/>
-        </p:nvPicPr>
-        <p:blipFill>
-          <a:blip r:embed="rId2">
-            <a:extLst>
-              <a:ext uri="{28A0092B-C50C-407E-A947-70E740481C1C}">
-                <a14:useLocalDpi xmlns:a14="http://schemas.microsoft.com/office/drawing/2010/main" val="0"/>
-              </a:ext>
-            </a:extLst>
-          </a:blip>
-          <a:srcRect/>
-          <a:stretch>
-            <a:fillRect/>
-          </a:stretch>
-        </p:blipFill>
-        <p:spPr bwMode="auto">
-          <a:xfrm>
-            <a:off x="0" y="959902"/>
-            <a:ext cx="9144000" cy="4938195"/>
-          </a:xfrm>
-          <a:prstGeom prst="rect">
-            <a:avLst/>
-          </a:prstGeom>
-          <a:noFill/>
-          <a:extLst>
-            <a:ext uri="{909E8E84-426E-40DD-AFC4-6F175D3DCCD1}">
-              <a14:hiddenFill xmlns:a14="http://schemas.microsoft.com/office/drawing/2010/main">
-                <a:solidFill>
-                  <a:srgbClr val="FFFFFF"/>
-                </a:solidFill>
-              </a14:hiddenFill>
-            </a:ext>
-          </a:extLst>
-        </p:spPr>
-      </p:pic>
+            <a:r>
+              <a:rPr lang="en-US" dirty="0" smtClean="0"/>
+              <a:t>Current state: programming, testing, refining analysis and design</a:t>
+            </a:r>
+          </a:p>
+          <a:p>
+            <a:r>
+              <a:rPr lang="en-US" dirty="0" smtClean="0"/>
+              <a:t>Plans: We are on target in terms of the work allocations and Gantt chart times</a:t>
+            </a:r>
+          </a:p>
+          <a:p>
+            <a:r>
+              <a:rPr lang="en-US" dirty="0" smtClean="0"/>
+              <a:t>Time budget: On budget</a:t>
+            </a:r>
+            <a:endParaRPr lang="en-US" dirty="0"/>
+          </a:p>
+        </p:txBody>
+      </p:sp>
     </p:spTree>
     <p:extLst>
       <p:ext uri="{BB962C8B-B14F-4D97-AF65-F5344CB8AC3E}">
-        <p14:creationId xmlns:p14="http://schemas.microsoft.com/office/powerpoint/2010/main" val="1726562854"/>
+        <p14:creationId xmlns:p14="http://schemas.microsoft.com/office/powerpoint/2010/main" xmlns="" val="68516678"/>
       </p:ext>
     </p:extLst>
   </p:cSld>
   <p:clrMapOvr>
     <a:masterClrMapping/>
   </p:clrMapOvr>
-  <mc:AlternateContent xmlns:mc="http://schemas.openxmlformats.org/markup-compatibility/2006" xmlns:p14="http://schemas.microsoft.com/office/powerpoint/2010/main">
-    <mc:Choice Requires="p14">
+  <mc:AlternateContent xmlns:mc="http://schemas.openxmlformats.org/markup-compatibility/2006">
+    <mc:Choice xmlns:p14="http://schemas.microsoft.com/office/powerpoint/2010/main" xmlns="" Requires="p14">
       <p:transition p14:dur="0"/>
     </mc:Choice>
-    <mc:Fallback xmlns="">
+    <mc:Fallback>
       <p:transition/>
     </mc:Fallback>
   </mc:AlternateContent>
+  <p:timing>
+    <p:tnLst>
+      <p:par>
+        <p:cTn id="1" dur="indefinite" restart="never" nodeType="tmRoot"/>
+      </p:par>
+    </p:tnLst>
+  </p:timing>
 </p:sld>
 </file>
 
@@ -5255,137 +5261,79 @@
       </p:grpSpPr>
       <p:sp>
         <p:nvSpPr>
-          <p:cNvPr id="2" name="Title 1"/>
-          <p:cNvSpPr>
-            <a:spLocks noGrp="1"/>
-          </p:cNvSpPr>
-          <p:nvPr>
-            <p:ph type="title"/>
-          </p:nvPr>
-        </p:nvSpPr>
-        <p:spPr>
+          <p:cNvPr id="3" name="Content Placeholder 2"/>
+          <p:cNvSpPr>
+            <a:spLocks noGrp="1"/>
+          </p:cNvSpPr>
+          <p:nvPr>
+            <p:ph idx="1"/>
+          </p:nvPr>
+        </p:nvSpPr>
+        <p:spPr/>
+        <p:txBody>
+          <a:bodyPr/>
+          <a:lstStyle/>
+          <a:p>
+            <a:endParaRPr lang="en-GB"/>
+          </a:p>
+        </p:txBody>
+      </p:sp>
+      <p:pic>
+        <p:nvPicPr>
+          <p:cNvPr id="1026" name="Picture 2" descr="C:\Users\User\Downloads\SmartSheetExport (1).png"/>
+          <p:cNvPicPr>
+            <a:picLocks noChangeAspect="1" noChangeArrowheads="1"/>
+          </p:cNvPicPr>
+          <p:nvPr/>
+        </p:nvPicPr>
+        <p:blipFill>
+          <a:blip r:embed="rId2" cstate="print">
+            <a:extLst>
+              <a:ext uri="{28A0092B-C50C-407E-A947-70E740481C1C}">
+                <a14:useLocalDpi xmlns:a14="http://schemas.microsoft.com/office/drawing/2010/main" xmlns="" val="0"/>
+              </a:ext>
+            </a:extLst>
+          </a:blip>
+          <a:srcRect/>
+          <a:stretch>
+            <a:fillRect/>
+          </a:stretch>
+        </p:blipFill>
+        <p:spPr bwMode="auto">
           <a:xfrm>
-            <a:off x="457200" y="0"/>
-            <a:ext cx="8229600" cy="1143000"/>
-          </a:xfrm>
-        </p:spPr>
-        <p:txBody>
-          <a:bodyPr/>
-          <a:lstStyle/>
-          <a:p>
-            <a:r>
-              <a:rPr lang="en-US" dirty="0" smtClean="0"/>
-              <a:t>Time spent</a:t>
-            </a:r>
-            <a:endParaRPr lang="en-US" dirty="0"/>
-          </a:p>
-        </p:txBody>
-      </p:sp>
-      <p:graphicFrame>
-        <p:nvGraphicFramePr>
-          <p:cNvPr id="5" name="圖表 4"/>
-          <p:cNvGraphicFramePr/>
-          <p:nvPr/>
-        </p:nvGraphicFramePr>
-        <p:xfrm>
-          <a:off x="457200" y="1295400"/>
-          <a:ext cx="8458200" cy="5105400"/>
-        </p:xfrm>
-        <a:graphic>
-          <a:graphicData uri="http://schemas.openxmlformats.org/drawingml/2006/chart">
-            <c:chart xmlns:c="http://schemas.openxmlformats.org/drawingml/2006/chart" xmlns:r="http://schemas.openxmlformats.org/officeDocument/2006/relationships" r:id="rId2"/>
-          </a:graphicData>
-        </a:graphic>
-      </p:graphicFrame>
-      <p:sp>
-        <p:nvSpPr>
-          <p:cNvPr id="6" name="Title 1"/>
-          <p:cNvSpPr txBox="1">
-            <a:spLocks/>
-          </p:cNvSpPr>
-          <p:nvPr/>
-        </p:nvSpPr>
-        <p:spPr>
-          <a:xfrm>
-            <a:off x="0" y="6096000"/>
-            <a:ext cx="4191000" cy="762000"/>
+            <a:off x="0" y="959902"/>
+            <a:ext cx="9144000" cy="4938195"/>
           </a:xfrm>
           <a:prstGeom prst="rect">
             <a:avLst/>
           </a:prstGeom>
+          <a:noFill/>
+          <a:extLst>
+            <a:ext uri="{909E8E84-426E-40DD-AFC4-6F175D3DCCD1}">
+              <a14:hiddenFill xmlns:a14="http://schemas.microsoft.com/office/drawing/2010/main" xmlns="">
+                <a:solidFill>
+                  <a:srgbClr val="FFFFFF"/>
+                </a:solidFill>
+              </a14:hiddenFill>
+            </a:ext>
+          </a:extLst>
         </p:spPr>
-        <p:txBody>
-          <a:bodyPr vert="horz" lIns="91440" tIns="45720" rIns="91440" bIns="45720" rtlCol="0" anchor="ctr">
-            <a:normAutofit/>
-          </a:bodyPr>
-          <a:lstStyle/>
-          <a:p>
-            <a:pPr marL="0" marR="0" lvl="0" indent="0" algn="ctr" defTabSz="914400" rtl="0" eaLnBrk="1" fontAlgn="auto" latinLnBrk="0" hangingPunct="1">
-              <a:lnSpc>
-                <a:spcPct val="100000"/>
-              </a:lnSpc>
-              <a:spcBef>
-                <a:spcPct val="0"/>
-              </a:spcBef>
-              <a:spcAft>
-                <a:spcPts val="0"/>
-              </a:spcAft>
-              <a:buClrTx/>
-              <a:buSzTx/>
-              <a:buFontTx/>
-              <a:buNone/>
-              <a:tabLst/>
-              <a:defRPr/>
-            </a:pPr>
-            <a:r>
-              <a:rPr kumimoji="0" lang="en-US" sz="2000" b="0" i="0" u="none" strike="noStrike" kern="1200" cap="none" spc="0" normalizeH="0" baseline="0" noProof="0" dirty="0" smtClean="0">
-                <a:ln>
-                  <a:noFill/>
-                </a:ln>
-                <a:solidFill>
-                  <a:schemeClr val="tx1"/>
-                </a:solidFill>
-                <a:effectLst/>
-                <a:uLnTx/>
-                <a:uFillTx/>
-                <a:latin typeface="+mj-lt"/>
-                <a:ea typeface="+mj-ea"/>
-                <a:cs typeface="+mj-cs"/>
-              </a:rPr>
-              <a:t>P.S. Expected time spent / Person : 16</a:t>
-            </a:r>
-            <a:endParaRPr kumimoji="0" lang="en-US" sz="2000" b="0" i="0" u="none" strike="noStrike" kern="1200" cap="none" spc="0" normalizeH="0" baseline="0" noProof="0" dirty="0">
-              <a:ln>
-                <a:noFill/>
-              </a:ln>
-              <a:solidFill>
-                <a:schemeClr val="tx1"/>
-              </a:solidFill>
-              <a:effectLst/>
-              <a:uLnTx/>
-              <a:uFillTx/>
-              <a:latin typeface="+mj-lt"/>
-              <a:ea typeface="+mj-ea"/>
-              <a:cs typeface="+mj-cs"/>
-            </a:endParaRPr>
-          </a:p>
-        </p:txBody>
-      </p:sp>
+      </p:pic>
     </p:spTree>
     <p:extLst>
       <p:ext uri="{BB962C8B-B14F-4D97-AF65-F5344CB8AC3E}">
-        <p14:creationId xmlns:p14="http://schemas.microsoft.com/office/powerpoint/2010/main" val="3838499978"/>
+        <p14:creationId xmlns:p14="http://schemas.microsoft.com/office/powerpoint/2010/main" xmlns="" val="1726562854"/>
       </p:ext>
     </p:extLst>
   </p:cSld>
   <p:clrMapOvr>
     <a:masterClrMapping/>
   </p:clrMapOvr>
-  <mc:AlternateContent xmlns:mc="http://schemas.openxmlformats.org/markup-compatibility/2006" xmlns:p14="http://schemas.microsoft.com/office/powerpoint/2010/main">
-    <mc:Choice Requires="p14">
+  <mc:AlternateContent xmlns:mc="http://schemas.openxmlformats.org/markup-compatibility/2006">
+    <mc:Choice xmlns:p14="http://schemas.microsoft.com/office/powerpoint/2010/main" xmlns="" Requires="p14">
       <p:transition p14:dur="0"/>
     </mc:Choice>
-    <mc:Fallback xmlns="">
+    <mc:Fallback>
       <p:transition/>
     </mc:Fallback>
   </mc:AlternateContent>

</xml_diff>